<commit_message>
Release version of Holland College report materials, with PPT and Word document converted into pdf.
</commit_message>
<xml_diff>
--- a/_Holland_College/赴加培训工作汇报.pptx
+++ b/_Holland_College/赴加培训工作汇报.pptx
@@ -5,7 +5,7 @@
     <p:sldMasterId id="2147483660" r:id="rId1"/>
   </p:sldMasterIdLst>
   <p:notesMasterIdLst>
-    <p:notesMasterId r:id="rId24"/>
+    <p:notesMasterId r:id="rId23"/>
   </p:notesMasterIdLst>
   <p:sldIdLst>
     <p:sldId id="256" r:id="rId2"/>
@@ -24,12 +24,11 @@
     <p:sldId id="270" r:id="rId15"/>
     <p:sldId id="271" r:id="rId16"/>
     <p:sldId id="272" r:id="rId17"/>
-    <p:sldId id="273" r:id="rId18"/>
-    <p:sldId id="259" r:id="rId19"/>
-    <p:sldId id="262" r:id="rId20"/>
-    <p:sldId id="274" r:id="rId21"/>
-    <p:sldId id="276" r:id="rId22"/>
-    <p:sldId id="277" r:id="rId23"/>
+    <p:sldId id="259" r:id="rId18"/>
+    <p:sldId id="262" r:id="rId19"/>
+    <p:sldId id="274" r:id="rId20"/>
+    <p:sldId id="276" r:id="rId21"/>
+    <p:sldId id="277" r:id="rId22"/>
   </p:sldIdLst>
   <p:sldSz cx="9144000" cy="6858000" type="screen4x3"/>
   <p:notesSz cx="6858000" cy="9144000"/>
@@ -3042,6 +3041,13 @@
         </dgm:presLayoutVars>
       </dgm:prSet>
       <dgm:spPr/>
+      <dgm:t>
+        <a:bodyPr/>
+        <a:lstStyle/>
+        <a:p>
+          <a:endParaRPr lang="zh-CN" altLang="en-US"/>
+        </a:p>
+      </dgm:t>
     </dgm:pt>
     <dgm:pt modelId="{A69F4AB8-3A23-489E-9BF0-43795CB9C29D}" type="pres">
       <dgm:prSet presAssocID="{0AED848A-AFCB-466A-81AB-D89BE5FD014D}" presName="composite" presStyleCnt="0"/>
@@ -3121,35 +3127,35 @@
     </dgm:pt>
   </dgm:ptLst>
   <dgm:cxnLst>
+    <dgm:cxn modelId="{7F1E7267-B3C8-48FA-B563-F386B82F9206}" type="presOf" srcId="{3C2AB616-AE22-439F-B0F6-8D90F3836DD1}" destId="{7736769B-6095-487F-8966-2468C18C925E}" srcOrd="0" destOrd="6" presId="urn:microsoft.com/office/officeart/2005/8/layout/hList1"/>
+    <dgm:cxn modelId="{6A694266-9F84-4EB3-ACFC-CD73123F203E}" type="presOf" srcId="{30900A70-273C-4C8F-8FEB-C138551CE7A3}" destId="{48A9371C-3646-4CAD-ADE7-4E185081914F}" srcOrd="0" destOrd="3" presId="urn:microsoft.com/office/officeart/2005/8/layout/hList1"/>
+    <dgm:cxn modelId="{DA3199D3-E1ED-4BC8-927E-25C57AE646DE}" type="presOf" srcId="{9A2883D1-E9D6-4C2D-BBD0-FB1F001515DA}" destId="{48A9371C-3646-4CAD-ADE7-4E185081914F}" srcOrd="0" destOrd="2" presId="urn:microsoft.com/office/officeart/2005/8/layout/hList1"/>
+    <dgm:cxn modelId="{86B4D1ED-C51B-4675-9BE4-D2F9735ECDB3}" srcId="{2196DF3C-D567-4AB5-A162-D967C840CB4E}" destId="{0248731D-9C85-450C-835E-2A0502E35468}" srcOrd="4" destOrd="0" parTransId="{17BE5E71-B422-4488-9DF3-8D8471F1211B}" sibTransId="{B8D05C6E-BC95-4896-9B5E-DF518F978550}"/>
+    <dgm:cxn modelId="{AFB7A0DE-F55F-461C-B74B-4517CB951790}" srcId="{0AED848A-AFCB-466A-81AB-D89BE5FD014D}" destId="{08072536-33EC-4AA1-BEDC-F57BADE9E028}" srcOrd="1" destOrd="0" parTransId="{1CE741D5-7B39-4588-8958-2D74000E77BE}" sibTransId="{0783A652-1676-42EA-8275-EF166CBBCB4D}"/>
+    <dgm:cxn modelId="{5BB75260-EED0-4D48-B823-87E9C3B93482}" type="presOf" srcId="{08072536-33EC-4AA1-BEDC-F57BADE9E028}" destId="{48A9371C-3646-4CAD-ADE7-4E185081914F}" srcOrd="0" destOrd="1" presId="urn:microsoft.com/office/officeart/2005/8/layout/hList1"/>
+    <dgm:cxn modelId="{A1AB493E-A865-453F-8CEA-5AAD6551D2EF}" type="presOf" srcId="{AC9C7364-A705-4DC4-9368-68A0CE20653C}" destId="{7736769B-6095-487F-8966-2468C18C925E}" srcOrd="0" destOrd="5" presId="urn:microsoft.com/office/officeart/2005/8/layout/hList1"/>
+    <dgm:cxn modelId="{027B7AC1-6CAF-48BE-AC70-9CE15EEE18F1}" type="presOf" srcId="{AB3E949C-DB19-4D4D-B050-1D4C7754295A}" destId="{7736769B-6095-487F-8966-2468C18C925E}" srcOrd="0" destOrd="2" presId="urn:microsoft.com/office/officeart/2005/8/layout/hList1"/>
+    <dgm:cxn modelId="{C681B628-AFEA-4699-8220-B50D0DFAF750}" srcId="{0AED848A-AFCB-466A-81AB-D89BE5FD014D}" destId="{38B8CC04-713E-468D-A597-2CE4B417A744}" srcOrd="4" destOrd="0" parTransId="{F5510500-94C5-490B-BA59-B1E31C9860B3}" sibTransId="{4BBCF970-6029-4C34-9104-8BA45C583A40}"/>
     <dgm:cxn modelId="{E89E9F1B-62DF-483E-BCDD-947604F59EE4}" srcId="{CD120676-85BC-4A82-9F25-1FDA0DE25F04}" destId="{2196DF3C-D567-4AB5-A162-D967C840CB4E}" srcOrd="1" destOrd="0" parTransId="{84E52765-38DE-4AE3-83C4-221E0BEC74BA}" sibTransId="{099F4466-EF38-4DC0-A783-9D66A9F9D0F8}"/>
-    <dgm:cxn modelId="{C681B628-AFEA-4699-8220-B50D0DFAF750}" srcId="{0AED848A-AFCB-466A-81AB-D89BE5FD014D}" destId="{38B8CC04-713E-468D-A597-2CE4B417A744}" srcOrd="4" destOrd="0" parTransId="{F5510500-94C5-490B-BA59-B1E31C9860B3}" sibTransId="{4BBCF970-6029-4C34-9104-8BA45C583A40}"/>
-    <dgm:cxn modelId="{7F1E7267-B3C8-48FA-B563-F386B82F9206}" type="presOf" srcId="{3C2AB616-AE22-439F-B0F6-8D90F3836DD1}" destId="{7736769B-6095-487F-8966-2468C18C925E}" srcOrd="0" destOrd="6" presId="urn:microsoft.com/office/officeart/2005/8/layout/hList1"/>
-    <dgm:cxn modelId="{86B4D1ED-C51B-4675-9BE4-D2F9735ECDB3}" srcId="{2196DF3C-D567-4AB5-A162-D967C840CB4E}" destId="{0248731D-9C85-450C-835E-2A0502E35468}" srcOrd="4" destOrd="0" parTransId="{17BE5E71-B422-4488-9DF3-8D8471F1211B}" sibTransId="{B8D05C6E-BC95-4896-9B5E-DF518F978550}"/>
+    <dgm:cxn modelId="{B9E78E07-D466-4364-8A47-E3056D341748}" type="presOf" srcId="{0AED848A-AFCB-466A-81AB-D89BE5FD014D}" destId="{AF1BC4C8-3356-49E2-824E-28E5FED7B48E}" srcOrd="0" destOrd="0" presId="urn:microsoft.com/office/officeart/2005/8/layout/hList1"/>
+    <dgm:cxn modelId="{78DD48A6-9230-459D-B796-78803502450C}" srcId="{0AED848A-AFCB-466A-81AB-D89BE5FD014D}" destId="{955FAFFD-9AEA-4FB6-BF33-BA2BD4A0C486}" srcOrd="0" destOrd="0" parTransId="{05767C33-157D-40E2-837E-42B88AAC2251}" sibTransId="{AFF68820-E08F-4D0A-B5CD-2DB9FBB974E3}"/>
+    <dgm:cxn modelId="{85321FAA-FE40-4308-BFB4-8D17F0FCFC00}" srcId="{0AED848A-AFCB-466A-81AB-D89BE5FD014D}" destId="{30900A70-273C-4C8F-8FEB-C138551CE7A3}" srcOrd="3" destOrd="0" parTransId="{C0A20453-1F39-4CEC-8053-637EC2392930}" sibTransId="{6874EC8C-FA52-4998-A595-6F082B1BB46F}"/>
+    <dgm:cxn modelId="{7E97EA7C-956C-4335-8217-1A089EB77C57}" type="presOf" srcId="{E773193F-7716-42E4-A234-422B133A95A4}" destId="{7736769B-6095-487F-8966-2468C18C925E}" srcOrd="0" destOrd="0" presId="urn:microsoft.com/office/officeart/2005/8/layout/hList1"/>
+    <dgm:cxn modelId="{A8C380FD-B8A7-47CB-A7BC-522512571ACD}" type="presOf" srcId="{CD120676-85BC-4A82-9F25-1FDA0DE25F04}" destId="{8F795E57-0498-40D2-9A19-C37BF24E6A19}" srcOrd="0" destOrd="0" presId="urn:microsoft.com/office/officeart/2005/8/layout/hList1"/>
+    <dgm:cxn modelId="{430EAE9E-EDEA-48FE-9700-82D2C67D85FC}" type="presOf" srcId="{2196DF3C-D567-4AB5-A162-D967C840CB4E}" destId="{2C44EDDA-45AE-42AA-BE3F-2E6913EF3107}" srcOrd="0" destOrd="0" presId="urn:microsoft.com/office/officeart/2005/8/layout/hList1"/>
+    <dgm:cxn modelId="{454EC06D-0D63-43E9-8A6C-8C1EA34B8F35}" type="presOf" srcId="{38B8CC04-713E-468D-A597-2CE4B417A744}" destId="{48A9371C-3646-4CAD-ADE7-4E185081914F}" srcOrd="0" destOrd="4" presId="urn:microsoft.com/office/officeart/2005/8/layout/hList1"/>
     <dgm:cxn modelId="{EA1C6162-61C5-4B4A-B4B4-473FE63E152E}" srcId="{2196DF3C-D567-4AB5-A162-D967C840CB4E}" destId="{E773193F-7716-42E4-A234-422B133A95A4}" srcOrd="0" destOrd="0" parTransId="{9A76491C-7631-4D1F-B18C-EE2DFB733FDE}" sibTransId="{07540662-92C3-4634-BCE4-54A1B08936C1}"/>
+    <dgm:cxn modelId="{4F7542DE-F782-4C73-A760-15241FA2EC4B}" srcId="{2196DF3C-D567-4AB5-A162-D967C840CB4E}" destId="{3C2AB616-AE22-439F-B0F6-8D90F3836DD1}" srcOrd="6" destOrd="0" parTransId="{0D3C7551-760B-4D45-83D5-E0D95346411F}" sibTransId="{21CE3CF5-3739-4F78-9528-27B2D8509056}"/>
+    <dgm:cxn modelId="{4D56B75E-AD7E-4BE6-9A72-2ED564F69CCB}" srcId="{2196DF3C-D567-4AB5-A162-D967C840CB4E}" destId="{C26C2AD9-A528-4F9B-969A-43118F4F298B}" srcOrd="1" destOrd="0" parTransId="{9F95B028-C7A8-4474-84AC-7BC7304C4725}" sibTransId="{DC919697-34BA-4452-9B5E-6C6D2B8509BE}"/>
+    <dgm:cxn modelId="{C151B11C-4028-40C5-8054-8F6CD8B12281}" type="presOf" srcId="{9DCC3710-8ED8-4C9F-8B5D-1AD1F5FF024A}" destId="{7736769B-6095-487F-8966-2468C18C925E}" srcOrd="0" destOrd="3" presId="urn:microsoft.com/office/officeart/2005/8/layout/hList1"/>
+    <dgm:cxn modelId="{92D1E9D9-0E71-430A-AD81-D9DABF58D0F0}" srcId="{0AED848A-AFCB-466A-81AB-D89BE5FD014D}" destId="{9A2883D1-E9D6-4C2D-BBD0-FB1F001515DA}" srcOrd="2" destOrd="0" parTransId="{C4BBA833-6254-42BC-AA7E-1A60E5C0A1CE}" sibTransId="{1F0286B5-CE28-4E67-B231-9DE30FF40E33}"/>
+    <dgm:cxn modelId="{86F62A60-801A-41F3-9A2C-DE8F3A445776}" srcId="{2196DF3C-D567-4AB5-A162-D967C840CB4E}" destId="{9DCC3710-8ED8-4C9F-8B5D-1AD1F5FF024A}" srcOrd="3" destOrd="0" parTransId="{E2825FA9-EAC1-46E6-9BAC-1C56ECCE1C86}" sibTransId="{287CF478-D85A-4D61-8C40-6F64BB738635}"/>
+    <dgm:cxn modelId="{AE27096E-840F-4BE5-B10A-B5EB39EA547C}" type="presOf" srcId="{0248731D-9C85-450C-835E-2A0502E35468}" destId="{7736769B-6095-487F-8966-2468C18C925E}" srcOrd="0" destOrd="4" presId="urn:microsoft.com/office/officeart/2005/8/layout/hList1"/>
+    <dgm:cxn modelId="{96EEDC84-FEC9-41C1-BEED-7B31BE60C7C4}" srcId="{2196DF3C-D567-4AB5-A162-D967C840CB4E}" destId="{AB3E949C-DB19-4D4D-B050-1D4C7754295A}" srcOrd="2" destOrd="0" parTransId="{6CE188ED-B656-411E-B0B4-D621F73D663B}" sibTransId="{4141B92E-A255-4C64-9352-4E2FB7C0C57B}"/>
+    <dgm:cxn modelId="{D674D114-65DF-4B5F-AEC7-1CF93118FFCC}" srcId="{2196DF3C-D567-4AB5-A162-D967C840CB4E}" destId="{AC9C7364-A705-4DC4-9368-68A0CE20653C}" srcOrd="5" destOrd="0" parTransId="{76FF5E42-5241-46E6-8520-CDD19C331025}" sibTransId="{9AB0161A-6CB1-46B0-B8B6-B00305E4B384}"/>
     <dgm:cxn modelId="{3E13F380-507B-4BB4-975D-7D0A04BEF814}" type="presOf" srcId="{C26C2AD9-A528-4F9B-969A-43118F4F298B}" destId="{7736769B-6095-487F-8966-2468C18C925E}" srcOrd="0" destOrd="1" presId="urn:microsoft.com/office/officeart/2005/8/layout/hList1"/>
-    <dgm:cxn modelId="{85321FAA-FE40-4308-BFB4-8D17F0FCFC00}" srcId="{0AED848A-AFCB-466A-81AB-D89BE5FD014D}" destId="{30900A70-273C-4C8F-8FEB-C138551CE7A3}" srcOrd="3" destOrd="0" parTransId="{C0A20453-1F39-4CEC-8053-637EC2392930}" sibTransId="{6874EC8C-FA52-4998-A595-6F082B1BB46F}"/>
-    <dgm:cxn modelId="{A1AB493E-A865-453F-8CEA-5AAD6551D2EF}" type="presOf" srcId="{AC9C7364-A705-4DC4-9368-68A0CE20653C}" destId="{7736769B-6095-487F-8966-2468C18C925E}" srcOrd="0" destOrd="5" presId="urn:microsoft.com/office/officeart/2005/8/layout/hList1"/>
-    <dgm:cxn modelId="{430EAE9E-EDEA-48FE-9700-82D2C67D85FC}" type="presOf" srcId="{2196DF3C-D567-4AB5-A162-D967C840CB4E}" destId="{2C44EDDA-45AE-42AA-BE3F-2E6913EF3107}" srcOrd="0" destOrd="0" presId="urn:microsoft.com/office/officeart/2005/8/layout/hList1"/>
-    <dgm:cxn modelId="{D674D114-65DF-4B5F-AEC7-1CF93118FFCC}" srcId="{2196DF3C-D567-4AB5-A162-D967C840CB4E}" destId="{AC9C7364-A705-4DC4-9368-68A0CE20653C}" srcOrd="5" destOrd="0" parTransId="{76FF5E42-5241-46E6-8520-CDD19C331025}" sibTransId="{9AB0161A-6CB1-46B0-B8B6-B00305E4B384}"/>
-    <dgm:cxn modelId="{7E97EA7C-956C-4335-8217-1A089EB77C57}" type="presOf" srcId="{E773193F-7716-42E4-A234-422B133A95A4}" destId="{7736769B-6095-487F-8966-2468C18C925E}" srcOrd="0" destOrd="0" presId="urn:microsoft.com/office/officeart/2005/8/layout/hList1"/>
-    <dgm:cxn modelId="{6A694266-9F84-4EB3-ACFC-CD73123F203E}" type="presOf" srcId="{30900A70-273C-4C8F-8FEB-C138551CE7A3}" destId="{48A9371C-3646-4CAD-ADE7-4E185081914F}" srcOrd="0" destOrd="3" presId="urn:microsoft.com/office/officeart/2005/8/layout/hList1"/>
-    <dgm:cxn modelId="{4F7542DE-F782-4C73-A760-15241FA2EC4B}" srcId="{2196DF3C-D567-4AB5-A162-D967C840CB4E}" destId="{3C2AB616-AE22-439F-B0F6-8D90F3836DD1}" srcOrd="6" destOrd="0" parTransId="{0D3C7551-760B-4D45-83D5-E0D95346411F}" sibTransId="{21CE3CF5-3739-4F78-9528-27B2D8509056}"/>
-    <dgm:cxn modelId="{A8C380FD-B8A7-47CB-A7BC-522512571ACD}" type="presOf" srcId="{CD120676-85BC-4A82-9F25-1FDA0DE25F04}" destId="{8F795E57-0498-40D2-9A19-C37BF24E6A19}" srcOrd="0" destOrd="0" presId="urn:microsoft.com/office/officeart/2005/8/layout/hList1"/>
-    <dgm:cxn modelId="{78DD48A6-9230-459D-B796-78803502450C}" srcId="{0AED848A-AFCB-466A-81AB-D89BE5FD014D}" destId="{955FAFFD-9AEA-4FB6-BF33-BA2BD4A0C486}" srcOrd="0" destOrd="0" parTransId="{05767C33-157D-40E2-837E-42B88AAC2251}" sibTransId="{AFF68820-E08F-4D0A-B5CD-2DB9FBB974E3}"/>
     <dgm:cxn modelId="{41345DF9-107F-4E5F-BC33-FDB85E6A480B}" srcId="{CD120676-85BC-4A82-9F25-1FDA0DE25F04}" destId="{0AED848A-AFCB-466A-81AB-D89BE5FD014D}" srcOrd="0" destOrd="0" parTransId="{F6A9EDC1-43AC-44AF-BA00-64CD7F30F867}" sibTransId="{FFD9F7B8-3D61-41DC-B9B9-115B2C07A505}"/>
-    <dgm:cxn modelId="{5BB75260-EED0-4D48-B823-87E9C3B93482}" type="presOf" srcId="{08072536-33EC-4AA1-BEDC-F57BADE9E028}" destId="{48A9371C-3646-4CAD-ADE7-4E185081914F}" srcOrd="0" destOrd="1" presId="urn:microsoft.com/office/officeart/2005/8/layout/hList1"/>
-    <dgm:cxn modelId="{96EEDC84-FEC9-41C1-BEED-7B31BE60C7C4}" srcId="{2196DF3C-D567-4AB5-A162-D967C840CB4E}" destId="{AB3E949C-DB19-4D4D-B050-1D4C7754295A}" srcOrd="2" destOrd="0" parTransId="{6CE188ED-B656-411E-B0B4-D621F73D663B}" sibTransId="{4141B92E-A255-4C64-9352-4E2FB7C0C57B}"/>
     <dgm:cxn modelId="{BFFCD269-952D-4B12-9346-BBB061808553}" type="presOf" srcId="{955FAFFD-9AEA-4FB6-BF33-BA2BD4A0C486}" destId="{48A9371C-3646-4CAD-ADE7-4E185081914F}" srcOrd="0" destOrd="0" presId="urn:microsoft.com/office/officeart/2005/8/layout/hList1"/>
-    <dgm:cxn modelId="{AE27096E-840F-4BE5-B10A-B5EB39EA547C}" type="presOf" srcId="{0248731D-9C85-450C-835E-2A0502E35468}" destId="{7736769B-6095-487F-8966-2468C18C925E}" srcOrd="0" destOrd="4" presId="urn:microsoft.com/office/officeart/2005/8/layout/hList1"/>
-    <dgm:cxn modelId="{86F62A60-801A-41F3-9A2C-DE8F3A445776}" srcId="{2196DF3C-D567-4AB5-A162-D967C840CB4E}" destId="{9DCC3710-8ED8-4C9F-8B5D-1AD1F5FF024A}" srcOrd="3" destOrd="0" parTransId="{E2825FA9-EAC1-46E6-9BAC-1C56ECCE1C86}" sibTransId="{287CF478-D85A-4D61-8C40-6F64BB738635}"/>
-    <dgm:cxn modelId="{AFB7A0DE-F55F-461C-B74B-4517CB951790}" srcId="{0AED848A-AFCB-466A-81AB-D89BE5FD014D}" destId="{08072536-33EC-4AA1-BEDC-F57BADE9E028}" srcOrd="1" destOrd="0" parTransId="{1CE741D5-7B39-4588-8958-2D74000E77BE}" sibTransId="{0783A652-1676-42EA-8275-EF166CBBCB4D}"/>
-    <dgm:cxn modelId="{027B7AC1-6CAF-48BE-AC70-9CE15EEE18F1}" type="presOf" srcId="{AB3E949C-DB19-4D4D-B050-1D4C7754295A}" destId="{7736769B-6095-487F-8966-2468C18C925E}" srcOrd="0" destOrd="2" presId="urn:microsoft.com/office/officeart/2005/8/layout/hList1"/>
-    <dgm:cxn modelId="{DA3199D3-E1ED-4BC8-927E-25C57AE646DE}" type="presOf" srcId="{9A2883D1-E9D6-4C2D-BBD0-FB1F001515DA}" destId="{48A9371C-3646-4CAD-ADE7-4E185081914F}" srcOrd="0" destOrd="2" presId="urn:microsoft.com/office/officeart/2005/8/layout/hList1"/>
-    <dgm:cxn modelId="{C151B11C-4028-40C5-8054-8F6CD8B12281}" type="presOf" srcId="{9DCC3710-8ED8-4C9F-8B5D-1AD1F5FF024A}" destId="{7736769B-6095-487F-8966-2468C18C925E}" srcOrd="0" destOrd="3" presId="urn:microsoft.com/office/officeart/2005/8/layout/hList1"/>
-    <dgm:cxn modelId="{454EC06D-0D63-43E9-8A6C-8C1EA34B8F35}" type="presOf" srcId="{38B8CC04-713E-468D-A597-2CE4B417A744}" destId="{48A9371C-3646-4CAD-ADE7-4E185081914F}" srcOrd="0" destOrd="4" presId="urn:microsoft.com/office/officeart/2005/8/layout/hList1"/>
-    <dgm:cxn modelId="{B9E78E07-D466-4364-8A47-E3056D341748}" type="presOf" srcId="{0AED848A-AFCB-466A-81AB-D89BE5FD014D}" destId="{AF1BC4C8-3356-49E2-824E-28E5FED7B48E}" srcOrd="0" destOrd="0" presId="urn:microsoft.com/office/officeart/2005/8/layout/hList1"/>
-    <dgm:cxn modelId="{4D56B75E-AD7E-4BE6-9A72-2ED564F69CCB}" srcId="{2196DF3C-D567-4AB5-A162-D967C840CB4E}" destId="{C26C2AD9-A528-4F9B-969A-43118F4F298B}" srcOrd="1" destOrd="0" parTransId="{9F95B028-C7A8-4474-84AC-7BC7304C4725}" sibTransId="{DC919697-34BA-4452-9B5E-6C6D2B8509BE}"/>
-    <dgm:cxn modelId="{92D1E9D9-0E71-430A-AD81-D9DABF58D0F0}" srcId="{0AED848A-AFCB-466A-81AB-D89BE5FD014D}" destId="{9A2883D1-E9D6-4C2D-BBD0-FB1F001515DA}" srcOrd="2" destOrd="0" parTransId="{C4BBA833-6254-42BC-AA7E-1A60E5C0A1CE}" sibTransId="{1F0286B5-CE28-4E67-B231-9DE30FF40E33}"/>
     <dgm:cxn modelId="{BA36A4E7-0E11-4593-93F3-565053C12B64}" type="presParOf" srcId="{8F795E57-0498-40D2-9A19-C37BF24E6A19}" destId="{A69F4AB8-3A23-489E-9BF0-43795CB9C29D}" srcOrd="0" destOrd="0" presId="urn:microsoft.com/office/officeart/2005/8/layout/hList1"/>
     <dgm:cxn modelId="{BAA6CE2F-ACFE-4892-8F13-965BDEC62BAC}" type="presParOf" srcId="{A69F4AB8-3A23-489E-9BF0-43795CB9C29D}" destId="{AF1BC4C8-3356-49E2-824E-28E5FED7B48E}" srcOrd="0" destOrd="0" presId="urn:microsoft.com/office/officeart/2005/8/layout/hList1"/>
     <dgm:cxn modelId="{66643074-202D-4008-89B3-E70878FCB42D}" type="presParOf" srcId="{A69F4AB8-3A23-489E-9BF0-43795CB9C29D}" destId="{48A9371C-3646-4CAD-ADE7-4E185081914F}" srcOrd="1" destOrd="0" presId="urn:microsoft.com/office/officeart/2005/8/layout/hList1"/>
@@ -3553,6 +3559,13 @@
         </dgm:presLayoutVars>
       </dgm:prSet>
       <dgm:spPr/>
+      <dgm:t>
+        <a:bodyPr/>
+        <a:lstStyle/>
+        <a:p>
+          <a:endParaRPr lang="zh-CN" altLang="en-US"/>
+        </a:p>
+      </dgm:t>
     </dgm:pt>
     <dgm:pt modelId="{CBD22899-FFD1-411A-815E-6D3212E0FF8A}" type="pres">
       <dgm:prSet presAssocID="{44070902-9443-4306-917D-2715091E9453}" presName="composite" presStyleCnt="0"/>
@@ -3567,6 +3580,13 @@
         </dgm:presLayoutVars>
       </dgm:prSet>
       <dgm:spPr/>
+      <dgm:t>
+        <a:bodyPr/>
+        <a:lstStyle/>
+        <a:p>
+          <a:endParaRPr lang="zh-CN" altLang="en-US"/>
+        </a:p>
+      </dgm:t>
     </dgm:pt>
     <dgm:pt modelId="{E7552139-153F-4C6C-9444-4117D60E12FE}" type="pres">
       <dgm:prSet presAssocID="{44070902-9443-4306-917D-2715091E9453}" presName="desTx" presStyleLbl="alignAccFollowNode1" presStyleIdx="0" presStyleCnt="2">
@@ -3600,6 +3620,13 @@
         </dgm:presLayoutVars>
       </dgm:prSet>
       <dgm:spPr/>
+      <dgm:t>
+        <a:bodyPr/>
+        <a:lstStyle/>
+        <a:p>
+          <a:endParaRPr lang="zh-CN" altLang="en-US"/>
+        </a:p>
+      </dgm:t>
     </dgm:pt>
     <dgm:pt modelId="{74B73F72-768B-4B79-93A3-A13EDA92881E}" type="pres">
       <dgm:prSet presAssocID="{73DF610E-9D27-4E25-BABA-B7F8735C4C28}" presName="desTx" presStyleLbl="alignAccFollowNode1" presStyleIdx="1" presStyleCnt="2">
@@ -3618,27 +3645,27 @@
     </dgm:pt>
   </dgm:ptLst>
   <dgm:cxnLst>
-    <dgm:cxn modelId="{F4E31CAC-AA31-461E-869D-F9349EAD2DAF}" type="presOf" srcId="{01EF7A17-8B5B-438F-A417-3CE41A9EC805}" destId="{74B73F72-768B-4B79-93A3-A13EDA92881E}" srcOrd="0" destOrd="2" presId="urn:microsoft.com/office/officeart/2005/8/layout/hList1"/>
-    <dgm:cxn modelId="{E31F703E-5945-4B74-86F9-46FA046718CD}" srcId="{821E7E03-9233-4405-AC96-75D4C4FA8DF6}" destId="{44070902-9443-4306-917D-2715091E9453}" srcOrd="0" destOrd="0" parTransId="{960A01EC-1C0F-4AB1-A996-CC845A0B73A8}" sibTransId="{240D90AD-E72B-45CC-BBD3-44BFFDDE8311}"/>
+    <dgm:cxn modelId="{D648176A-E255-4437-8270-D7F3A5A899DF}" type="presOf" srcId="{E07A6D00-1DED-4665-A52B-31BF15364BE6}" destId="{74B73F72-768B-4B79-93A3-A13EDA92881E}" srcOrd="0" destOrd="1" presId="urn:microsoft.com/office/officeart/2005/8/layout/hList1"/>
+    <dgm:cxn modelId="{9EE8D642-A43A-48F5-9B2C-1C1B52C0A302}" type="presOf" srcId="{3751EA71-93C9-4A6E-B830-09C5DC4294F0}" destId="{E7552139-153F-4C6C-9444-4117D60E12FE}" srcOrd="0" destOrd="0" presId="urn:microsoft.com/office/officeart/2005/8/layout/hList1"/>
+    <dgm:cxn modelId="{39B6BA6D-F302-4027-A8A4-70875E624C64}" type="presOf" srcId="{D140E1A9-3A45-4ABD-9E41-B31513445AB0}" destId="{E7552139-153F-4C6C-9444-4117D60E12FE}" srcOrd="0" destOrd="1" presId="urn:microsoft.com/office/officeart/2005/8/layout/hList1"/>
     <dgm:cxn modelId="{D725E115-DB26-456E-A423-53C123756030}" srcId="{73DF610E-9D27-4E25-BABA-B7F8735C4C28}" destId="{E07A6D00-1DED-4665-A52B-31BF15364BE6}" srcOrd="1" destOrd="0" parTransId="{7AE530AC-D8E4-4D8A-86DC-5435229890B8}" sibTransId="{F85CA847-E65E-4800-8128-31CA48B7A3B3}"/>
-    <dgm:cxn modelId="{725EB618-8C16-408C-AC64-EC24A8817CB0}" type="presOf" srcId="{73DF610E-9D27-4E25-BABA-B7F8735C4C28}" destId="{E99A1574-8152-4D77-BC8E-9938220F8C7C}" srcOrd="0" destOrd="0" presId="urn:microsoft.com/office/officeart/2005/8/layout/hList1"/>
-    <dgm:cxn modelId="{87F945F0-EB06-44FE-A5BE-8B983E84AE8C}" type="presOf" srcId="{F7330D72-5389-4939-A14D-E1D825006FFA}" destId="{74B73F72-768B-4B79-93A3-A13EDA92881E}" srcOrd="0" destOrd="3" presId="urn:microsoft.com/office/officeart/2005/8/layout/hList1"/>
     <dgm:cxn modelId="{91E61014-D843-4A8B-919A-BE8209D2004E}" srcId="{73DF610E-9D27-4E25-BABA-B7F8735C4C28}" destId="{F7330D72-5389-4939-A14D-E1D825006FFA}" srcOrd="3" destOrd="0" parTransId="{8C571457-E8DC-4D62-84C9-F82C6A5FBE0A}" sibTransId="{415E8622-AEB4-4EFB-BDC6-10802BD9D1F9}"/>
-    <dgm:cxn modelId="{F6ADA4C6-FA3B-46A9-A303-0B0E3AC55DC3}" type="presOf" srcId="{9B0CDC03-4200-44EF-8333-EA478BB2C5E9}" destId="{E7552139-153F-4C6C-9444-4117D60E12FE}" srcOrd="0" destOrd="2" presId="urn:microsoft.com/office/officeart/2005/8/layout/hList1"/>
-    <dgm:cxn modelId="{D648176A-E255-4437-8270-D7F3A5A899DF}" type="presOf" srcId="{E07A6D00-1DED-4665-A52B-31BF15364BE6}" destId="{74B73F72-768B-4B79-93A3-A13EDA92881E}" srcOrd="0" destOrd="1" presId="urn:microsoft.com/office/officeart/2005/8/layout/hList1"/>
-    <dgm:cxn modelId="{7B9B52CC-E51C-4809-B9EC-628E71C89A85}" srcId="{44070902-9443-4306-917D-2715091E9453}" destId="{D140E1A9-3A45-4ABD-9E41-B31513445AB0}" srcOrd="1" destOrd="0" parTransId="{7575805B-5BAD-47F2-B013-D24191511330}" sibTransId="{912B8927-9A8D-4A75-9D47-A5F7B324E0D9}"/>
-    <dgm:cxn modelId="{9EE8D642-A43A-48F5-9B2C-1C1B52C0A302}" type="presOf" srcId="{3751EA71-93C9-4A6E-B830-09C5DC4294F0}" destId="{E7552139-153F-4C6C-9444-4117D60E12FE}" srcOrd="0" destOrd="0" presId="urn:microsoft.com/office/officeart/2005/8/layout/hList1"/>
-    <dgm:cxn modelId="{03703604-E1D0-4B48-BEBF-50D6FF6615E7}" type="presOf" srcId="{44070902-9443-4306-917D-2715091E9453}" destId="{D5B249F9-4313-4328-A815-02AA4685A3D7}" srcOrd="0" destOrd="0" presId="urn:microsoft.com/office/officeart/2005/8/layout/hList1"/>
-    <dgm:cxn modelId="{11EB7669-1B7B-4BE2-82FD-1FB80E4F9B54}" type="presOf" srcId="{C036FF39-57D4-47AE-8684-96ED31B646A4}" destId="{74B73F72-768B-4B79-93A3-A13EDA92881E}" srcOrd="0" destOrd="0" presId="urn:microsoft.com/office/officeart/2005/8/layout/hList1"/>
-    <dgm:cxn modelId="{D9C68955-D43E-4ADE-89AE-785C92336456}" srcId="{821E7E03-9233-4405-AC96-75D4C4FA8DF6}" destId="{73DF610E-9D27-4E25-BABA-B7F8735C4C28}" srcOrd="1" destOrd="0" parTransId="{67191E71-7A76-4592-A056-F4EF6ADC09AF}" sibTransId="{221C7BEB-09DC-4ABB-BB9B-208776F7F26A}"/>
-    <dgm:cxn modelId="{C1954BB0-A533-4150-AFC8-275A52880949}" type="presOf" srcId="{821E7E03-9233-4405-AC96-75D4C4FA8DF6}" destId="{988C0500-8E27-4C3C-908E-8F49B0EEA88B}" srcOrd="0" destOrd="0" presId="urn:microsoft.com/office/officeart/2005/8/layout/hList1"/>
+    <dgm:cxn modelId="{183BD491-7617-4D25-A269-78D0D4DE95B4}" srcId="{73DF610E-9D27-4E25-BABA-B7F8735C4C28}" destId="{01EF7A17-8B5B-438F-A417-3CE41A9EC805}" srcOrd="2" destOrd="0" parTransId="{C225130E-1737-4A5A-8D52-52F036DE987A}" sibTransId="{6A9FA2E4-628A-4515-862B-23542DFF03D2}"/>
     <dgm:cxn modelId="{EAB38DBA-792F-4904-959B-375A58025B07}" srcId="{44070902-9443-4306-917D-2715091E9453}" destId="{57FA0DD5-EE4C-401F-8CB6-3201C269C257}" srcOrd="3" destOrd="0" parTransId="{6B5D2C3F-9433-4163-9ED3-574EBF713480}" sibTransId="{4874818E-B8CB-447B-93FD-D46C65EFFC67}"/>
     <dgm:cxn modelId="{A41A747D-A935-42A1-82BB-404875EAA421}" type="presOf" srcId="{57FA0DD5-EE4C-401F-8CB6-3201C269C257}" destId="{E7552139-153F-4C6C-9444-4117D60E12FE}" srcOrd="0" destOrd="3" presId="urn:microsoft.com/office/officeart/2005/8/layout/hList1"/>
-    <dgm:cxn modelId="{183BD491-7617-4D25-A269-78D0D4DE95B4}" srcId="{73DF610E-9D27-4E25-BABA-B7F8735C4C28}" destId="{01EF7A17-8B5B-438F-A417-3CE41A9EC805}" srcOrd="2" destOrd="0" parTransId="{C225130E-1737-4A5A-8D52-52F036DE987A}" sibTransId="{6A9FA2E4-628A-4515-862B-23542DFF03D2}"/>
+    <dgm:cxn modelId="{C1954BB0-A533-4150-AFC8-275A52880949}" type="presOf" srcId="{821E7E03-9233-4405-AC96-75D4C4FA8DF6}" destId="{988C0500-8E27-4C3C-908E-8F49B0EEA88B}" srcOrd="0" destOrd="0" presId="urn:microsoft.com/office/officeart/2005/8/layout/hList1"/>
+    <dgm:cxn modelId="{17EC8E94-836E-4B00-97C0-66EF8A833597}" srcId="{44070902-9443-4306-917D-2715091E9453}" destId="{3751EA71-93C9-4A6E-B830-09C5DC4294F0}" srcOrd="0" destOrd="0" parTransId="{B17061E6-D908-4088-A27F-BF27D7BA3421}" sibTransId="{92F6563A-BB17-4AA7-9740-BF30537162EE}"/>
+    <dgm:cxn modelId="{87F945F0-EB06-44FE-A5BE-8B983E84AE8C}" type="presOf" srcId="{F7330D72-5389-4939-A14D-E1D825006FFA}" destId="{74B73F72-768B-4B79-93A3-A13EDA92881E}" srcOrd="0" destOrd="3" presId="urn:microsoft.com/office/officeart/2005/8/layout/hList1"/>
+    <dgm:cxn modelId="{D44E9288-06C6-4656-B4C8-120220CC1755}" srcId="{44070902-9443-4306-917D-2715091E9453}" destId="{9B0CDC03-4200-44EF-8333-EA478BB2C5E9}" srcOrd="2" destOrd="0" parTransId="{E2A8F8A2-B27F-4950-9030-31648FF68340}" sibTransId="{E872AD98-0827-4F2B-8A78-4665E452DEBA}"/>
+    <dgm:cxn modelId="{F4E31CAC-AA31-461E-869D-F9349EAD2DAF}" type="presOf" srcId="{01EF7A17-8B5B-438F-A417-3CE41A9EC805}" destId="{74B73F72-768B-4B79-93A3-A13EDA92881E}" srcOrd="0" destOrd="2" presId="urn:microsoft.com/office/officeart/2005/8/layout/hList1"/>
+    <dgm:cxn modelId="{725EB618-8C16-408C-AC64-EC24A8817CB0}" type="presOf" srcId="{73DF610E-9D27-4E25-BABA-B7F8735C4C28}" destId="{E99A1574-8152-4D77-BC8E-9938220F8C7C}" srcOrd="0" destOrd="0" presId="urn:microsoft.com/office/officeart/2005/8/layout/hList1"/>
+    <dgm:cxn modelId="{F6ADA4C6-FA3B-46A9-A303-0B0E3AC55DC3}" type="presOf" srcId="{9B0CDC03-4200-44EF-8333-EA478BB2C5E9}" destId="{E7552139-153F-4C6C-9444-4117D60E12FE}" srcOrd="0" destOrd="2" presId="urn:microsoft.com/office/officeart/2005/8/layout/hList1"/>
+    <dgm:cxn modelId="{03703604-E1D0-4B48-BEBF-50D6FF6615E7}" type="presOf" srcId="{44070902-9443-4306-917D-2715091E9453}" destId="{D5B249F9-4313-4328-A815-02AA4685A3D7}" srcOrd="0" destOrd="0" presId="urn:microsoft.com/office/officeart/2005/8/layout/hList1"/>
+    <dgm:cxn modelId="{7B9B52CC-E51C-4809-B9EC-628E71C89A85}" srcId="{44070902-9443-4306-917D-2715091E9453}" destId="{D140E1A9-3A45-4ABD-9E41-B31513445AB0}" srcOrd="1" destOrd="0" parTransId="{7575805B-5BAD-47F2-B013-D24191511330}" sibTransId="{912B8927-9A8D-4A75-9D47-A5F7B324E0D9}"/>
     <dgm:cxn modelId="{8E61C7A3-39F9-48B1-8E9C-723850083385}" srcId="{73DF610E-9D27-4E25-BABA-B7F8735C4C28}" destId="{C036FF39-57D4-47AE-8684-96ED31B646A4}" srcOrd="0" destOrd="0" parTransId="{745FD0A1-6584-464E-8430-7599155B3C7B}" sibTransId="{B620936B-BA17-4E46-A4A2-9E8CFD15E100}"/>
-    <dgm:cxn modelId="{39B6BA6D-F302-4027-A8A4-70875E624C64}" type="presOf" srcId="{D140E1A9-3A45-4ABD-9E41-B31513445AB0}" destId="{E7552139-153F-4C6C-9444-4117D60E12FE}" srcOrd="0" destOrd="1" presId="urn:microsoft.com/office/officeart/2005/8/layout/hList1"/>
-    <dgm:cxn modelId="{17EC8E94-836E-4B00-97C0-66EF8A833597}" srcId="{44070902-9443-4306-917D-2715091E9453}" destId="{3751EA71-93C9-4A6E-B830-09C5DC4294F0}" srcOrd="0" destOrd="0" parTransId="{B17061E6-D908-4088-A27F-BF27D7BA3421}" sibTransId="{92F6563A-BB17-4AA7-9740-BF30537162EE}"/>
-    <dgm:cxn modelId="{D44E9288-06C6-4656-B4C8-120220CC1755}" srcId="{44070902-9443-4306-917D-2715091E9453}" destId="{9B0CDC03-4200-44EF-8333-EA478BB2C5E9}" srcOrd="2" destOrd="0" parTransId="{E2A8F8A2-B27F-4950-9030-31648FF68340}" sibTransId="{E872AD98-0827-4F2B-8A78-4665E452DEBA}"/>
+    <dgm:cxn modelId="{D9C68955-D43E-4ADE-89AE-785C92336456}" srcId="{821E7E03-9233-4405-AC96-75D4C4FA8DF6}" destId="{73DF610E-9D27-4E25-BABA-B7F8735C4C28}" srcOrd="1" destOrd="0" parTransId="{67191E71-7A76-4592-A056-F4EF6ADC09AF}" sibTransId="{221C7BEB-09DC-4ABB-BB9B-208776F7F26A}"/>
+    <dgm:cxn modelId="{11EB7669-1B7B-4BE2-82FD-1FB80E4F9B54}" type="presOf" srcId="{C036FF39-57D4-47AE-8684-96ED31B646A4}" destId="{74B73F72-768B-4B79-93A3-A13EDA92881E}" srcOrd="0" destOrd="0" presId="urn:microsoft.com/office/officeart/2005/8/layout/hList1"/>
+    <dgm:cxn modelId="{E31F703E-5945-4B74-86F9-46FA046718CD}" srcId="{821E7E03-9233-4405-AC96-75D4C4FA8DF6}" destId="{44070902-9443-4306-917D-2715091E9453}" srcOrd="0" destOrd="0" parTransId="{960A01EC-1C0F-4AB1-A996-CC845A0B73A8}" sibTransId="{240D90AD-E72B-45CC-BBD3-44BFFDDE8311}"/>
     <dgm:cxn modelId="{96902A17-FF30-4E62-9D12-F1A3EE2C9857}" type="presParOf" srcId="{988C0500-8E27-4C3C-908E-8F49B0EEA88B}" destId="{CBD22899-FFD1-411A-815E-6D3212E0FF8A}" srcOrd="0" destOrd="0" presId="urn:microsoft.com/office/officeart/2005/8/layout/hList1"/>
     <dgm:cxn modelId="{4DF08A64-1569-4608-A19E-96FBE928EDBE}" type="presParOf" srcId="{CBD22899-FFD1-411A-815E-6D3212E0FF8A}" destId="{D5B249F9-4313-4328-A815-02AA4685A3D7}" srcOrd="0" destOrd="0" presId="urn:microsoft.com/office/officeart/2005/8/layout/hList1"/>
     <dgm:cxn modelId="{06D641F3-A0C7-40D3-82D6-91CCDAE8BACC}" type="presParOf" srcId="{CBD22899-FFD1-411A-815E-6D3212E0FF8A}" destId="{E7552139-153F-4C6C-9444-4117D60E12FE}" srcOrd="1" destOrd="0" presId="urn:microsoft.com/office/officeart/2005/8/layout/hList1"/>
@@ -4058,6 +4085,13 @@
         </dgm:presLayoutVars>
       </dgm:prSet>
       <dgm:spPr/>
+      <dgm:t>
+        <a:bodyPr/>
+        <a:lstStyle/>
+        <a:p>
+          <a:endParaRPr lang="zh-CN" altLang="en-US"/>
+        </a:p>
+      </dgm:t>
     </dgm:pt>
     <dgm:pt modelId="{362FB604-326F-4FEB-9A34-E66AF66C0E03}" type="pres">
       <dgm:prSet presAssocID="{371395D7-51F3-4C99-B70C-854159A0E818}" presName="levelTx" presStyleLbl="revTx" presStyleIdx="0" presStyleCnt="0">
@@ -4067,6 +4101,13 @@
         </dgm:presLayoutVars>
       </dgm:prSet>
       <dgm:spPr/>
+      <dgm:t>
+        <a:bodyPr/>
+        <a:lstStyle/>
+        <a:p>
+          <a:endParaRPr lang="zh-CN" altLang="en-US"/>
+        </a:p>
+      </dgm:t>
     </dgm:pt>
     <dgm:pt modelId="{6BD72734-56B3-450B-8932-A25E52F7F115}" type="pres">
       <dgm:prSet presAssocID="{CD1AAF62-93F4-48C2-AD78-ABE409E73F5E}" presName="Name8" presStyleCnt="0"/>
@@ -4080,6 +4121,13 @@
         </dgm:presLayoutVars>
       </dgm:prSet>
       <dgm:spPr/>
+      <dgm:t>
+        <a:bodyPr/>
+        <a:lstStyle/>
+        <a:p>
+          <a:endParaRPr lang="zh-CN" altLang="en-US"/>
+        </a:p>
+      </dgm:t>
     </dgm:pt>
     <dgm:pt modelId="{E47F5DB7-D505-4897-A030-CF0FDECE65DA}" type="pres">
       <dgm:prSet presAssocID="{CD1AAF62-93F4-48C2-AD78-ABE409E73F5E}" presName="levelTx" presStyleLbl="revTx" presStyleIdx="0" presStyleCnt="0">
@@ -4089,6 +4137,13 @@
         </dgm:presLayoutVars>
       </dgm:prSet>
       <dgm:spPr/>
+      <dgm:t>
+        <a:bodyPr/>
+        <a:lstStyle/>
+        <a:p>
+          <a:endParaRPr lang="zh-CN" altLang="en-US"/>
+        </a:p>
+      </dgm:t>
     </dgm:pt>
     <dgm:pt modelId="{05466076-5D81-4D2C-BE41-A8A45F736047}" type="pres">
       <dgm:prSet presAssocID="{F2432378-9BDE-487C-8ABA-9B701DE071EF}" presName="Name8" presStyleCnt="0"/>
@@ -4102,6 +4157,13 @@
         </dgm:presLayoutVars>
       </dgm:prSet>
       <dgm:spPr/>
+      <dgm:t>
+        <a:bodyPr/>
+        <a:lstStyle/>
+        <a:p>
+          <a:endParaRPr lang="zh-CN" altLang="en-US"/>
+        </a:p>
+      </dgm:t>
     </dgm:pt>
     <dgm:pt modelId="{83C24F0E-D9F2-428B-9B95-3E46D5633D47}" type="pres">
       <dgm:prSet presAssocID="{F2432378-9BDE-487C-8ABA-9B701DE071EF}" presName="levelTx" presStyleLbl="revTx" presStyleIdx="0" presStyleCnt="0">
@@ -4111,6 +4173,13 @@
         </dgm:presLayoutVars>
       </dgm:prSet>
       <dgm:spPr/>
+      <dgm:t>
+        <a:bodyPr/>
+        <a:lstStyle/>
+        <a:p>
+          <a:endParaRPr lang="zh-CN" altLang="en-US"/>
+        </a:p>
+      </dgm:t>
     </dgm:pt>
     <dgm:pt modelId="{5002F6C4-7698-4103-B165-2158D1A4244C}" type="pres">
       <dgm:prSet presAssocID="{74C326A8-9B2C-433B-9F85-3B83130348C5}" presName="Name8" presStyleCnt="0"/>
@@ -4124,6 +4193,13 @@
         </dgm:presLayoutVars>
       </dgm:prSet>
       <dgm:spPr/>
+      <dgm:t>
+        <a:bodyPr/>
+        <a:lstStyle/>
+        <a:p>
+          <a:endParaRPr lang="zh-CN" altLang="en-US"/>
+        </a:p>
+      </dgm:t>
     </dgm:pt>
     <dgm:pt modelId="{9734122C-7F06-4950-8A18-8E327016AEC6}" type="pres">
       <dgm:prSet presAssocID="{74C326A8-9B2C-433B-9F85-3B83130348C5}" presName="levelTx" presStyleLbl="revTx" presStyleIdx="0" presStyleCnt="0">
@@ -4133,6 +4209,13 @@
         </dgm:presLayoutVars>
       </dgm:prSet>
       <dgm:spPr/>
+      <dgm:t>
+        <a:bodyPr/>
+        <a:lstStyle/>
+        <a:p>
+          <a:endParaRPr lang="zh-CN" altLang="en-US"/>
+        </a:p>
+      </dgm:t>
     </dgm:pt>
     <dgm:pt modelId="{AB1568F7-5FD8-4EAB-AA8A-E45C21F881BE}" type="pres">
       <dgm:prSet presAssocID="{B1C3816C-5C88-4668-BC21-727783D0232A}" presName="Name8" presStyleCnt="0"/>
@@ -4146,6 +4229,13 @@
         </dgm:presLayoutVars>
       </dgm:prSet>
       <dgm:spPr/>
+      <dgm:t>
+        <a:bodyPr/>
+        <a:lstStyle/>
+        <a:p>
+          <a:endParaRPr lang="zh-CN" altLang="en-US"/>
+        </a:p>
+      </dgm:t>
     </dgm:pt>
     <dgm:pt modelId="{496E11B3-E6D6-45B1-9930-BB7864C9C2E1}" type="pres">
       <dgm:prSet presAssocID="{B1C3816C-5C88-4668-BC21-727783D0232A}" presName="levelTx" presStyleLbl="revTx" presStyleIdx="0" presStyleCnt="0">
@@ -4155,6 +4245,13 @@
         </dgm:presLayoutVars>
       </dgm:prSet>
       <dgm:spPr/>
+      <dgm:t>
+        <a:bodyPr/>
+        <a:lstStyle/>
+        <a:p>
+          <a:endParaRPr lang="zh-CN" altLang="en-US"/>
+        </a:p>
+      </dgm:t>
     </dgm:pt>
   </dgm:ptLst>
   <dgm:cxnLst>
@@ -9808,7 +9905,8 @@
           <a:p>
             <a:fld id="{156D85B6-0148-4422-89B3-46B664610A4A}" type="datetimeFigureOut">
               <a:rPr lang="zh-CN" altLang="en-US" smtClean="0"/>
-              <a:t>2015/12/19</a:t>
+              <a:pPr/>
+              <a:t>2016/2/21</a:t>
             </a:fld>
             <a:endParaRPr lang="zh-CN" altLang="en-US"/>
           </a:p>
@@ -9969,6 +10067,7 @@
           <a:p>
             <a:fld id="{D6D4E28E-FAC7-4B47-8F9D-48D5E2A9F965}" type="slidenum">
               <a:rPr lang="zh-CN" altLang="en-US" smtClean="0"/>
+              <a:pPr/>
               <a:t>‹#›</a:t>
             </a:fld>
             <a:endParaRPr lang="zh-CN" altLang="en-US"/>
@@ -10698,7 +10797,8 @@
           <a:p>
             <a:fld id="{CEA5D486-1117-4BED-BAF6-4BFF4269916E}" type="datetime1">
               <a:rPr lang="zh-CN" altLang="en-US" smtClean="0"/>
-              <a:t>2015/12/19</a:t>
+              <a:pPr/>
+              <a:t>2016/2/21</a:t>
             </a:fld>
             <a:endParaRPr lang="zh-CN" altLang="en-US"/>
           </a:p>
@@ -10895,7 +10995,8 @@
           <a:p>
             <a:fld id="{A71FC5A1-761A-4308-BD6B-326403E080CD}" type="datetime1">
               <a:rPr lang="zh-CN" altLang="en-US" smtClean="0"/>
-              <a:t>2015/12/19</a:t>
+              <a:pPr/>
+              <a:t>2016/2/21</a:t>
             </a:fld>
             <a:endParaRPr lang="zh-CN" altLang="en-US"/>
           </a:p>
@@ -11081,7 +11182,8 @@
           <a:p>
             <a:fld id="{8D3A9B24-97F4-4EE2-A44B-D23EA884538B}" type="datetime1">
               <a:rPr lang="zh-CN" altLang="en-US" smtClean="0"/>
-              <a:t>2015/12/19</a:t>
+              <a:pPr/>
+              <a:t>2016/2/21</a:t>
             </a:fld>
             <a:endParaRPr lang="zh-CN" altLang="en-US"/>
           </a:p>
@@ -11232,7 +11334,8 @@
           <a:p>
             <a:fld id="{5C90BBFB-3575-4A10-8500-5F80E07E5E59}" type="datetime1">
               <a:rPr lang="zh-CN" altLang="en-US" smtClean="0"/>
-              <a:t>2015/12/19</a:t>
+              <a:pPr/>
+              <a:t>2016/2/21</a:t>
             </a:fld>
             <a:endParaRPr lang="zh-CN" altLang="en-US"/>
           </a:p>
@@ -11488,7 +11591,8 @@
           <a:p>
             <a:fld id="{3B70A26D-2D0B-4864-951D-E7F2642ED513}" type="datetime1">
               <a:rPr lang="zh-CN" altLang="en-US" smtClean="0"/>
-              <a:t>2015/12/19</a:t>
+              <a:pPr/>
+              <a:t>2016/2/21</a:t>
             </a:fld>
             <a:endParaRPr lang="zh-CN" altLang="en-US"/>
           </a:p>
@@ -11898,7 +12002,8 @@
           <a:p>
             <a:fld id="{C39F596E-3A4D-47A1-9757-C892432C17C7}" type="datetime1">
               <a:rPr lang="zh-CN" altLang="en-US" smtClean="0"/>
-              <a:t>2015/12/19</a:t>
+              <a:pPr/>
+              <a:t>2016/2/21</a:t>
             </a:fld>
             <a:endParaRPr lang="zh-CN" altLang="en-US"/>
           </a:p>
@@ -12345,7 +12450,8 @@
           <a:p>
             <a:fld id="{9385F7E3-3F13-4B36-B9DC-9FD8C6D4BBC2}" type="datetime1">
               <a:rPr lang="zh-CN" altLang="en-US" smtClean="0"/>
-              <a:t>2015/12/19</a:t>
+              <a:pPr/>
+              <a:t>2016/2/21</a:t>
             </a:fld>
             <a:endParaRPr lang="zh-CN" altLang="en-US"/>
           </a:p>
@@ -12447,7 +12553,8 @@
           <a:p>
             <a:fld id="{35D0F4C0-711E-497B-B62E-E81A21DB9DB3}" type="datetime1">
               <a:rPr lang="zh-CN" altLang="en-US" smtClean="0"/>
-              <a:t>2015/12/19</a:t>
+              <a:pPr/>
+              <a:t>2016/2/21</a:t>
             </a:fld>
             <a:endParaRPr lang="zh-CN" altLang="en-US"/>
           </a:p>
@@ -12569,7 +12676,8 @@
           <a:p>
             <a:fld id="{1C3C145A-B42E-4B9C-984E-E26179E786B1}" type="datetime1">
               <a:rPr lang="zh-CN" altLang="en-US" smtClean="0"/>
-              <a:t>2015/12/19</a:t>
+              <a:pPr/>
+              <a:t>2016/2/21</a:t>
             </a:fld>
             <a:endParaRPr lang="zh-CN" altLang="en-US"/>
           </a:p>
@@ -12844,7 +12952,8 @@
           <a:p>
             <a:fld id="{4BDD6FD7-C5B3-485D-B9AC-A535C25FF803}" type="datetime1">
               <a:rPr lang="zh-CN" altLang="en-US" smtClean="0"/>
-              <a:t>2015/12/19</a:t>
+              <a:pPr/>
+              <a:t>2016/2/21</a:t>
             </a:fld>
             <a:endParaRPr lang="zh-CN" altLang="en-US"/>
           </a:p>
@@ -13050,7 +13159,8 @@
           <a:p>
             <a:fld id="{65779012-46BA-4B97-A4D2-7F919F3779B7}" type="datetime1">
               <a:rPr lang="zh-CN" altLang="en-US" smtClean="0"/>
-              <a:t>2015/12/19</a:t>
+              <a:pPr/>
+              <a:t>2016/2/21</a:t>
             </a:fld>
             <a:endParaRPr lang="zh-CN" altLang="en-US"/>
           </a:p>
@@ -14160,7 +14270,8 @@
           <a:p>
             <a:fld id="{DE35F055-2903-4FF6-8CA2-166743B1189B}" type="datetime1">
               <a:rPr lang="zh-CN" altLang="en-US" smtClean="0"/>
-              <a:t>2015/12/19</a:t>
+              <a:pPr/>
+              <a:t>2016/2/21</a:t>
             </a:fld>
             <a:endParaRPr lang="zh-CN" altLang="en-US"/>
           </a:p>
@@ -14769,7 +14880,8 @@
           <a:p>
             <a:fld id="{CFF764D2-8554-46E3-A7A9-1D574186CFA6}" type="datetime1">
               <a:rPr lang="zh-CN" altLang="en-US" smtClean="0"/>
-              <a:t>2015/12/19</a:t>
+              <a:pPr/>
+              <a:t>2016/2/21</a:t>
             </a:fld>
             <a:endParaRPr lang="zh-CN" altLang="en-US"/>
           </a:p>
@@ -16680,7 +16792,8 @@
           <a:p>
             <a:fld id="{AB7AD744-40CD-4F52-ADBE-EAA2D4C2C506}" type="datetime1">
               <a:rPr lang="zh-CN" altLang="en-US" smtClean="0"/>
-              <a:t>2015/12/19</a:t>
+              <a:pPr/>
+              <a:t>2016/2/21</a:t>
             </a:fld>
             <a:endParaRPr lang="zh-CN" altLang="en-US"/>
           </a:p>
@@ -17262,11 +17375,7 @@
             <a:pPr algn="ctr"/>
             <a:r>
               <a:rPr lang="zh-CN" altLang="en-US" dirty="0" smtClean="0"/>
-              <a:t>计算机网络</a:t>
-            </a:r>
-            <a:r>
-              <a:rPr lang="zh-CN" altLang="en-US" dirty="0" smtClean="0"/>
-              <a:t>技术二年级课程评价体系</a:t>
+              <a:t>计算机网络技术二年级课程评价体系</a:t>
             </a:r>
             <a:endParaRPr lang="zh-CN" altLang="en-US" dirty="0"/>
           </a:p>
@@ -17289,7 +17398,8 @@
           <a:p>
             <a:fld id="{A6565C5F-CB2F-409F-B41A-F127FF6E73B2}" type="datetime1">
               <a:rPr lang="zh-CN" altLang="en-US" smtClean="0"/>
-              <a:t>2015/12/19</a:t>
+              <a:pPr/>
+              <a:t>2016/2/21</a:t>
             </a:fld>
             <a:endParaRPr lang="zh-CN" altLang="en-US"/>
           </a:p>
@@ -17408,11 +17518,7 @@
           <a:p>
             <a:r>
               <a:rPr lang="zh-CN" altLang="en-US" dirty="0" smtClean="0"/>
-              <a:t>以实践为导向的</a:t>
-            </a:r>
-            <a:r>
-              <a:rPr lang="zh-CN" altLang="en-US" dirty="0" smtClean="0"/>
-              <a:t>教学</a:t>
+              <a:t>以实践为导向的教学</a:t>
             </a:r>
             <a:r>
               <a:rPr lang="en-US" altLang="zh-CN" dirty="0" smtClean="0"/>
@@ -17526,11 +17632,7 @@
             <a:pPr algn="ctr"/>
             <a:r>
               <a:rPr lang="zh-CN" altLang="en-US" sz="2400" dirty="0" smtClean="0"/>
-              <a:t>教师的</a:t>
-            </a:r>
-            <a:r>
-              <a:rPr lang="zh-CN" altLang="en-US" sz="2400" dirty="0" smtClean="0"/>
-              <a:t>角色：组织者参与者</a:t>
+              <a:t>教师的角色：组织者参与者</a:t>
             </a:r>
             <a:endParaRPr lang="zh-CN" altLang="en-US" sz="2400" dirty="0"/>
           </a:p>
@@ -17638,7 +17740,8 @@
           <a:p>
             <a:fld id="{145B1BDD-A46C-49E6-8171-83C3CA25E7DD}" type="datetime1">
               <a:rPr lang="zh-CN" altLang="en-US" smtClean="0"/>
-              <a:t>2015/12/19</a:t>
+              <a:pPr/>
+              <a:t>2016/2/21</a:t>
             </a:fld>
             <a:endParaRPr lang="zh-CN" altLang="en-US"/>
           </a:p>
@@ -17730,8 +17833,56 @@
                   </a:schemeClr>
                 </a:solidFill>
               </a:rPr>
-              <a:t>教师的行业</a:t>
-            </a:r>
+              <a:t>教师的行业背景</a:t>
+            </a:r>
+            <a:endParaRPr lang="en-US" altLang="zh-CN" dirty="0" smtClean="0">
+              <a:solidFill>
+                <a:schemeClr val="accent1">
+                  <a:lumMod val="75000"/>
+                </a:schemeClr>
+              </a:solidFill>
+            </a:endParaRPr>
+          </a:p>
+          <a:p>
+            <a:pPr lvl="1"/>
+            <a:r>
+              <a:rPr lang="en-US" altLang="zh-CN" dirty="0" smtClean="0"/>
+              <a:t>Chris Arsenault: </a:t>
+            </a:r>
+            <a:r>
+              <a:rPr lang="zh-CN" altLang="en-US" dirty="0" smtClean="0"/>
+              <a:t>负责</a:t>
+            </a:r>
+            <a:r>
+              <a:rPr lang="en-US" altLang="zh-CN" dirty="0" smtClean="0"/>
+              <a:t>Holland College</a:t>
+            </a:r>
+            <a:r>
+              <a:rPr lang="zh-CN" altLang="en-US" dirty="0" smtClean="0"/>
+              <a:t>多个园区的</a:t>
+            </a:r>
+            <a:r>
+              <a:rPr lang="en-US" altLang="zh-CN" dirty="0" smtClean="0"/>
+              <a:t>IT</a:t>
+            </a:r>
+            <a:r>
+              <a:rPr lang="zh-CN" altLang="en-US" dirty="0" smtClean="0"/>
+              <a:t>基础设施规划筹建工作，有多年的行业背景。与业界工程师有密切联系。</a:t>
+            </a:r>
+            <a:endParaRPr lang="en-US" altLang="zh-CN" dirty="0" smtClean="0"/>
+          </a:p>
+          <a:p>
+            <a:pPr lvl="1"/>
+            <a:r>
+              <a:rPr lang="en-US" altLang="zh-CN" dirty="0" smtClean="0"/>
+              <a:t>Rob Blanchard: </a:t>
+            </a:r>
+            <a:r>
+              <a:rPr lang="zh-CN" altLang="en-US" dirty="0" smtClean="0"/>
+              <a:t>多次带队参加国际技能大赛并获奖</a:t>
+            </a:r>
+          </a:p>
+          <a:p>
             <a:r>
               <a:rPr lang="zh-CN" altLang="en-US" dirty="0" smtClean="0">
                 <a:solidFill>
@@ -17740,7 +17891,7 @@
                   </a:schemeClr>
                 </a:solidFill>
               </a:rPr>
-              <a:t>背景</a:t>
+              <a:t>行业对专业及课程设置的影响</a:t>
             </a:r>
             <a:endParaRPr lang="en-US" altLang="zh-CN" dirty="0" smtClean="0">
               <a:solidFill>
@@ -17753,50 +17904,9 @@
           <a:p>
             <a:pPr lvl="1"/>
             <a:r>
-              <a:rPr lang="en-US" altLang="zh-CN" dirty="0" smtClean="0"/>
-              <a:t>Chris Arsenault: </a:t>
-            </a:r>
-            <a:r>
               <a:rPr lang="zh-CN" altLang="en-US" dirty="0" smtClean="0"/>
-              <a:t>负责</a:t>
-            </a:r>
-            <a:r>
-              <a:rPr lang="en-US" altLang="zh-CN" dirty="0" smtClean="0"/>
-              <a:t>Holland College</a:t>
-            </a:r>
-            <a:r>
-              <a:rPr lang="zh-CN" altLang="en-US" dirty="0" smtClean="0"/>
-              <a:t>多个</a:t>
-            </a:r>
-            <a:r>
-              <a:rPr lang="zh-CN" altLang="en-US" dirty="0" smtClean="0"/>
-              <a:t>园区</a:t>
-            </a:r>
-            <a:r>
-              <a:rPr lang="zh-CN" altLang="en-US" dirty="0" smtClean="0"/>
-              <a:t>的</a:t>
-            </a:r>
-            <a:r>
-              <a:rPr lang="en-US" altLang="zh-CN" dirty="0" smtClean="0"/>
-              <a:t>IT</a:t>
-            </a:r>
-            <a:r>
-              <a:rPr lang="zh-CN" altLang="en-US" dirty="0" smtClean="0"/>
-              <a:t>基础设施规划筹建工作，有多年的行业背景。与业界工程师有密切联系。</a:t>
-            </a:r>
-            <a:endParaRPr lang="en-US" altLang="zh-CN" dirty="0" smtClean="0"/>
-          </a:p>
-          <a:p>
-            <a:pPr lvl="1"/>
-            <a:r>
-              <a:rPr lang="en-US" altLang="zh-CN" dirty="0" smtClean="0"/>
-              <a:t>Rob Blanchard: </a:t>
-            </a:r>
-            <a:r>
-              <a:rPr lang="zh-CN" altLang="en-US" dirty="0" smtClean="0"/>
-              <a:t>多次带队参加国际技能大赛并获奖</a:t>
-            </a:r>
-            <a:endParaRPr lang="zh-CN" altLang="en-US" dirty="0" smtClean="0"/>
+              <a:t>行业专家组成的委员会与学院相关专业教师及课程设计专家每年进行定期会议，讨论课程的更新</a:t>
+            </a:r>
           </a:p>
           <a:p>
             <a:r>
@@ -17807,8 +17917,32 @@
                   </a:schemeClr>
                 </a:solidFill>
               </a:rPr>
-              <a:t>行业对专业及课程设置的</a:t>
-            </a:r>
+              <a:t>行业与学生就业的关系</a:t>
+            </a:r>
+            <a:endParaRPr lang="en-US" altLang="zh-CN" dirty="0" smtClean="0">
+              <a:solidFill>
+                <a:schemeClr val="accent1">
+                  <a:lumMod val="75000"/>
+                </a:schemeClr>
+              </a:solidFill>
+            </a:endParaRPr>
+          </a:p>
+          <a:p>
+            <a:pPr lvl="1"/>
+            <a:r>
+              <a:rPr lang="zh-CN" altLang="en-US" dirty="0" smtClean="0"/>
+              <a:t>实习</a:t>
+            </a:r>
+            <a:endParaRPr lang="en-US" altLang="zh-CN" dirty="0" smtClean="0"/>
+          </a:p>
+          <a:p>
+            <a:pPr lvl="1"/>
+            <a:r>
+              <a:rPr lang="zh-CN" altLang="en-US" dirty="0" smtClean="0"/>
+              <a:t>优秀学生的推荐</a:t>
+            </a:r>
+          </a:p>
+          <a:p>
             <a:r>
               <a:rPr lang="zh-CN" altLang="en-US" dirty="0" smtClean="0">
                 <a:solidFill>
@@ -17817,89 +17951,7 @@
                   </a:schemeClr>
                 </a:solidFill>
               </a:rPr>
-              <a:t>影响</a:t>
-            </a:r>
-            <a:endParaRPr lang="en-US" altLang="zh-CN" dirty="0" smtClean="0">
-              <a:solidFill>
-                <a:schemeClr val="accent1">
-                  <a:lumMod val="75000"/>
-                </a:schemeClr>
-              </a:solidFill>
-            </a:endParaRPr>
-          </a:p>
-          <a:p>
-            <a:pPr lvl="1"/>
-            <a:r>
-              <a:rPr lang="zh-CN" altLang="en-US" dirty="0" smtClean="0"/>
-              <a:t>行业专家组成的委员会与学院相关专业教师及课程设计专家每年进行定期会议，讨论课程的更新</a:t>
-            </a:r>
-            <a:endParaRPr lang="zh-CN" altLang="en-US" dirty="0" smtClean="0"/>
-          </a:p>
-          <a:p>
-            <a:r>
-              <a:rPr lang="zh-CN" altLang="en-US" dirty="0" smtClean="0">
-                <a:solidFill>
-                  <a:schemeClr val="accent1">
-                    <a:lumMod val="75000"/>
-                  </a:schemeClr>
-                </a:solidFill>
-              </a:rPr>
-              <a:t>行业与学生就业的</a:t>
-            </a:r>
-            <a:r>
-              <a:rPr lang="zh-CN" altLang="en-US" dirty="0" smtClean="0">
-                <a:solidFill>
-                  <a:schemeClr val="accent1">
-                    <a:lumMod val="75000"/>
-                  </a:schemeClr>
-                </a:solidFill>
-              </a:rPr>
-              <a:t>关系</a:t>
-            </a:r>
-            <a:endParaRPr lang="en-US" altLang="zh-CN" dirty="0" smtClean="0">
-              <a:solidFill>
-                <a:schemeClr val="accent1">
-                  <a:lumMod val="75000"/>
-                </a:schemeClr>
-              </a:solidFill>
-            </a:endParaRPr>
-          </a:p>
-          <a:p>
-            <a:pPr lvl="1"/>
-            <a:r>
-              <a:rPr lang="zh-CN" altLang="en-US" dirty="0" smtClean="0"/>
-              <a:t>实习</a:t>
-            </a:r>
-            <a:endParaRPr lang="en-US" altLang="zh-CN" dirty="0" smtClean="0"/>
-          </a:p>
-          <a:p>
-            <a:pPr lvl="1"/>
-            <a:r>
-              <a:rPr lang="zh-CN" altLang="en-US" dirty="0" smtClean="0"/>
-              <a:t>优秀学生的推荐</a:t>
-            </a:r>
-            <a:endParaRPr lang="zh-CN" altLang="en-US" dirty="0" smtClean="0"/>
-          </a:p>
-          <a:p>
-            <a:r>
-              <a:rPr lang="zh-CN" altLang="en-US" dirty="0" smtClean="0">
-                <a:solidFill>
-                  <a:schemeClr val="accent1">
-                    <a:lumMod val="75000"/>
-                  </a:schemeClr>
-                </a:solidFill>
-              </a:rPr>
-              <a:t>行业对学院办学条件的</a:t>
-            </a:r>
-            <a:r>
-              <a:rPr lang="zh-CN" altLang="en-US" dirty="0" smtClean="0">
-                <a:solidFill>
-                  <a:schemeClr val="accent1">
-                    <a:lumMod val="75000"/>
-                  </a:schemeClr>
-                </a:solidFill>
-              </a:rPr>
-              <a:t>支持</a:t>
+              <a:t>行业对学院办学条件的支持</a:t>
             </a:r>
             <a:endParaRPr lang="en-US" altLang="zh-CN" dirty="0" smtClean="0">
               <a:solidFill>
@@ -17966,7 +18018,8 @@
           <a:p>
             <a:fld id="{3D879017-49CE-413A-9ED3-1174CAA6D558}" type="datetime1">
               <a:rPr lang="zh-CN" altLang="en-US" smtClean="0"/>
-              <a:t>2015/12/19</a:t>
+              <a:pPr/>
+              <a:t>2016/2/21</a:t>
             </a:fld>
             <a:endParaRPr lang="zh-CN" altLang="en-US"/>
           </a:p>
@@ -18041,7 +18094,7 @@
         <p:spPr/>
         <p:txBody>
           <a:bodyPr>
-            <a:normAutofit fontScale="92500" lnSpcReduction="10000"/>
+            <a:normAutofit fontScale="85000" lnSpcReduction="20000"/>
           </a:bodyPr>
           <a:lstStyle/>
           <a:p>
@@ -18083,23 +18136,15 @@
             <a:pPr lvl="2"/>
             <a:r>
               <a:rPr lang="zh-CN" altLang="en-US" sz="2200" dirty="0" smtClean="0"/>
-              <a:t>事先</a:t>
-            </a:r>
+              <a:t>事先准备、派发资料</a:t>
+            </a:r>
+            <a:endParaRPr lang="en-US" altLang="zh-CN" sz="2200" dirty="0" smtClean="0"/>
+          </a:p>
+          <a:p>
+            <a:pPr lvl="2"/>
             <a:r>
               <a:rPr lang="zh-CN" altLang="en-US" sz="2200" dirty="0" smtClean="0"/>
-              <a:t>准备、派发资料</a:t>
-            </a:r>
-            <a:endParaRPr lang="en-US" altLang="zh-CN" sz="2200" dirty="0" smtClean="0"/>
-          </a:p>
-          <a:p>
-            <a:pPr lvl="2"/>
-            <a:r>
-              <a:rPr lang="zh-CN" altLang="en-US" sz="2200" dirty="0" smtClean="0"/>
-              <a:t>要解决的</a:t>
-            </a:r>
-            <a:r>
-              <a:rPr lang="zh-CN" altLang="en-US" sz="2200" dirty="0" smtClean="0"/>
-              <a:t>问题</a:t>
+              <a:t>要解决的问题</a:t>
             </a:r>
             <a:endParaRPr lang="en-US" altLang="zh-CN" sz="2200" dirty="0" smtClean="0"/>
           </a:p>
@@ -18120,12 +18165,48 @@
             <a:endParaRPr lang="en-US" altLang="zh-CN" sz="2400" dirty="0" smtClean="0"/>
           </a:p>
           <a:p>
+            <a:pPr lvl="2"/>
+            <a:r>
+              <a:rPr lang="zh-CN" altLang="en-US" sz="2200" dirty="0" smtClean="0"/>
+              <a:t>网络规划、布线、系统上线</a:t>
+            </a:r>
+            <a:endParaRPr lang="en-US" altLang="zh-CN" sz="2200" dirty="0" smtClean="0"/>
+          </a:p>
+          <a:p>
             <a:pPr lvl="1"/>
             <a:r>
               <a:rPr lang="zh-CN" altLang="en-US" sz="2400" dirty="0" smtClean="0"/>
               <a:t>专业工具的使用</a:t>
             </a:r>
-            <a:endParaRPr lang="zh-CN" altLang="zh-CN" sz="2400" dirty="0" smtClean="0"/>
+            <a:endParaRPr lang="en-US" altLang="zh-CN" sz="2400" dirty="0" smtClean="0"/>
+          </a:p>
+          <a:p>
+            <a:pPr lvl="2"/>
+            <a:r>
+              <a:rPr lang="en-US" altLang="zh-CN" sz="2200" dirty="0" err="1" smtClean="0"/>
+              <a:t>Nmap</a:t>
+            </a:r>
+            <a:r>
+              <a:rPr lang="en-US" altLang="zh-CN" sz="2200" dirty="0" smtClean="0"/>
+              <a:t>, </a:t>
+            </a:r>
+            <a:r>
+              <a:rPr lang="en-US" altLang="zh-CN" sz="2200" dirty="0" err="1" smtClean="0"/>
+              <a:t>Wireshark</a:t>
+            </a:r>
+            <a:r>
+              <a:rPr lang="en-US" altLang="zh-CN" sz="2200" dirty="0" smtClean="0"/>
+              <a:t>, </a:t>
+            </a:r>
+            <a:r>
+              <a:rPr lang="en-US" altLang="zh-CN" sz="2200" dirty="0" err="1" smtClean="0"/>
+              <a:t>Mindmaple</a:t>
+            </a:r>
+            <a:r>
+              <a:rPr lang="en-US" altLang="zh-CN" sz="2200" dirty="0" smtClean="0"/>
+              <a:t>...</a:t>
+            </a:r>
+            <a:endParaRPr lang="zh-CN" altLang="zh-CN" sz="2200" dirty="0" smtClean="0"/>
           </a:p>
           <a:p>
             <a:r>
@@ -18152,6 +18233,11 @@
               <a:rPr lang="en-US" altLang="zh-CN" sz="2400" dirty="0" smtClean="0"/>
               <a:t>Rob: </a:t>
             </a:r>
+            <a:r>
+              <a:rPr lang="zh-CN" altLang="en-US" sz="2400" dirty="0" smtClean="0"/>
+              <a:t>采用加拿大全国性通用的行业标准规范学生的报告撰写</a:t>
+            </a:r>
+            <a:endParaRPr lang="en-US" altLang="zh-CN" sz="2400" dirty="0" smtClean="0"/>
           </a:p>
           <a:p>
             <a:pPr lvl="1"/>
@@ -18201,6 +18287,14 @@
                 </a:schemeClr>
               </a:solidFill>
             </a:endParaRPr>
+          </a:p>
+          <a:p>
+            <a:pPr lvl="1"/>
+            <a:r>
+              <a:rPr lang="zh-CN" altLang="en-US" sz="2400" dirty="0" smtClean="0"/>
+              <a:t>言传身教</a:t>
+            </a:r>
+            <a:endParaRPr lang="en-US" altLang="zh-CN" sz="2400" dirty="0" smtClean="0"/>
           </a:p>
           <a:p>
             <a:pPr lvl="1"/>
@@ -18254,7 +18348,8 @@
           <a:p>
             <a:fld id="{8F59C018-2DEC-4B13-BB00-AD5A44BE6D51}" type="datetime1">
               <a:rPr lang="zh-CN" altLang="en-US" smtClean="0"/>
-              <a:t>2015/12/19</a:t>
+              <a:pPr/>
+              <a:t>2016/2/21</a:t>
             </a:fld>
             <a:endParaRPr lang="zh-CN" altLang="en-US"/>
           </a:p>
@@ -18844,7 +18939,7 @@
             <a:fld id="{0172824C-87FD-4CC6-8C25-40CD5F0CFD2E}" type="datetime1">
               <a:rPr lang="zh-CN" altLang="en-US" smtClean="0"/>
               <a:pPr algn="ctr"/>
-              <a:t>2015/12/19</a:t>
+              <a:t>2016/2/21</a:t>
             </a:fld>
             <a:endParaRPr lang="zh-CN" altLang="en-US" dirty="0"/>
           </a:p>
@@ -18890,144 +18985,6 @@
 </file>
 
 <file path=ppt/slides/slide17.xml><?xml version="1.0" encoding="utf-8"?>
-<p:sld xmlns:a="http://schemas.openxmlformats.org/drawingml/2006/main" xmlns:r="http://schemas.openxmlformats.org/officeDocument/2006/relationships" xmlns:p="http://schemas.openxmlformats.org/presentationml/2006/main">
-  <p:cSld>
-    <p:spTree>
-      <p:nvGrpSpPr>
-        <p:cNvPr id="1" name=""/>
-        <p:cNvGrpSpPr/>
-        <p:nvPr/>
-      </p:nvGrpSpPr>
-      <p:grpSpPr>
-        <a:xfrm>
-          <a:off x="0" y="0"/>
-          <a:ext cx="0" cy="0"/>
-          <a:chOff x="0" y="0"/>
-          <a:chExt cx="0" cy="0"/>
-        </a:xfrm>
-      </p:grpSpPr>
-      <p:sp>
-        <p:nvSpPr>
-          <p:cNvPr id="2" name="内容占位符 1"/>
-          <p:cNvSpPr>
-            <a:spLocks noGrp="1"/>
-          </p:cNvSpPr>
-          <p:nvPr>
-            <p:ph idx="1"/>
-          </p:nvPr>
-        </p:nvSpPr>
-        <p:spPr/>
-        <p:txBody>
-          <a:bodyPr/>
-          <a:lstStyle/>
-          <a:p>
-            <a:endParaRPr lang="zh-CN" altLang="en-US" dirty="0"/>
-          </a:p>
-        </p:txBody>
-      </p:sp>
-      <p:sp>
-        <p:nvSpPr>
-          <p:cNvPr id="3" name="标题 2"/>
-          <p:cNvSpPr>
-            <a:spLocks noGrp="1"/>
-          </p:cNvSpPr>
-          <p:nvPr>
-            <p:ph type="title"/>
-          </p:nvPr>
-        </p:nvSpPr>
-        <p:spPr/>
-        <p:txBody>
-          <a:bodyPr>
-            <a:normAutofit fontScale="90000"/>
-          </a:bodyPr>
-          <a:lstStyle/>
-          <a:p>
-            <a:r>
-              <a:rPr lang="zh-CN" altLang="en-US" dirty="0" smtClean="0"/>
-              <a:t>教育理念与原则</a:t>
-            </a:r>
-            <a:r>
-              <a:rPr lang="en-US" altLang="zh-CN" dirty="0" smtClean="0"/>
-              <a:t/>
-            </a:r>
-            <a:br>
-              <a:rPr lang="en-US" altLang="zh-CN" dirty="0" smtClean="0"/>
-            </a:br>
-            <a:r>
-              <a:rPr lang="en-US" altLang="zh-CN" dirty="0" smtClean="0"/>
-              <a:t>——</a:t>
-            </a:r>
-            <a:r>
-              <a:rPr lang="zh-CN" altLang="en-US" dirty="0" smtClean="0"/>
-              <a:t>以计算机网络技术为例</a:t>
-            </a:r>
-            <a:endParaRPr lang="zh-CN" altLang="en-US" dirty="0"/>
-          </a:p>
-        </p:txBody>
-      </p:sp>
-      <p:sp>
-        <p:nvSpPr>
-          <p:cNvPr id="4" name="日期占位符 3"/>
-          <p:cNvSpPr>
-            <a:spLocks noGrp="1"/>
-          </p:cNvSpPr>
-          <p:nvPr>
-            <p:ph type="dt" sz="half" idx="10"/>
-          </p:nvPr>
-        </p:nvSpPr>
-        <p:spPr/>
-        <p:txBody>
-          <a:bodyPr/>
-          <a:lstStyle/>
-          <a:p>
-            <a:fld id="{0B9519E9-8DBB-4AB6-A462-BCA647CE9F0A}" type="datetime1">
-              <a:rPr lang="zh-CN" altLang="en-US" smtClean="0"/>
-              <a:t>2015/12/19</a:t>
-            </a:fld>
-            <a:endParaRPr lang="zh-CN" altLang="en-US"/>
-          </a:p>
-        </p:txBody>
-      </p:sp>
-      <p:sp>
-        <p:nvSpPr>
-          <p:cNvPr id="5" name="灯片编号占位符 4"/>
-          <p:cNvSpPr>
-            <a:spLocks noGrp="1"/>
-          </p:cNvSpPr>
-          <p:nvPr>
-            <p:ph type="sldNum" sz="quarter" idx="12"/>
-          </p:nvPr>
-        </p:nvSpPr>
-        <p:spPr/>
-        <p:txBody>
-          <a:bodyPr/>
-          <a:lstStyle/>
-          <a:p>
-            <a:fld id="{0C913308-F349-4B6D-A68A-DD1791B4A57B}" type="slidenum">
-              <a:rPr lang="zh-CN" altLang="en-US" smtClean="0"/>
-              <a:pPr/>
-              <a:t>17</a:t>
-            </a:fld>
-            <a:endParaRPr lang="zh-CN" altLang="en-US"/>
-          </a:p>
-        </p:txBody>
-      </p:sp>
-    </p:spTree>
-  </p:cSld>
-  <p:clrMapOvr>
-    <a:masterClrMapping/>
-  </p:clrMapOvr>
-  <p:timing>
-    <p:tnLst>
-      <p:par>
-        <p:cTn id="1" dur="indefinite" restart="never" nodeType="tmRoot"/>
-      </p:par>
-    </p:tnLst>
-  </p:timing>
-</p:sld>
-</file>
-
-<file path=ppt/slides/slide18.xml><?xml version="1.0" encoding="utf-8"?>
 <p:sld xmlns:a="http://schemas.openxmlformats.org/drawingml/2006/main" xmlns:r="http://schemas.openxmlformats.org/officeDocument/2006/relationships" xmlns:p="http://schemas.openxmlformats.org/presentationml/2006/main">
   <p:cSld>
     <p:spTree>
@@ -19151,7 +19108,8 @@
           <a:p>
             <a:fld id="{51140375-6196-47BA-B22A-5D26720750D1}" type="datetime1">
               <a:rPr lang="zh-CN" altLang="en-US" smtClean="0"/>
-              <a:t>2015/12/19</a:t>
+              <a:pPr/>
+              <a:t>2016/2/21</a:t>
             </a:fld>
             <a:endParaRPr lang="zh-CN" altLang="en-US"/>
           </a:p>
@@ -19175,7 +19133,7 @@
             <a:fld id="{0C913308-F349-4B6D-A68A-DD1791B4A57B}" type="slidenum">
               <a:rPr lang="zh-CN" altLang="en-US" smtClean="0"/>
               <a:pPr/>
-              <a:t>18</a:t>
+              <a:t>17</a:t>
             </a:fld>
             <a:endParaRPr lang="zh-CN" altLang="en-US"/>
           </a:p>
@@ -19196,7 +19154,7 @@
 </p:sld>
 </file>
 
-<file path=ppt/slides/slide19.xml><?xml version="1.0" encoding="utf-8"?>
+<file path=ppt/slides/slide18.xml><?xml version="1.0" encoding="utf-8"?>
 <p:sld xmlns:a="http://schemas.openxmlformats.org/drawingml/2006/main" xmlns:r="http://schemas.openxmlformats.org/officeDocument/2006/relationships" xmlns:p="http://schemas.openxmlformats.org/presentationml/2006/main">
   <p:cSld>
     <p:spTree>
@@ -19236,8 +19194,40 @@
                   </a:schemeClr>
                 </a:solidFill>
               </a:rPr>
-              <a:t>充分</a:t>
-            </a:r>
+              <a:t>充分信任，特事特办</a:t>
+            </a:r>
+            <a:endParaRPr lang="en-US" altLang="zh-CN" dirty="0" smtClean="0">
+              <a:solidFill>
+                <a:schemeClr val="accent1">
+                  <a:lumMod val="75000"/>
+                </a:schemeClr>
+              </a:solidFill>
+            </a:endParaRPr>
+          </a:p>
+          <a:p>
+            <a:pPr lvl="1"/>
+            <a:r>
+              <a:rPr lang="zh-CN" altLang="en-US" dirty="0" smtClean="0"/>
+              <a:t>强化英语教育，淡化意识形态对立</a:t>
+            </a:r>
+          </a:p>
+          <a:p>
+            <a:pPr lvl="1"/>
+            <a:r>
+              <a:rPr lang="zh-CN" altLang="en-US" dirty="0" smtClean="0"/>
+              <a:t>紧跟荷兰学院的专业设置及课程管理规范</a:t>
+            </a:r>
+            <a:endParaRPr lang="en-US" altLang="zh-CN" dirty="0" smtClean="0"/>
+          </a:p>
+          <a:p>
+            <a:pPr lvl="1"/>
+            <a:r>
+              <a:rPr lang="zh-CN" altLang="en-US" dirty="0" smtClean="0"/>
+              <a:t>细化资质认证的粒度，以课程为单位建立资质授予的体系</a:t>
+            </a:r>
+            <a:endParaRPr lang="en-US" altLang="zh-CN" dirty="0" smtClean="0"/>
+          </a:p>
+          <a:p>
             <a:r>
               <a:rPr lang="zh-CN" altLang="en-US" dirty="0" smtClean="0">
                 <a:solidFill>
@@ -19246,7 +19236,7 @@
                   </a:schemeClr>
                 </a:solidFill>
               </a:rPr>
-              <a:t>信任，特事特办</a:t>
+              <a:t>聚焦资源，打造精品</a:t>
             </a:r>
             <a:endParaRPr lang="en-US" altLang="zh-CN" dirty="0" smtClean="0">
               <a:solidFill>
@@ -19260,74 +19250,14 @@
             <a:pPr lvl="1"/>
             <a:r>
               <a:rPr lang="zh-CN" altLang="en-US" dirty="0" smtClean="0"/>
-              <a:t>强化英语教育，淡化意识形态对立</a:t>
+              <a:t>高投入才有高产出</a:t>
             </a:r>
           </a:p>
           <a:p>
             <a:pPr lvl="1"/>
             <a:r>
               <a:rPr lang="zh-CN" altLang="en-US" dirty="0" smtClean="0"/>
-              <a:t>紧跟荷兰学院的专业设置及课程管理</a:t>
-            </a:r>
-            <a:r>
-              <a:rPr lang="zh-CN" altLang="en-US" dirty="0" smtClean="0"/>
-              <a:t>规范</a:t>
-            </a:r>
-            <a:endParaRPr lang="en-US" altLang="zh-CN" dirty="0" smtClean="0"/>
-          </a:p>
-          <a:p>
-            <a:pPr lvl="1"/>
-            <a:r>
-              <a:rPr lang="zh-CN" altLang="en-US" dirty="0" smtClean="0"/>
-              <a:t>细化资质认证的粒度，以课程为单位建立资质授予的体系</a:t>
-            </a:r>
-            <a:endParaRPr lang="en-US" altLang="zh-CN" dirty="0" smtClean="0"/>
-          </a:p>
-          <a:p>
-            <a:r>
-              <a:rPr lang="zh-CN" altLang="en-US" dirty="0" smtClean="0">
-                <a:solidFill>
-                  <a:schemeClr val="accent1">
-                    <a:lumMod val="75000"/>
-                  </a:schemeClr>
-                </a:solidFill>
-              </a:rPr>
-              <a:t>聚焦</a:t>
-            </a:r>
-            <a:r>
-              <a:rPr lang="zh-CN" altLang="en-US" dirty="0" smtClean="0">
-                <a:solidFill>
-                  <a:schemeClr val="accent1">
-                    <a:lumMod val="75000"/>
-                  </a:schemeClr>
-                </a:solidFill>
-              </a:rPr>
-              <a:t>资源，打造精品</a:t>
-            </a:r>
-            <a:endParaRPr lang="en-US" altLang="zh-CN" dirty="0" smtClean="0">
-              <a:solidFill>
-                <a:schemeClr val="accent1">
-                  <a:lumMod val="75000"/>
-                </a:schemeClr>
-              </a:solidFill>
-            </a:endParaRPr>
-          </a:p>
-          <a:p>
-            <a:pPr lvl="1"/>
-            <a:r>
-              <a:rPr lang="zh-CN" altLang="en-US" dirty="0" smtClean="0"/>
-              <a:t>高投入才有高产出</a:t>
-            </a:r>
-          </a:p>
-          <a:p>
-            <a:pPr lvl="1"/>
-            <a:r>
-              <a:rPr lang="zh-CN" altLang="en-US" dirty="0" smtClean="0"/>
-              <a:t>宽进严出，建立</a:t>
-            </a:r>
-            <a:r>
-              <a:rPr lang="zh-CN" altLang="en-US" dirty="0" smtClean="0"/>
-              <a:t>良性循环</a:t>
+              <a:t>宽进严出，建立良性循环</a:t>
             </a:r>
             <a:endParaRPr lang="en-US" altLang="zh-CN" dirty="0" smtClean="0"/>
           </a:p>
@@ -19411,7 +19341,8 @@
           <a:p>
             <a:fld id="{0EC771DE-8427-4F03-AF01-E02D96D894DD}" type="datetime1">
               <a:rPr lang="zh-CN" altLang="en-US" smtClean="0"/>
-              <a:t>2015/12/19</a:t>
+              <a:pPr/>
+              <a:t>2016/2/21</a:t>
             </a:fld>
             <a:endParaRPr lang="zh-CN" altLang="en-US"/>
           </a:p>
@@ -19435,7 +19366,7 @@
             <a:fld id="{0C913308-F349-4B6D-A68A-DD1791B4A57B}" type="slidenum">
               <a:rPr lang="zh-CN" altLang="en-US" smtClean="0"/>
               <a:pPr/>
-              <a:t>19</a:t>
+              <a:t>18</a:t>
             </a:fld>
             <a:endParaRPr lang="zh-CN" altLang="en-US"/>
           </a:p>
@@ -19456,213 +19387,7 @@
 </p:sld>
 </file>
 
-<file path=ppt/slides/slide2.xml><?xml version="1.0" encoding="utf-8"?>
-<p:sld xmlns:a="http://schemas.openxmlformats.org/drawingml/2006/main" xmlns:r="http://schemas.openxmlformats.org/officeDocument/2006/relationships" xmlns:p="http://schemas.openxmlformats.org/presentationml/2006/main">
-  <p:cSld>
-    <p:spTree>
-      <p:nvGrpSpPr>
-        <p:cNvPr id="1" name=""/>
-        <p:cNvGrpSpPr/>
-        <p:nvPr/>
-      </p:nvGrpSpPr>
-      <p:grpSpPr>
-        <a:xfrm>
-          <a:off x="0" y="0"/>
-          <a:ext cx="0" cy="0"/>
-          <a:chOff x="0" y="0"/>
-          <a:chExt cx="0" cy="0"/>
-        </a:xfrm>
-      </p:grpSpPr>
-      <p:sp>
-        <p:nvSpPr>
-          <p:cNvPr id="4" name="标题 3"/>
-          <p:cNvSpPr>
-            <a:spLocks noGrp="1"/>
-          </p:cNvSpPr>
-          <p:nvPr>
-            <p:ph type="title"/>
-          </p:nvPr>
-        </p:nvSpPr>
-        <p:spPr/>
-        <p:txBody>
-          <a:bodyPr/>
-          <a:lstStyle/>
-          <a:p>
-            <a:r>
-              <a:rPr lang="zh-CN" altLang="en-US" dirty="0" smtClean="0"/>
-              <a:t>内容</a:t>
-            </a:r>
-            <a:endParaRPr lang="zh-CN" altLang="en-US" dirty="0"/>
-          </a:p>
-        </p:txBody>
-      </p:sp>
-      <p:sp>
-        <p:nvSpPr>
-          <p:cNvPr id="5" name="文本占位符 4"/>
-          <p:cNvSpPr>
-            <a:spLocks noGrp="1"/>
-          </p:cNvSpPr>
-          <p:nvPr>
-            <p:ph type="body" idx="1"/>
-          </p:nvPr>
-        </p:nvSpPr>
-        <p:spPr>
-          <a:xfrm>
-            <a:off x="3922713" y="2931712"/>
-            <a:ext cx="4572000" cy="3161584"/>
-          </a:xfrm>
-        </p:spPr>
-        <p:txBody>
-          <a:bodyPr>
-            <a:normAutofit/>
-          </a:bodyPr>
-          <a:lstStyle/>
-          <a:p>
-            <a:r>
-              <a:rPr lang="zh-CN" altLang="en-US" dirty="0" smtClean="0"/>
-              <a:t>赴</a:t>
-            </a:r>
-            <a:r>
-              <a:rPr lang="zh-CN" altLang="en-US" dirty="0" smtClean="0"/>
-              <a:t>加学习情况小节</a:t>
-            </a:r>
-            <a:endParaRPr lang="en-US" altLang="zh-CN" dirty="0" smtClean="0"/>
-          </a:p>
-          <a:p>
-            <a:r>
-              <a:rPr lang="zh-CN" altLang="en-US" dirty="0" smtClean="0"/>
-              <a:t>中加职业教育差异浅析</a:t>
-            </a:r>
-            <a:endParaRPr lang="en-US" altLang="zh-CN" dirty="0" smtClean="0"/>
-          </a:p>
-          <a:p>
-            <a:r>
-              <a:rPr lang="zh-CN" altLang="en-US" dirty="0" smtClean="0"/>
-              <a:t>     </a:t>
-            </a:r>
-            <a:r>
-              <a:rPr lang="en-US" altLang="zh-CN" dirty="0" smtClean="0"/>
-              <a:t>——</a:t>
-            </a:r>
-            <a:r>
-              <a:rPr lang="zh-CN" altLang="en-US" dirty="0" smtClean="0"/>
-              <a:t>以计算机网络技术为例</a:t>
-            </a:r>
-            <a:endParaRPr lang="en-US" altLang="zh-CN" dirty="0" smtClean="0"/>
-          </a:p>
-          <a:p>
-            <a:r>
-              <a:rPr lang="zh-CN" altLang="en-US" dirty="0" smtClean="0"/>
-              <a:t>合作</a:t>
-            </a:r>
-            <a:r>
-              <a:rPr lang="zh-CN" altLang="en-US" dirty="0" smtClean="0"/>
-              <a:t>办学模式探讨</a:t>
-            </a:r>
-            <a:endParaRPr lang="zh-CN" altLang="en-US" dirty="0"/>
-          </a:p>
-        </p:txBody>
-      </p:sp>
-      <p:pic>
-        <p:nvPicPr>
-          <p:cNvPr id="6" name="图片 5" descr="mmexport1446051120675.jpg"/>
-          <p:cNvPicPr>
-            <a:picLocks noChangeAspect="1"/>
-          </p:cNvPicPr>
-          <p:nvPr/>
-        </p:nvPicPr>
-        <p:blipFill>
-          <a:blip r:embed="rId2" cstate="print"/>
-          <a:stretch>
-            <a:fillRect/>
-          </a:stretch>
-        </p:blipFill>
-        <p:spPr>
-          <a:xfrm>
-            <a:off x="899592" y="836712"/>
-            <a:ext cx="1890210" cy="2520280"/>
-          </a:xfrm>
-          <a:prstGeom prst="rect">
-            <a:avLst/>
-          </a:prstGeom>
-          <a:ln w="127000" cap="sq">
-            <a:solidFill>
-              <a:srgbClr val="FFC000"/>
-            </a:solidFill>
-            <a:miter lim="800000"/>
-          </a:ln>
-          <a:effectLst>
-            <a:outerShdw blurRad="57150" dist="50800" dir="2700000" algn="tl" rotWithShape="0">
-              <a:srgbClr val="000000">
-                <a:alpha val="40000"/>
-              </a:srgbClr>
-            </a:outerShdw>
-          </a:effectLst>
-        </p:spPr>
-      </p:pic>
-      <p:sp>
-        <p:nvSpPr>
-          <p:cNvPr id="7" name="日期占位符 6"/>
-          <p:cNvSpPr>
-            <a:spLocks noGrp="1"/>
-          </p:cNvSpPr>
-          <p:nvPr>
-            <p:ph type="dt" sz="half" idx="10"/>
-          </p:nvPr>
-        </p:nvSpPr>
-        <p:spPr/>
-        <p:txBody>
-          <a:bodyPr/>
-          <a:lstStyle/>
-          <a:p>
-            <a:fld id="{C84272F6-4F7E-4FF1-9B18-6C26EF87531F}" type="datetime1">
-              <a:rPr lang="zh-CN" altLang="en-US" smtClean="0"/>
-              <a:t>2015/12/19</a:t>
-            </a:fld>
-            <a:endParaRPr lang="zh-CN" altLang="en-US"/>
-          </a:p>
-        </p:txBody>
-      </p:sp>
-      <p:sp>
-        <p:nvSpPr>
-          <p:cNvPr id="8" name="灯片编号占位符 7"/>
-          <p:cNvSpPr>
-            <a:spLocks noGrp="1"/>
-          </p:cNvSpPr>
-          <p:nvPr>
-            <p:ph type="sldNum" sz="quarter" idx="12"/>
-          </p:nvPr>
-        </p:nvSpPr>
-        <p:spPr/>
-        <p:txBody>
-          <a:bodyPr/>
-          <a:lstStyle/>
-          <a:p>
-            <a:fld id="{0C913308-F349-4B6D-A68A-DD1791B4A57B}" type="slidenum">
-              <a:rPr lang="zh-CN" altLang="en-US" smtClean="0"/>
-              <a:pPr/>
-              <a:t>2</a:t>
-            </a:fld>
-            <a:endParaRPr lang="zh-CN" altLang="en-US"/>
-          </a:p>
-        </p:txBody>
-      </p:sp>
-    </p:spTree>
-  </p:cSld>
-  <p:clrMapOvr>
-    <a:masterClrMapping/>
-  </p:clrMapOvr>
-  <p:timing>
-    <p:tnLst>
-      <p:par>
-        <p:cTn id="1" dur="indefinite" restart="never" nodeType="tmRoot"/>
-      </p:par>
-    </p:tnLst>
-  </p:timing>
-</p:sld>
-</file>
-
-<file path=ppt/slides/slide20.xml><?xml version="1.0" encoding="utf-8"?>
+<file path=ppt/slides/slide19.xml><?xml version="1.0" encoding="utf-8"?>
 <p:sld xmlns:a="http://schemas.openxmlformats.org/drawingml/2006/main" xmlns:r="http://schemas.openxmlformats.org/officeDocument/2006/relationships" xmlns:p="http://schemas.openxmlformats.org/presentationml/2006/main">
   <p:cSld>
     <p:spTree>
@@ -19763,7 +19488,8 @@
           <a:p>
             <a:fld id="{52D3C40D-945F-47F7-A166-38486B81D340}" type="datetime1">
               <a:rPr lang="zh-CN" altLang="en-US" smtClean="0"/>
-              <a:t>2015/12/19</a:t>
+              <a:pPr/>
+              <a:t>2016/2/21</a:t>
             </a:fld>
             <a:endParaRPr lang="zh-CN" altLang="en-US"/>
           </a:p>
@@ -19787,7 +19513,7 @@
             <a:fld id="{0C913308-F349-4B6D-A68A-DD1791B4A57B}" type="slidenum">
               <a:rPr lang="zh-CN" altLang="en-US" smtClean="0"/>
               <a:pPr/>
-              <a:t>20</a:t>
+              <a:t>19</a:t>
             </a:fld>
             <a:endParaRPr lang="zh-CN" altLang="en-US"/>
           </a:p>
@@ -19801,7 +19527,206 @@
 </p:sld>
 </file>
 
-<file path=ppt/slides/slide21.xml><?xml version="1.0" encoding="utf-8"?>
+<file path=ppt/slides/slide2.xml><?xml version="1.0" encoding="utf-8"?>
+<p:sld xmlns:a="http://schemas.openxmlformats.org/drawingml/2006/main" xmlns:r="http://schemas.openxmlformats.org/officeDocument/2006/relationships" xmlns:p="http://schemas.openxmlformats.org/presentationml/2006/main">
+  <p:cSld>
+    <p:spTree>
+      <p:nvGrpSpPr>
+        <p:cNvPr id="1" name=""/>
+        <p:cNvGrpSpPr/>
+        <p:nvPr/>
+      </p:nvGrpSpPr>
+      <p:grpSpPr>
+        <a:xfrm>
+          <a:off x="0" y="0"/>
+          <a:ext cx="0" cy="0"/>
+          <a:chOff x="0" y="0"/>
+          <a:chExt cx="0" cy="0"/>
+        </a:xfrm>
+      </p:grpSpPr>
+      <p:sp>
+        <p:nvSpPr>
+          <p:cNvPr id="4" name="标题 3"/>
+          <p:cNvSpPr>
+            <a:spLocks noGrp="1"/>
+          </p:cNvSpPr>
+          <p:nvPr>
+            <p:ph type="title"/>
+          </p:nvPr>
+        </p:nvSpPr>
+        <p:spPr/>
+        <p:txBody>
+          <a:bodyPr/>
+          <a:lstStyle/>
+          <a:p>
+            <a:r>
+              <a:rPr lang="zh-CN" altLang="en-US" dirty="0" smtClean="0"/>
+              <a:t>内容</a:t>
+            </a:r>
+            <a:endParaRPr lang="zh-CN" altLang="en-US" dirty="0"/>
+          </a:p>
+        </p:txBody>
+      </p:sp>
+      <p:sp>
+        <p:nvSpPr>
+          <p:cNvPr id="5" name="文本占位符 4"/>
+          <p:cNvSpPr>
+            <a:spLocks noGrp="1"/>
+          </p:cNvSpPr>
+          <p:nvPr>
+            <p:ph type="body" idx="1"/>
+          </p:nvPr>
+        </p:nvSpPr>
+        <p:spPr>
+          <a:xfrm>
+            <a:off x="3922713" y="2931712"/>
+            <a:ext cx="4572000" cy="3161584"/>
+          </a:xfrm>
+        </p:spPr>
+        <p:txBody>
+          <a:bodyPr>
+            <a:normAutofit/>
+          </a:bodyPr>
+          <a:lstStyle/>
+          <a:p>
+            <a:r>
+              <a:rPr lang="zh-CN" altLang="en-US" dirty="0" smtClean="0"/>
+              <a:t>赴加学习情况小节</a:t>
+            </a:r>
+            <a:endParaRPr lang="en-US" altLang="zh-CN" dirty="0" smtClean="0"/>
+          </a:p>
+          <a:p>
+            <a:r>
+              <a:rPr lang="zh-CN" altLang="en-US" dirty="0" smtClean="0"/>
+              <a:t>中加职业教育差异浅析</a:t>
+            </a:r>
+            <a:endParaRPr lang="en-US" altLang="zh-CN" dirty="0" smtClean="0"/>
+          </a:p>
+          <a:p>
+            <a:r>
+              <a:rPr lang="zh-CN" altLang="en-US" dirty="0" smtClean="0"/>
+              <a:t>     </a:t>
+            </a:r>
+            <a:r>
+              <a:rPr lang="en-US" altLang="zh-CN" dirty="0" smtClean="0"/>
+              <a:t>——</a:t>
+            </a:r>
+            <a:r>
+              <a:rPr lang="zh-CN" altLang="en-US" dirty="0" smtClean="0"/>
+              <a:t>以计算机网络技术为例</a:t>
+            </a:r>
+            <a:endParaRPr lang="en-US" altLang="zh-CN" dirty="0" smtClean="0"/>
+          </a:p>
+          <a:p>
+            <a:r>
+              <a:rPr lang="zh-CN" altLang="en-US" dirty="0" smtClean="0"/>
+              <a:t>合作办学模式探讨</a:t>
+            </a:r>
+            <a:endParaRPr lang="zh-CN" altLang="en-US" dirty="0"/>
+          </a:p>
+        </p:txBody>
+      </p:sp>
+      <p:pic>
+        <p:nvPicPr>
+          <p:cNvPr id="6" name="图片 5" descr="mmexport1446051120675.jpg"/>
+          <p:cNvPicPr>
+            <a:picLocks noChangeAspect="1"/>
+          </p:cNvPicPr>
+          <p:nvPr/>
+        </p:nvPicPr>
+        <p:blipFill>
+          <a:blip r:embed="rId2" cstate="print"/>
+          <a:stretch>
+            <a:fillRect/>
+          </a:stretch>
+        </p:blipFill>
+        <p:spPr>
+          <a:xfrm>
+            <a:off x="899592" y="836712"/>
+            <a:ext cx="1890210" cy="2520280"/>
+          </a:xfrm>
+          <a:prstGeom prst="rect">
+            <a:avLst/>
+          </a:prstGeom>
+          <a:ln w="127000" cap="sq">
+            <a:solidFill>
+              <a:srgbClr val="FFC000"/>
+            </a:solidFill>
+            <a:miter lim="800000"/>
+          </a:ln>
+          <a:effectLst>
+            <a:outerShdw blurRad="57150" dist="50800" dir="2700000" algn="tl" rotWithShape="0">
+              <a:srgbClr val="000000">
+                <a:alpha val="40000"/>
+              </a:srgbClr>
+            </a:outerShdw>
+          </a:effectLst>
+        </p:spPr>
+      </p:pic>
+      <p:sp>
+        <p:nvSpPr>
+          <p:cNvPr id="7" name="日期占位符 6"/>
+          <p:cNvSpPr>
+            <a:spLocks noGrp="1"/>
+          </p:cNvSpPr>
+          <p:nvPr>
+            <p:ph type="dt" sz="half" idx="10"/>
+          </p:nvPr>
+        </p:nvSpPr>
+        <p:spPr/>
+        <p:txBody>
+          <a:bodyPr/>
+          <a:lstStyle/>
+          <a:p>
+            <a:fld id="{C84272F6-4F7E-4FF1-9B18-6C26EF87531F}" type="datetime1">
+              <a:rPr lang="zh-CN" altLang="en-US" smtClean="0"/>
+              <a:pPr/>
+              <a:t>2016/2/21</a:t>
+            </a:fld>
+            <a:endParaRPr lang="zh-CN" altLang="en-US"/>
+          </a:p>
+        </p:txBody>
+      </p:sp>
+      <p:sp>
+        <p:nvSpPr>
+          <p:cNvPr id="8" name="灯片编号占位符 7"/>
+          <p:cNvSpPr>
+            <a:spLocks noGrp="1"/>
+          </p:cNvSpPr>
+          <p:nvPr>
+            <p:ph type="sldNum" sz="quarter" idx="12"/>
+          </p:nvPr>
+        </p:nvSpPr>
+        <p:spPr/>
+        <p:txBody>
+          <a:bodyPr/>
+          <a:lstStyle/>
+          <a:p>
+            <a:fld id="{0C913308-F349-4B6D-A68A-DD1791B4A57B}" type="slidenum">
+              <a:rPr lang="zh-CN" altLang="en-US" smtClean="0"/>
+              <a:pPr/>
+              <a:t>2</a:t>
+            </a:fld>
+            <a:endParaRPr lang="zh-CN" altLang="en-US"/>
+          </a:p>
+        </p:txBody>
+      </p:sp>
+    </p:spTree>
+  </p:cSld>
+  <p:clrMapOvr>
+    <a:masterClrMapping/>
+  </p:clrMapOvr>
+  <p:timing>
+    <p:tnLst>
+      <p:par>
+        <p:cTn id="1" dur="indefinite" restart="never" nodeType="tmRoot"/>
+      </p:par>
+    </p:tnLst>
+  </p:timing>
+</p:sld>
+</file>
+
+<file path=ppt/slides/slide20.xml><?xml version="1.0" encoding="utf-8"?>
 <p:sld xmlns:a="http://schemas.openxmlformats.org/drawingml/2006/main" xmlns:r="http://schemas.openxmlformats.org/officeDocument/2006/relationships" xmlns:p="http://schemas.openxmlformats.org/presentationml/2006/main">
   <p:cSld>
     <p:spTree>
@@ -19875,7 +19800,8 @@
           <a:p>
             <a:fld id="{35D0F4C0-711E-497B-B62E-E81A21DB9DB3}" type="datetime1">
               <a:rPr lang="zh-CN" altLang="en-US" smtClean="0"/>
-              <a:t>2015/12/19</a:t>
+              <a:pPr/>
+              <a:t>2016/2/21</a:t>
             </a:fld>
             <a:endParaRPr lang="zh-CN" altLang="en-US"/>
           </a:p>
@@ -19899,7 +19825,7 @@
             <a:fld id="{0C913308-F349-4B6D-A68A-DD1791B4A57B}" type="slidenum">
               <a:rPr lang="zh-CN" altLang="en-US" smtClean="0"/>
               <a:pPr/>
-              <a:t>21</a:t>
+              <a:t>20</a:t>
             </a:fld>
             <a:endParaRPr lang="zh-CN" altLang="en-US"/>
           </a:p>
@@ -19947,7 +19873,7 @@
 </p:sld>
 </file>
 
-<file path=ppt/slides/slide22.xml><?xml version="1.0" encoding="utf-8"?>
+<file path=ppt/slides/slide21.xml><?xml version="1.0" encoding="utf-8"?>
 <p:sld xmlns:a="http://schemas.openxmlformats.org/drawingml/2006/main" xmlns:r="http://schemas.openxmlformats.org/officeDocument/2006/relationships" xmlns:p="http://schemas.openxmlformats.org/presentationml/2006/main">
   <p:cSld>
     <p:spTree>
@@ -20004,7 +19930,8 @@
           <a:p>
             <a:fld id="{5C90BBFB-3575-4A10-8500-5F80E07E5E59}" type="datetime1">
               <a:rPr lang="zh-CN" altLang="en-US" smtClean="0"/>
-              <a:t>2015/12/19</a:t>
+              <a:pPr/>
+              <a:t>2016/2/21</a:t>
             </a:fld>
             <a:endParaRPr lang="zh-CN" altLang="en-US"/>
           </a:p>
@@ -20028,7 +19955,7 @@
             <a:fld id="{0C913308-F349-4B6D-A68A-DD1791B4A57B}" type="slidenum">
               <a:rPr lang="zh-CN" altLang="en-US" smtClean="0"/>
               <a:pPr/>
-              <a:t>22</a:t>
+              <a:t>21</a:t>
             </a:fld>
             <a:endParaRPr lang="zh-CN" altLang="en-US"/>
           </a:p>
@@ -20241,18 +20168,7 @@
                 </a:solidFill>
                 <a:latin typeface="+mn-ea"/>
               </a:rPr>
-              <a:t>日</a:t>
-            </a:r>
-            <a:r>
-              <a:rPr lang="zh-CN" altLang="zh-CN" sz="6000" dirty="0" smtClean="0">
-                <a:solidFill>
-                  <a:schemeClr val="accent1">
-                    <a:lumMod val="75000"/>
-                  </a:schemeClr>
-                </a:solidFill>
-                <a:latin typeface="+mn-ea"/>
-              </a:rPr>
-              <a:t>，谢红</a:t>
+              <a:t>日，谢红</a:t>
             </a:r>
             <a:r>
               <a:rPr lang="zh-CN" altLang="en-US" sz="6000" dirty="0" smtClean="0">
@@ -20274,40 +20190,7 @@
                 </a:solidFill>
                 <a:latin typeface="+mn-ea"/>
               </a:rPr>
-              <a:t>两</a:t>
-            </a:r>
-            <a:r>
-              <a:rPr lang="zh-CN" altLang="zh-CN" sz="6000" dirty="0" smtClean="0">
-                <a:solidFill>
-                  <a:schemeClr val="accent1">
-                    <a:lumMod val="75000"/>
-                  </a:schemeClr>
-                </a:solidFill>
-                <a:latin typeface="+mn-ea"/>
-              </a:rPr>
-              <a:t>位老师赴加拿大爱德华王子岛</a:t>
-            </a:r>
-            <a:r>
-              <a:rPr lang="zh-CN" altLang="zh-CN" sz="6000" dirty="0" smtClean="0">
-                <a:solidFill>
-                  <a:schemeClr val="accent1">
-                    <a:lumMod val="75000"/>
-                  </a:schemeClr>
-                </a:solidFill>
-                <a:latin typeface="+mn-ea"/>
-              </a:rPr>
-              <a:t>省荷兰学院</a:t>
-            </a:r>
-            <a:r>
-              <a:rPr lang="zh-CN" altLang="zh-CN" sz="6000" dirty="0" smtClean="0">
-                <a:solidFill>
-                  <a:schemeClr val="accent1">
-                    <a:lumMod val="75000"/>
-                  </a:schemeClr>
-                </a:solidFill>
-                <a:latin typeface="+mn-ea"/>
-              </a:rPr>
-              <a:t>进行了为期</a:t>
+              <a:t>两位老师赴加拿大爱德华王子岛省荷兰学院进行了为期</a:t>
             </a:r>
             <a:r>
               <a:rPr lang="en-US" altLang="zh-CN" sz="6000" dirty="0" smtClean="0">
@@ -20329,18 +20212,7 @@
                 </a:solidFill>
                 <a:latin typeface="+mn-ea"/>
               </a:rPr>
-              <a:t>周的</a:t>
-            </a:r>
-            <a:r>
-              <a:rPr lang="zh-CN" altLang="zh-CN" sz="6000" dirty="0" smtClean="0">
-                <a:solidFill>
-                  <a:schemeClr val="accent1">
-                    <a:lumMod val="75000"/>
-                  </a:schemeClr>
-                </a:solidFill>
-                <a:latin typeface="+mn-ea"/>
-              </a:rPr>
-              <a:t>培训</a:t>
+              <a:t>周的培训</a:t>
             </a:r>
             <a:r>
               <a:rPr lang="en-US" altLang="zh-CN" sz="6000" dirty="0" smtClean="0">
@@ -20370,11 +20242,7 @@
             </a:r>
             <a:r>
               <a:rPr lang="zh-CN" altLang="zh-CN" sz="5000" dirty="0" smtClean="0"/>
-              <a:t>门课程的旁听及实践环节的</a:t>
-            </a:r>
-            <a:r>
-              <a:rPr lang="zh-CN" altLang="zh-CN" sz="5000" dirty="0" smtClean="0"/>
-              <a:t>参与</a:t>
+              <a:t>门课程的旁听及实践环节的参与</a:t>
             </a:r>
             <a:endParaRPr lang="en-US" altLang="zh-CN" sz="5000" dirty="0" smtClean="0"/>
           </a:p>
@@ -20390,11 +20258,7 @@
             </a:r>
             <a:r>
               <a:rPr lang="zh-CN" altLang="zh-CN" sz="5000" dirty="0" smtClean="0"/>
-              <a:t>个培训课程的</a:t>
-            </a:r>
-            <a:r>
-              <a:rPr lang="zh-CN" altLang="zh-CN" sz="5000" dirty="0" smtClean="0"/>
-              <a:t>学习</a:t>
+              <a:t>个培训课程的学习</a:t>
             </a:r>
             <a:endParaRPr lang="en-US" altLang="zh-CN" sz="5000" dirty="0" smtClean="0"/>
           </a:p>
@@ -20410,11 +20274,7 @@
             </a:r>
             <a:r>
               <a:rPr lang="zh-CN" altLang="zh-CN" sz="5000" dirty="0" smtClean="0"/>
-              <a:t>个小时左右的英语</a:t>
-            </a:r>
-            <a:r>
-              <a:rPr lang="zh-CN" altLang="zh-CN" sz="5000" dirty="0" smtClean="0"/>
-              <a:t>培训</a:t>
+              <a:t>个小时左右的英语培训</a:t>
             </a:r>
             <a:endParaRPr lang="en-US" altLang="zh-CN" sz="5000" dirty="0" smtClean="0"/>
           </a:p>
@@ -20426,15 +20286,7 @@
             </a:pPr>
             <a:r>
               <a:rPr lang="zh-CN" altLang="zh-CN" sz="5000" dirty="0" smtClean="0"/>
-              <a:t>深入</a:t>
-            </a:r>
-            <a:r>
-              <a:rPr lang="zh-CN" altLang="zh-CN" sz="5000" dirty="0" smtClean="0"/>
-              <a:t>体验了加方计算机网络技术专业的教学运作和荷兰学院教育理念在教学实践中的</a:t>
-            </a:r>
-            <a:r>
-              <a:rPr lang="zh-CN" altLang="zh-CN" sz="5000" dirty="0" smtClean="0"/>
-              <a:t>贯彻</a:t>
+              <a:t>深入体验了加方计算机网络技术专业的教学运作和荷兰学院教育理念在教学实践中的贯彻</a:t>
             </a:r>
             <a:endParaRPr lang="en-US" altLang="zh-CN" sz="5000" dirty="0" smtClean="0"/>
           </a:p>
@@ -20446,15 +20298,7 @@
             </a:pPr>
             <a:r>
               <a:rPr lang="zh-CN" altLang="zh-CN" sz="5000" dirty="0" smtClean="0"/>
-              <a:t>提升</a:t>
-            </a:r>
-            <a:r>
-              <a:rPr lang="zh-CN" altLang="zh-CN" sz="5000" dirty="0" smtClean="0"/>
-              <a:t>了教师参与国际化教育交流项目的</a:t>
-            </a:r>
-            <a:r>
-              <a:rPr lang="zh-CN" altLang="zh-CN" sz="5000" dirty="0" smtClean="0"/>
-              <a:t>能力</a:t>
+              <a:t>提升了教师参与国际化教育交流项目的能力</a:t>
             </a:r>
             <a:endParaRPr lang="en-US" altLang="zh-CN" sz="5000" dirty="0" smtClean="0"/>
           </a:p>
@@ -20466,15 +20310,7 @@
             </a:pPr>
             <a:r>
               <a:rPr lang="zh-CN" altLang="zh-CN" sz="5000" dirty="0" smtClean="0"/>
-              <a:t>为</a:t>
-            </a:r>
-            <a:r>
-              <a:rPr lang="zh-CN" altLang="zh-CN" sz="5000" dirty="0" smtClean="0"/>
-              <a:t>在本校开展合作办学项目奠定了坚实的基础</a:t>
-            </a:r>
-            <a:r>
-              <a:rPr lang="zh-CN" altLang="zh-CN" sz="5000" dirty="0" smtClean="0"/>
-              <a:t>。</a:t>
+              <a:t>为在本校开展合作办学项目奠定了坚实的基础。</a:t>
             </a:r>
             <a:endParaRPr lang="zh-CN" altLang="en-US" sz="3000" dirty="0"/>
           </a:p>
@@ -20558,7 +20394,8 @@
           <a:p>
             <a:fld id="{DE227482-0D96-4702-8AA5-1A17333980C2}" type="datetime1">
               <a:rPr lang="zh-CN" altLang="en-US" smtClean="0"/>
-              <a:t>2015/12/19</a:t>
+              <a:pPr/>
+              <a:t>2016/2/21</a:t>
             </a:fld>
             <a:endParaRPr lang="zh-CN" altLang="en-US"/>
           </a:p>
@@ -20726,8 +20563,99 @@
                   </a:schemeClr>
                 </a:solidFill>
               </a:rPr>
-              <a:t>谢</a:t>
-            </a:r>
+              <a:t>谢红</a:t>
+            </a:r>
+            <a:endParaRPr lang="en-US" altLang="zh-CN" dirty="0" smtClean="0">
+              <a:solidFill>
+                <a:schemeClr val="accent1">
+                  <a:lumMod val="75000"/>
+                </a:schemeClr>
+              </a:solidFill>
+            </a:endParaRPr>
+          </a:p>
+          <a:p>
+            <a:pPr lvl="1"/>
+            <a:r>
+              <a:rPr lang="en-US" altLang="zh-CN" sz="2100" dirty="0" err="1" smtClean="0"/>
+              <a:t>计算机硬件</a:t>
+            </a:r>
+            <a:r>
+              <a:rPr lang="en-US" altLang="zh-CN" sz="2100" dirty="0" smtClean="0"/>
+              <a:t> </a:t>
+            </a:r>
+            <a:r>
+              <a:rPr lang="zh-CN" altLang="en-US" sz="2100" dirty="0" smtClean="0"/>
+              <a:t>Ａ</a:t>
+            </a:r>
+            <a:r>
+              <a:rPr lang="en-US" altLang="zh-CN" sz="2100" dirty="0" smtClean="0"/>
+              <a:t>+ Hardware</a:t>
+            </a:r>
+          </a:p>
+          <a:p>
+            <a:pPr lvl="1"/>
+            <a:r>
+              <a:rPr lang="en-US" altLang="zh-CN" sz="2100" dirty="0" err="1" smtClean="0"/>
+              <a:t>计算机软件</a:t>
+            </a:r>
+            <a:r>
+              <a:rPr lang="en-US" altLang="zh-CN" sz="2100" dirty="0" smtClean="0"/>
+              <a:t> A+ Software</a:t>
+            </a:r>
+          </a:p>
+          <a:p>
+            <a:pPr lvl="1"/>
+            <a:r>
+              <a:rPr lang="en-US" altLang="zh-CN" sz="2100" dirty="0" err="1" smtClean="0"/>
+              <a:t>技术性沟通</a:t>
+            </a:r>
+            <a:r>
+              <a:rPr lang="en-US" altLang="zh-CN" sz="2100" dirty="0" smtClean="0"/>
+              <a:t> Technical Communicati</a:t>
+            </a:r>
+            <a:r>
+              <a:rPr lang="en-US" altLang="zh-CN" sz="2100" dirty="0" smtClean="0">
+                <a:solidFill>
+                  <a:srgbClr val="FFC000"/>
+                </a:solidFill>
+              </a:rPr>
+              <a:t>ons</a:t>
+            </a:r>
+          </a:p>
+          <a:p>
+            <a:pPr lvl="1"/>
+            <a:r>
+              <a:rPr lang="en-US" altLang="zh-CN" sz="2100" dirty="0" err="1" smtClean="0"/>
+              <a:t>思科网络学院</a:t>
+            </a:r>
+            <a:r>
+              <a:rPr lang="en-US" altLang="zh-CN" sz="2100" dirty="0" smtClean="0"/>
+              <a:t> CCNA-I</a:t>
+            </a:r>
+          </a:p>
+          <a:p>
+            <a:pPr lvl="1"/>
+            <a:r>
+              <a:rPr lang="en-US" altLang="zh-CN" sz="2100" dirty="0" err="1" smtClean="0"/>
+              <a:t>计算机基础</a:t>
+            </a:r>
+            <a:r>
+              <a:rPr lang="en-US" altLang="zh-CN" sz="2100" dirty="0" smtClean="0"/>
+              <a:t> Computer Essentials</a:t>
+            </a:r>
+          </a:p>
+          <a:p>
+            <a:pPr lvl="1"/>
+            <a:r>
+              <a:rPr lang="en-US" altLang="zh-CN" sz="2100" dirty="0" err="1" smtClean="0"/>
+              <a:t>项目管理</a:t>
+            </a:r>
+            <a:r>
+              <a:rPr lang="en-US" altLang="zh-CN" sz="2100" dirty="0" smtClean="0"/>
+              <a:t> Project Management</a:t>
+            </a:r>
+          </a:p>
+          <a:p>
             <a:r>
               <a:rPr lang="zh-CN" altLang="en-US" dirty="0" smtClean="0">
                 <a:solidFill>
@@ -20736,7 +20664,7 @@
                   </a:schemeClr>
                 </a:solidFill>
               </a:rPr>
-              <a:t>红</a:t>
+              <a:t>刘海波</a:t>
             </a:r>
             <a:endParaRPr lang="en-US" altLang="zh-CN" dirty="0" smtClean="0">
               <a:solidFill>
@@ -20750,125 +20678,6 @@
             <a:pPr lvl="1"/>
             <a:r>
               <a:rPr lang="en-US" altLang="zh-CN" sz="2100" dirty="0" err="1" smtClean="0"/>
-              <a:t>计算机硬件</a:t>
-            </a:r>
-            <a:r>
-              <a:rPr lang="en-US" altLang="zh-CN" sz="2100" dirty="0" smtClean="0"/>
-              <a:t> </a:t>
-            </a:r>
-            <a:r>
-              <a:rPr lang="zh-CN" altLang="en-US" sz="2100" dirty="0" smtClean="0"/>
-              <a:t>Ａ</a:t>
-            </a:r>
-            <a:r>
-              <a:rPr lang="en-US" altLang="zh-CN" sz="2100" dirty="0" smtClean="0"/>
-              <a:t>+ Hardware</a:t>
-            </a:r>
-          </a:p>
-          <a:p>
-            <a:pPr lvl="1"/>
-            <a:r>
-              <a:rPr lang="en-US" altLang="zh-CN" sz="2100" dirty="0" err="1" smtClean="0"/>
-              <a:t>计算机软件</a:t>
-            </a:r>
-            <a:r>
-              <a:rPr lang="en-US" altLang="zh-CN" sz="2100" dirty="0" smtClean="0"/>
-              <a:t> A</a:t>
-            </a:r>
-            <a:r>
-              <a:rPr lang="en-US" altLang="zh-CN" sz="2100" dirty="0" smtClean="0"/>
-              <a:t>+ </a:t>
-            </a:r>
-            <a:r>
-              <a:rPr lang="en-US" altLang="zh-CN" sz="2100" dirty="0" smtClean="0"/>
-              <a:t>Software</a:t>
-            </a:r>
-          </a:p>
-          <a:p>
-            <a:pPr lvl="1"/>
-            <a:r>
-              <a:rPr lang="en-US" altLang="zh-CN" sz="2100" dirty="0" err="1" smtClean="0"/>
-              <a:t>技术性沟通</a:t>
-            </a:r>
-            <a:r>
-              <a:rPr lang="en-US" altLang="zh-CN" sz="2100" dirty="0" smtClean="0"/>
-              <a:t> Technical Communicati</a:t>
-            </a:r>
-            <a:r>
-              <a:rPr lang="en-US" altLang="zh-CN" sz="2100" dirty="0" smtClean="0">
-                <a:solidFill>
-                  <a:srgbClr val="FFC000"/>
-                </a:solidFill>
-              </a:rPr>
-              <a:t>ons</a:t>
-            </a:r>
-          </a:p>
-          <a:p>
-            <a:pPr lvl="1"/>
-            <a:r>
-              <a:rPr lang="en-US" altLang="zh-CN" sz="2100" dirty="0" err="1" smtClean="0"/>
-              <a:t>思科网络学院</a:t>
-            </a:r>
-            <a:r>
-              <a:rPr lang="en-US" altLang="zh-CN" sz="2100" dirty="0" smtClean="0"/>
-              <a:t> CCNA-I</a:t>
-            </a:r>
-          </a:p>
-          <a:p>
-            <a:pPr lvl="1"/>
-            <a:r>
-              <a:rPr lang="en-US" altLang="zh-CN" sz="2100" dirty="0" err="1" smtClean="0"/>
-              <a:t>计算机基础</a:t>
-            </a:r>
-            <a:r>
-              <a:rPr lang="en-US" altLang="zh-CN" sz="2100" dirty="0" smtClean="0"/>
-              <a:t> Computer Essentials</a:t>
-            </a:r>
-          </a:p>
-          <a:p>
-            <a:pPr lvl="1"/>
-            <a:r>
-              <a:rPr lang="en-US" altLang="zh-CN" sz="2100" dirty="0" err="1" smtClean="0"/>
-              <a:t>项目管理</a:t>
-            </a:r>
-            <a:r>
-              <a:rPr lang="en-US" altLang="zh-CN" sz="2100" dirty="0" smtClean="0"/>
-              <a:t> Project Management</a:t>
-            </a:r>
-          </a:p>
-          <a:p>
-            <a:r>
-              <a:rPr lang="zh-CN" altLang="en-US" dirty="0" smtClean="0">
-                <a:solidFill>
-                  <a:schemeClr val="accent1">
-                    <a:lumMod val="75000"/>
-                  </a:schemeClr>
-                </a:solidFill>
-              </a:rPr>
-              <a:t>刘海</a:t>
-            </a:r>
-            <a:r>
-              <a:rPr lang="zh-CN" altLang="en-US" dirty="0" smtClean="0">
-                <a:solidFill>
-                  <a:schemeClr val="accent1">
-                    <a:lumMod val="75000"/>
-                  </a:schemeClr>
-                </a:solidFill>
-              </a:rPr>
-              <a:t>波</a:t>
-            </a:r>
-            <a:endParaRPr lang="en-US" altLang="zh-CN" dirty="0" smtClean="0">
-              <a:solidFill>
-                <a:schemeClr val="accent1">
-                  <a:lumMod val="75000"/>
-                </a:schemeClr>
-              </a:solidFill>
-            </a:endParaRPr>
-          </a:p>
-          <a:p>
-            <a:pPr lvl="1"/>
-            <a:r>
-              <a:rPr lang="en-US" altLang="zh-CN" sz="2100" dirty="0" err="1" smtClean="0"/>
               <a:t>活动目录</a:t>
             </a:r>
             <a:r>
@@ -20895,11 +20704,7 @@
             </a:r>
             <a:r>
               <a:rPr lang="en-US" altLang="zh-CN" sz="2100" dirty="0" smtClean="0"/>
-              <a:t> Network </a:t>
-            </a:r>
-            <a:r>
-              <a:rPr lang="en-US" altLang="zh-CN" sz="2100" dirty="0" smtClean="0"/>
-              <a:t>Analysis a</a:t>
+              <a:t> Network Analysis a</a:t>
             </a:r>
             <a:r>
               <a:rPr lang="en-US" altLang="zh-CN" sz="2100" dirty="0" smtClean="0">
@@ -20911,11 +20716,7 @@
             </a:r>
             <a:r>
               <a:rPr lang="en-US" altLang="zh-CN" sz="2100" dirty="0" smtClean="0"/>
-              <a:t> </a:t>
-            </a:r>
-            <a:r>
-              <a:rPr lang="en-US" altLang="zh-CN" sz="2100" dirty="0" smtClean="0"/>
-              <a:t>Design</a:t>
+              <a:t> Design</a:t>
             </a:r>
           </a:p>
           <a:p>
@@ -20942,15 +20743,7 @@
             </a:r>
             <a:r>
               <a:rPr lang="en-US" altLang="zh-CN" sz="2100" dirty="0" smtClean="0"/>
-              <a:t> Technical </a:t>
-            </a:r>
-            <a:r>
-              <a:rPr lang="en-US" altLang="zh-CN" sz="2100" dirty="0" smtClean="0"/>
-              <a:t>Project </a:t>
-            </a:r>
-            <a:r>
-              <a:rPr lang="en-US" altLang="zh-CN" sz="2100" dirty="0" smtClean="0"/>
-              <a:t>Presentation</a:t>
+              <a:t> Technical Project Presentation</a:t>
             </a:r>
             <a:endParaRPr lang="zh-CN" altLang="en-US" sz="2100" dirty="0"/>
           </a:p>
@@ -20996,7 +20789,8 @@
           <a:p>
             <a:fld id="{B31C83DB-FFBE-4084-BB1F-D0D1DC7C27B0}" type="datetime1">
               <a:rPr lang="zh-CN" altLang="en-US" smtClean="0"/>
-              <a:t>2015/12/19</a:t>
+              <a:pPr/>
+              <a:t>2016/2/21</a:t>
             </a:fld>
             <a:endParaRPr lang="zh-CN" altLang="en-US" dirty="0"/>
           </a:p>
@@ -21126,17 +20920,7 @@
                   </a:schemeClr>
                 </a:solidFill>
               </a:rPr>
-              <a:t>Joanne </a:t>
-            </a:r>
-            <a:r>
-              <a:rPr lang="en-US" altLang="zh-CN" sz="2400" dirty="0" smtClean="0">
-                <a:solidFill>
-                  <a:schemeClr val="accent1">
-                    <a:lumMod val="75000"/>
-                  </a:schemeClr>
-                </a:solidFill>
-              </a:rPr>
-              <a:t>MacDonald</a:t>
+              <a:t>Joanne MacDonald</a:t>
             </a:r>
           </a:p>
           <a:p>
@@ -21147,15 +20931,7 @@
             </a:r>
             <a:r>
               <a:rPr lang="en-US" altLang="zh-CN" sz="2000" dirty="0" smtClean="0"/>
-              <a:t>Holland College </a:t>
-            </a:r>
-            <a:r>
-              <a:rPr lang="en-US" altLang="zh-CN" sz="2000" dirty="0" smtClean="0"/>
-              <a:t>Curriculum Model &amp; “</a:t>
-            </a:r>
-            <a:r>
-              <a:rPr lang="en-US" altLang="zh-CN" sz="2000" dirty="0" smtClean="0"/>
-              <a:t>Competency Based Education”</a:t>
+              <a:t>Holland College Curriculum Model &amp; “Competency Based Education”</a:t>
             </a:r>
           </a:p>
           <a:p>
@@ -21343,7 +21119,8 @@
           <a:p>
             <a:fld id="{0F83C2D7-E658-4E25-A7A6-7083EB62A903}" type="datetime1">
               <a:rPr lang="zh-CN" altLang="en-US" smtClean="0"/>
-              <a:t>2015/12/19</a:t>
+              <a:pPr/>
+              <a:t>2016/2/21</a:t>
             </a:fld>
             <a:endParaRPr lang="zh-CN" altLang="en-US"/>
           </a:p>
@@ -21444,11 +21221,7 @@
           <a:p>
             <a:r>
               <a:rPr lang="zh-CN" altLang="en-US" dirty="0" smtClean="0"/>
-              <a:t>提升英语口语能力，更从容自信地在日常工作中使用英语</a:t>
-            </a:r>
-            <a:r>
-              <a:rPr lang="zh-CN" altLang="en-US" dirty="0" smtClean="0"/>
-              <a:t>交流</a:t>
+              <a:t>提升英语口语能力，更从容自信地在日常工作中使用英语交流</a:t>
             </a:r>
             <a:endParaRPr lang="en-US" altLang="zh-CN" dirty="0" smtClean="0"/>
           </a:p>
@@ -21543,7 +21316,8 @@
           <a:p>
             <a:fld id="{BFCCF862-D1EC-4814-A08A-B9F2DB25F7EB}" type="datetime1">
               <a:rPr lang="zh-CN" altLang="en-US" smtClean="0"/>
-              <a:t>2015/12/19</a:t>
+              <a:pPr/>
+              <a:t>2016/2/21</a:t>
             </a:fld>
             <a:endParaRPr lang="zh-CN" altLang="en-US"/>
           </a:p>
@@ -21702,25 +21476,8 @@
                   </a:schemeClr>
                 </a:solidFill>
               </a:rPr>
-              <a:t>）：从两学年的培养计划映射为三学年的培养</a:t>
-            </a:r>
-            <a:r>
-              <a:rPr lang="zh-CN" altLang="zh-CN" dirty="0" smtClean="0">
-                <a:solidFill>
-                  <a:schemeClr val="accent1">
-                    <a:lumMod val="75000"/>
-                  </a:schemeClr>
-                </a:solidFill>
-              </a:rPr>
-              <a:t>计划</a:t>
-            </a:r>
-            <a:endParaRPr lang="zh-CN" altLang="zh-CN" dirty="0" smtClean="0">
-              <a:solidFill>
-                <a:schemeClr val="accent1">
-                  <a:lumMod val="75000"/>
-                </a:schemeClr>
-              </a:solidFill>
-            </a:endParaRPr>
+              <a:t>）：从两学年的培养计划映射为三学年的培养计划</a:t>
+            </a:r>
           </a:p>
         </p:txBody>
       </p:sp>
@@ -21741,7 +21498,8 @@
           <a:p>
             <a:fld id="{5C90BBFB-3575-4A10-8500-5F80E07E5E59}" type="datetime1">
               <a:rPr lang="zh-CN" altLang="en-US" smtClean="0"/>
-              <a:t>2015/12/19</a:t>
+              <a:pPr/>
+              <a:t>2016/2/21</a:t>
             </a:fld>
             <a:endParaRPr lang="zh-CN" altLang="en-US"/>
           </a:p>
@@ -21799,6 +21557,13 @@
   <p:clrMapOvr>
     <a:masterClrMapping/>
   </p:clrMapOvr>
+  <p:timing>
+    <p:tnLst>
+      <p:par>
+        <p:cTn id="1" dur="indefinite" restart="never" nodeType="tmRoot"/>
+      </p:par>
+    </p:tnLst>
+  </p:timing>
 </p:sld>
 </file>
 
@@ -21966,7 +21731,8 @@
           <a:p>
             <a:fld id="{A7001B82-35B6-4010-9DFF-35EF3D891961}" type="datetime1">
               <a:rPr lang="zh-CN" altLang="en-US" smtClean="0"/>
-              <a:t>2015/12/19</a:t>
+              <a:pPr/>
+              <a:t>2016/2/21</a:t>
             </a:fld>
             <a:endParaRPr lang="zh-CN" altLang="en-US"/>
           </a:p>
@@ -22048,11 +21814,7 @@
             <a:pPr algn="l"/>
             <a:r>
               <a:rPr lang="zh-CN" altLang="zh-CN" dirty="0" smtClean="0"/>
-              <a:t>中加职业教育差异</a:t>
-            </a:r>
-            <a:r>
-              <a:rPr lang="zh-CN" altLang="zh-CN" dirty="0" smtClean="0"/>
-              <a:t>浅析</a:t>
+              <a:t>中加职业教育差异浅析</a:t>
             </a:r>
             <a:r>
               <a:rPr lang="en-US" altLang="zh-CN" dirty="0" smtClean="0"/>
@@ -22063,11 +21825,7 @@
             </a:br>
             <a:r>
               <a:rPr lang="zh-CN" altLang="zh-CN" dirty="0" smtClean="0"/>
-              <a:t>——</a:t>
-            </a:r>
-            <a:r>
-              <a:rPr lang="zh-CN" altLang="zh-CN" dirty="0" smtClean="0"/>
-              <a:t>以计算机网络技术为例</a:t>
+              <a:t>——以计算机网络技术为例</a:t>
             </a:r>
             <a:endParaRPr lang="zh-CN" altLang="en-US" dirty="0"/>
           </a:p>
@@ -22207,11 +21965,7 @@
             </a:r>
             <a:r>
               <a:rPr lang="zh-CN" altLang="zh-CN" sz="2000" dirty="0" smtClean="0"/>
-              <a:t>职业</a:t>
-            </a:r>
-            <a:r>
-              <a:rPr lang="zh-CN" altLang="zh-CN" sz="2000" dirty="0" smtClean="0"/>
-              <a:t>素养</a:t>
+              <a:t>职业素养</a:t>
             </a:r>
             <a:endParaRPr lang="en-US" altLang="zh-CN" sz="2000" dirty="0" smtClean="0"/>
           </a:p>
@@ -22281,7 +22035,8 @@
           <a:p>
             <a:fld id="{563684A5-147A-4161-A7E5-EF613A1103A4}" type="datetime1">
               <a:rPr lang="zh-CN" altLang="en-US" smtClean="0"/>
-              <a:t>2015/12/19</a:t>
+              <a:pPr/>
+              <a:t>2016/2/21</a:t>
             </a:fld>
             <a:endParaRPr lang="zh-CN" altLang="en-US"/>
           </a:p>

</xml_diff>

<commit_message>
Draft version of the teaching planning proposal. Also updated the course structure diagram in slices and added two course syllabuses.
</commit_message>
<xml_diff>
--- a/_Holland_College/赴加培训工作汇报.pptx
+++ b/_Holland_College/赴加培训工作汇报.pptx
@@ -5,7 +5,7 @@
     <p:sldMasterId id="2147483660" r:id="rId1"/>
   </p:sldMasterIdLst>
   <p:notesMasterIdLst>
-    <p:notesMasterId r:id="rId23"/>
+    <p:notesMasterId r:id="rId24"/>
   </p:notesMasterIdLst>
   <p:sldIdLst>
     <p:sldId id="256" r:id="rId2"/>
@@ -29,6 +29,7 @@
     <p:sldId id="274" r:id="rId20"/>
     <p:sldId id="276" r:id="rId21"/>
     <p:sldId id="277" r:id="rId22"/>
+    <p:sldId id="279" r:id="rId23"/>
   </p:sldIdLst>
   <p:sldSz cx="9144000" cy="6858000" type="screen4x3"/>
   <p:notesSz cx="6858000" cy="9144000"/>
@@ -3151,8 +3152,8 @@
     <dgm:cxn modelId="{92D1E9D9-0E71-430A-AD81-D9DABF58D0F0}" srcId="{0AED848A-AFCB-466A-81AB-D89BE5FD014D}" destId="{9A2883D1-E9D6-4C2D-BBD0-FB1F001515DA}" srcOrd="2" destOrd="0" parTransId="{C4BBA833-6254-42BC-AA7E-1A60E5C0A1CE}" sibTransId="{1F0286B5-CE28-4E67-B231-9DE30FF40E33}"/>
     <dgm:cxn modelId="{86F62A60-801A-41F3-9A2C-DE8F3A445776}" srcId="{2196DF3C-D567-4AB5-A162-D967C840CB4E}" destId="{9DCC3710-8ED8-4C9F-8B5D-1AD1F5FF024A}" srcOrd="3" destOrd="0" parTransId="{E2825FA9-EAC1-46E6-9BAC-1C56ECCE1C86}" sibTransId="{287CF478-D85A-4D61-8C40-6F64BB738635}"/>
     <dgm:cxn modelId="{AE27096E-840F-4BE5-B10A-B5EB39EA547C}" type="presOf" srcId="{0248731D-9C85-450C-835E-2A0502E35468}" destId="{7736769B-6095-487F-8966-2468C18C925E}" srcOrd="0" destOrd="4" presId="urn:microsoft.com/office/officeart/2005/8/layout/hList1"/>
+    <dgm:cxn modelId="{D674D114-65DF-4B5F-AEC7-1CF93118FFCC}" srcId="{2196DF3C-D567-4AB5-A162-D967C840CB4E}" destId="{AC9C7364-A705-4DC4-9368-68A0CE20653C}" srcOrd="5" destOrd="0" parTransId="{76FF5E42-5241-46E6-8520-CDD19C331025}" sibTransId="{9AB0161A-6CB1-46B0-B8B6-B00305E4B384}"/>
     <dgm:cxn modelId="{96EEDC84-FEC9-41C1-BEED-7B31BE60C7C4}" srcId="{2196DF3C-D567-4AB5-A162-D967C840CB4E}" destId="{AB3E949C-DB19-4D4D-B050-1D4C7754295A}" srcOrd="2" destOrd="0" parTransId="{6CE188ED-B656-411E-B0B4-D621F73D663B}" sibTransId="{4141B92E-A255-4C64-9352-4E2FB7C0C57B}"/>
-    <dgm:cxn modelId="{D674D114-65DF-4B5F-AEC7-1CF93118FFCC}" srcId="{2196DF3C-D567-4AB5-A162-D967C840CB4E}" destId="{AC9C7364-A705-4DC4-9368-68A0CE20653C}" srcOrd="5" destOrd="0" parTransId="{76FF5E42-5241-46E6-8520-CDD19C331025}" sibTransId="{9AB0161A-6CB1-46B0-B8B6-B00305E4B384}"/>
     <dgm:cxn modelId="{3E13F380-507B-4BB4-975D-7D0A04BEF814}" type="presOf" srcId="{C26C2AD9-A528-4F9B-969A-43118F4F298B}" destId="{7736769B-6095-487F-8966-2468C18C925E}" srcOrd="0" destOrd="1" presId="urn:microsoft.com/office/officeart/2005/8/layout/hList1"/>
     <dgm:cxn modelId="{41345DF9-107F-4E5F-BC33-FDB85E6A480B}" srcId="{CD120676-85BC-4A82-9F25-1FDA0DE25F04}" destId="{0AED848A-AFCB-466A-81AB-D89BE5FD014D}" srcOrd="0" destOrd="0" parTransId="{F6A9EDC1-43AC-44AF-BA00-64CD7F30F867}" sibTransId="{FFD9F7B8-3D61-41DC-B9B9-115B2C07A505}"/>
     <dgm:cxn modelId="{BFFCD269-952D-4B12-9346-BBB061808553}" type="presOf" srcId="{955FAFFD-9AEA-4FB6-BF33-BA2BD4A0C486}" destId="{48A9371C-3646-4CAD-ADE7-4E185081914F}" srcOrd="0" destOrd="0" presId="urn:microsoft.com/office/officeart/2005/8/layout/hList1"/>
@@ -9906,7 +9907,7 @@
             <a:fld id="{156D85B6-0148-4422-89B3-46B664610A4A}" type="datetimeFigureOut">
               <a:rPr lang="zh-CN" altLang="en-US" smtClean="0"/>
               <a:pPr/>
-              <a:t>2016/2/21</a:t>
+              <a:t>2016/3/13</a:t>
             </a:fld>
             <a:endParaRPr lang="zh-CN" altLang="en-US"/>
           </a:p>
@@ -10798,7 +10799,7 @@
             <a:fld id="{CEA5D486-1117-4BED-BAF6-4BFF4269916E}" type="datetime1">
               <a:rPr lang="zh-CN" altLang="en-US" smtClean="0"/>
               <a:pPr/>
-              <a:t>2016/2/21</a:t>
+              <a:t>2016/3/13</a:t>
             </a:fld>
             <a:endParaRPr lang="zh-CN" altLang="en-US"/>
           </a:p>
@@ -10996,7 +10997,7 @@
             <a:fld id="{A71FC5A1-761A-4308-BD6B-326403E080CD}" type="datetime1">
               <a:rPr lang="zh-CN" altLang="en-US" smtClean="0"/>
               <a:pPr/>
-              <a:t>2016/2/21</a:t>
+              <a:t>2016/3/13</a:t>
             </a:fld>
             <a:endParaRPr lang="zh-CN" altLang="en-US"/>
           </a:p>
@@ -11183,7 +11184,7 @@
             <a:fld id="{8D3A9B24-97F4-4EE2-A44B-D23EA884538B}" type="datetime1">
               <a:rPr lang="zh-CN" altLang="en-US" smtClean="0"/>
               <a:pPr/>
-              <a:t>2016/2/21</a:t>
+              <a:t>2016/3/13</a:t>
             </a:fld>
             <a:endParaRPr lang="zh-CN" altLang="en-US"/>
           </a:p>
@@ -11335,7 +11336,7 @@
             <a:fld id="{5C90BBFB-3575-4A10-8500-5F80E07E5E59}" type="datetime1">
               <a:rPr lang="zh-CN" altLang="en-US" smtClean="0"/>
               <a:pPr/>
-              <a:t>2016/2/21</a:t>
+              <a:t>2016/3/13</a:t>
             </a:fld>
             <a:endParaRPr lang="zh-CN" altLang="en-US"/>
           </a:p>
@@ -11592,7 +11593,7 @@
             <a:fld id="{3B70A26D-2D0B-4864-951D-E7F2642ED513}" type="datetime1">
               <a:rPr lang="zh-CN" altLang="en-US" smtClean="0"/>
               <a:pPr/>
-              <a:t>2016/2/21</a:t>
+              <a:t>2016/3/13</a:t>
             </a:fld>
             <a:endParaRPr lang="zh-CN" altLang="en-US"/>
           </a:p>
@@ -12003,7 +12004,7 @@
             <a:fld id="{C39F596E-3A4D-47A1-9757-C892432C17C7}" type="datetime1">
               <a:rPr lang="zh-CN" altLang="en-US" smtClean="0"/>
               <a:pPr/>
-              <a:t>2016/2/21</a:t>
+              <a:t>2016/3/13</a:t>
             </a:fld>
             <a:endParaRPr lang="zh-CN" altLang="en-US"/>
           </a:p>
@@ -12451,7 +12452,7 @@
             <a:fld id="{9385F7E3-3F13-4B36-B9DC-9FD8C6D4BBC2}" type="datetime1">
               <a:rPr lang="zh-CN" altLang="en-US" smtClean="0"/>
               <a:pPr/>
-              <a:t>2016/2/21</a:t>
+              <a:t>2016/3/13</a:t>
             </a:fld>
             <a:endParaRPr lang="zh-CN" altLang="en-US"/>
           </a:p>
@@ -12554,7 +12555,7 @@
             <a:fld id="{35D0F4C0-711E-497B-B62E-E81A21DB9DB3}" type="datetime1">
               <a:rPr lang="zh-CN" altLang="en-US" smtClean="0"/>
               <a:pPr/>
-              <a:t>2016/2/21</a:t>
+              <a:t>2016/3/13</a:t>
             </a:fld>
             <a:endParaRPr lang="zh-CN" altLang="en-US"/>
           </a:p>
@@ -12677,7 +12678,7 @@
             <a:fld id="{1C3C145A-B42E-4B9C-984E-E26179E786B1}" type="datetime1">
               <a:rPr lang="zh-CN" altLang="en-US" smtClean="0"/>
               <a:pPr/>
-              <a:t>2016/2/21</a:t>
+              <a:t>2016/3/13</a:t>
             </a:fld>
             <a:endParaRPr lang="zh-CN" altLang="en-US"/>
           </a:p>
@@ -12953,7 +12954,7 @@
             <a:fld id="{4BDD6FD7-C5B3-485D-B9AC-A535C25FF803}" type="datetime1">
               <a:rPr lang="zh-CN" altLang="en-US" smtClean="0"/>
               <a:pPr/>
-              <a:t>2016/2/21</a:t>
+              <a:t>2016/3/13</a:t>
             </a:fld>
             <a:endParaRPr lang="zh-CN" altLang="en-US"/>
           </a:p>
@@ -13160,7 +13161,7 @@
             <a:fld id="{65779012-46BA-4B97-A4D2-7F919F3779B7}" type="datetime1">
               <a:rPr lang="zh-CN" altLang="en-US" smtClean="0"/>
               <a:pPr/>
-              <a:t>2016/2/21</a:t>
+              <a:t>2016/3/13</a:t>
             </a:fld>
             <a:endParaRPr lang="zh-CN" altLang="en-US"/>
           </a:p>
@@ -14271,7 +14272,7 @@
             <a:fld id="{DE35F055-2903-4FF6-8CA2-166743B1189B}" type="datetime1">
               <a:rPr lang="zh-CN" altLang="en-US" smtClean="0"/>
               <a:pPr/>
-              <a:t>2016/2/21</a:t>
+              <a:t>2016/3/13</a:t>
             </a:fld>
             <a:endParaRPr lang="zh-CN" altLang="en-US"/>
           </a:p>
@@ -14881,7 +14882,7 @@
             <a:fld id="{CFF764D2-8554-46E3-A7A9-1D574186CFA6}" type="datetime1">
               <a:rPr lang="zh-CN" altLang="en-US" smtClean="0"/>
               <a:pPr/>
-              <a:t>2016/2/21</a:t>
+              <a:t>2016/3/13</a:t>
             </a:fld>
             <a:endParaRPr lang="zh-CN" altLang="en-US"/>
           </a:p>
@@ -16793,7 +16794,7 @@
             <a:fld id="{AB7AD744-40CD-4F52-ADBE-EAA2D4C2C506}" type="datetime1">
               <a:rPr lang="zh-CN" altLang="en-US" smtClean="0"/>
               <a:pPr/>
-              <a:t>2016/2/21</a:t>
+              <a:t>2016/3/13</a:t>
             </a:fld>
             <a:endParaRPr lang="zh-CN" altLang="en-US"/>
           </a:p>
@@ -17399,7 +17400,7 @@
             <a:fld id="{A6565C5F-CB2F-409F-B41A-F127FF6E73B2}" type="datetime1">
               <a:rPr lang="zh-CN" altLang="en-US" smtClean="0"/>
               <a:pPr/>
-              <a:t>2016/2/21</a:t>
+              <a:t>2016/3/13</a:t>
             </a:fld>
             <a:endParaRPr lang="zh-CN" altLang="en-US"/>
           </a:p>
@@ -17741,7 +17742,7 @@
             <a:fld id="{145B1BDD-A46C-49E6-8171-83C3CA25E7DD}" type="datetime1">
               <a:rPr lang="zh-CN" altLang="en-US" smtClean="0"/>
               <a:pPr/>
-              <a:t>2016/2/21</a:t>
+              <a:t>2016/3/13</a:t>
             </a:fld>
             <a:endParaRPr lang="zh-CN" altLang="en-US"/>
           </a:p>
@@ -18019,7 +18020,7 @@
             <a:fld id="{3D879017-49CE-413A-9ED3-1174CAA6D558}" type="datetime1">
               <a:rPr lang="zh-CN" altLang="en-US" smtClean="0"/>
               <a:pPr/>
-              <a:t>2016/2/21</a:t>
+              <a:t>2016/3/13</a:t>
             </a:fld>
             <a:endParaRPr lang="zh-CN" altLang="en-US"/>
           </a:p>
@@ -18268,17 +18269,7 @@
                   </a:schemeClr>
                 </a:solidFill>
               </a:rPr>
-              <a:t>工程师</a:t>
-            </a:r>
-            <a:r>
-              <a:rPr lang="zh-CN" altLang="zh-CN" sz="2800" dirty="0" smtClean="0">
-                <a:solidFill>
-                  <a:schemeClr val="accent1">
-                    <a:lumMod val="75000"/>
-                  </a:schemeClr>
-                </a:solidFill>
-              </a:rPr>
-              <a:t>素质</a:t>
+              <a:t>工程师素质</a:t>
             </a:r>
             <a:endParaRPr lang="en-US" altLang="zh-CN" sz="2800" dirty="0" smtClean="0">
               <a:solidFill>
@@ -18349,7 +18340,7 @@
             <a:fld id="{8F59C018-2DEC-4B13-BB00-AD5A44BE6D51}" type="datetime1">
               <a:rPr lang="zh-CN" altLang="en-US" smtClean="0"/>
               <a:pPr/>
-              <a:t>2016/2/21</a:t>
+              <a:t>2016/3/13</a:t>
             </a:fld>
             <a:endParaRPr lang="zh-CN" altLang="en-US"/>
           </a:p>
@@ -18939,7 +18930,7 @@
             <a:fld id="{0172824C-87FD-4CC6-8C25-40CD5F0CFD2E}" type="datetime1">
               <a:rPr lang="zh-CN" altLang="en-US" smtClean="0"/>
               <a:pPr algn="ctr"/>
-              <a:t>2016/2/21</a:t>
+              <a:t>2016/3/13</a:t>
             </a:fld>
             <a:endParaRPr lang="zh-CN" altLang="en-US" dirty="0"/>
           </a:p>
@@ -19109,7 +19100,7 @@
             <a:fld id="{51140375-6196-47BA-B22A-5D26720750D1}" type="datetime1">
               <a:rPr lang="zh-CN" altLang="en-US" smtClean="0"/>
               <a:pPr/>
-              <a:t>2016/2/21</a:t>
+              <a:t>2016/3/13</a:t>
             </a:fld>
             <a:endParaRPr lang="zh-CN" altLang="en-US"/>
           </a:p>
@@ -19342,7 +19333,7 @@
             <a:fld id="{0EC771DE-8427-4F03-AF01-E02D96D894DD}" type="datetime1">
               <a:rPr lang="zh-CN" altLang="en-US" smtClean="0"/>
               <a:pPr/>
-              <a:t>2016/2/21</a:t>
+              <a:t>2016/3/13</a:t>
             </a:fld>
             <a:endParaRPr lang="zh-CN" altLang="en-US"/>
           </a:p>
@@ -19489,7 +19480,7 @@
             <a:fld id="{52D3C40D-945F-47F7-A166-38486B81D340}" type="datetime1">
               <a:rPr lang="zh-CN" altLang="en-US" smtClean="0"/>
               <a:pPr/>
-              <a:t>2016/2/21</a:t>
+              <a:t>2016/3/13</a:t>
             </a:fld>
             <a:endParaRPr lang="zh-CN" altLang="en-US"/>
           </a:p>
@@ -19681,7 +19672,7 @@
             <a:fld id="{C84272F6-4F7E-4FF1-9B18-6C26EF87531F}" type="datetime1">
               <a:rPr lang="zh-CN" altLang="en-US" smtClean="0"/>
               <a:pPr/>
-              <a:t>2016/2/21</a:t>
+              <a:t>2016/3/13</a:t>
             </a:fld>
             <a:endParaRPr lang="zh-CN" altLang="en-US"/>
           </a:p>
@@ -19801,7 +19792,7 @@
             <a:fld id="{35D0F4C0-711E-497B-B62E-E81A21DB9DB3}" type="datetime1">
               <a:rPr lang="zh-CN" altLang="en-US" smtClean="0"/>
               <a:pPr/>
-              <a:t>2016/2/21</a:t>
+              <a:t>2016/3/13</a:t>
             </a:fld>
             <a:endParaRPr lang="zh-CN" altLang="en-US"/>
           </a:p>
@@ -19931,7 +19922,7 @@
             <a:fld id="{5C90BBFB-3575-4A10-8500-5F80E07E5E59}" type="datetime1">
               <a:rPr lang="zh-CN" altLang="en-US" smtClean="0"/>
               <a:pPr/>
-              <a:t>2016/2/21</a:t>
+              <a:t>2016/3/13</a:t>
             </a:fld>
             <a:endParaRPr lang="zh-CN" altLang="en-US"/>
           </a:p>
@@ -19996,6 +19987,1691 @@
       </p:par>
     </p:tnLst>
   </p:timing>
+</p:sld>
+</file>
+
+<file path=ppt/slides/slide22.xml><?xml version="1.0" encoding="utf-8"?>
+<p:sld xmlns:a="http://schemas.openxmlformats.org/drawingml/2006/main" xmlns:r="http://schemas.openxmlformats.org/officeDocument/2006/relationships" xmlns:p="http://schemas.openxmlformats.org/presentationml/2006/main">
+  <p:cSld>
+    <p:spTree>
+      <p:nvGrpSpPr>
+        <p:cNvPr id="1" name=""/>
+        <p:cNvGrpSpPr/>
+        <p:nvPr/>
+      </p:nvGrpSpPr>
+      <p:grpSpPr>
+        <a:xfrm>
+          <a:off x="0" y="0"/>
+          <a:ext cx="0" cy="0"/>
+          <a:chOff x="0" y="0"/>
+          <a:chExt cx="0" cy="0"/>
+        </a:xfrm>
+      </p:grpSpPr>
+      <p:sp>
+        <p:nvSpPr>
+          <p:cNvPr id="3" name="日期占位符 2"/>
+          <p:cNvSpPr>
+            <a:spLocks noGrp="1"/>
+          </p:cNvSpPr>
+          <p:nvPr>
+            <p:ph type="dt" sz="half" idx="10"/>
+          </p:nvPr>
+        </p:nvSpPr>
+        <p:spPr/>
+        <p:txBody>
+          <a:bodyPr/>
+          <a:lstStyle/>
+          <a:p>
+            <a:fld id="{5C90BBFB-3575-4A10-8500-5F80E07E5E59}" type="datetime1">
+              <a:rPr lang="zh-CN" altLang="en-US" smtClean="0"/>
+              <a:pPr/>
+              <a:t>2016/3/13</a:t>
+            </a:fld>
+            <a:endParaRPr lang="zh-CN" altLang="en-US"/>
+          </a:p>
+        </p:txBody>
+      </p:sp>
+      <p:sp>
+        <p:nvSpPr>
+          <p:cNvPr id="4" name="灯片编号占位符 3"/>
+          <p:cNvSpPr>
+            <a:spLocks noGrp="1"/>
+          </p:cNvSpPr>
+          <p:nvPr>
+            <p:ph type="sldNum" sz="quarter" idx="12"/>
+          </p:nvPr>
+        </p:nvSpPr>
+        <p:spPr/>
+        <p:txBody>
+          <a:bodyPr/>
+          <a:lstStyle/>
+          <a:p>
+            <a:fld id="{0C913308-F349-4B6D-A68A-DD1791B4A57B}" type="slidenum">
+              <a:rPr lang="zh-CN" altLang="en-US" smtClean="0"/>
+              <a:pPr/>
+              <a:t>22</a:t>
+            </a:fld>
+            <a:endParaRPr lang="zh-CN" altLang="en-US"/>
+          </a:p>
+        </p:txBody>
+      </p:sp>
+      <p:grpSp>
+        <p:nvGrpSpPr>
+          <p:cNvPr id="114" name="组合 113"/>
+          <p:cNvGrpSpPr/>
+          <p:nvPr/>
+        </p:nvGrpSpPr>
+        <p:grpSpPr>
+          <a:xfrm>
+            <a:off x="251520" y="620688"/>
+            <a:ext cx="8712968" cy="5040560"/>
+            <a:chOff x="251520" y="620688"/>
+            <a:chExt cx="8712968" cy="5040560"/>
+          </a:xfrm>
+        </p:grpSpPr>
+        <p:sp>
+          <p:nvSpPr>
+            <p:cNvPr id="22" name="矩形 21"/>
+            <p:cNvSpPr/>
+            <p:nvPr/>
+          </p:nvSpPr>
+          <p:spPr>
+            <a:xfrm>
+              <a:off x="251520" y="620688"/>
+              <a:ext cx="8712968" cy="1296144"/>
+            </a:xfrm>
+            <a:prstGeom prst="rect">
+              <a:avLst/>
+            </a:prstGeom>
+            <a:gradFill flip="none" rotWithShape="1">
+              <a:gsLst>
+                <a:gs pos="0">
+                  <a:schemeClr val="accent5">
+                    <a:lumMod val="20000"/>
+                    <a:lumOff val="80000"/>
+                    <a:shade val="30000"/>
+                    <a:satMod val="115000"/>
+                  </a:schemeClr>
+                </a:gs>
+                <a:gs pos="50000">
+                  <a:schemeClr val="accent5">
+                    <a:lumMod val="20000"/>
+                    <a:lumOff val="80000"/>
+                    <a:shade val="67500"/>
+                    <a:satMod val="115000"/>
+                  </a:schemeClr>
+                </a:gs>
+                <a:gs pos="100000">
+                  <a:schemeClr val="accent5">
+                    <a:lumMod val="20000"/>
+                    <a:lumOff val="80000"/>
+                    <a:shade val="100000"/>
+                    <a:satMod val="115000"/>
+                  </a:schemeClr>
+                </a:gs>
+              </a:gsLst>
+              <a:lin ang="2700000" scaled="1"/>
+              <a:tileRect/>
+            </a:gradFill>
+            <a:ln>
+              <a:noFill/>
+            </a:ln>
+          </p:spPr>
+          <p:style>
+            <a:lnRef idx="1">
+              <a:schemeClr val="dk1"/>
+            </a:lnRef>
+            <a:fillRef idx="2">
+              <a:schemeClr val="dk1"/>
+            </a:fillRef>
+            <a:effectRef idx="1">
+              <a:schemeClr val="dk1"/>
+            </a:effectRef>
+            <a:fontRef idx="minor">
+              <a:schemeClr val="dk1"/>
+            </a:fontRef>
+          </p:style>
+          <p:txBody>
+            <a:bodyPr rtlCol="0" anchor="t"/>
+            <a:lstStyle/>
+            <a:p>
+              <a:r>
+                <a:rPr lang="zh-CN" altLang="en-US" dirty="0" smtClean="0"/>
+                <a:t>第</a:t>
+              </a:r>
+              <a:r>
+                <a:rPr lang="en-US" altLang="zh-CN" dirty="0" smtClean="0"/>
+                <a:t>2</a:t>
+              </a:r>
+              <a:r>
+                <a:rPr lang="zh-CN" altLang="en-US" dirty="0" smtClean="0"/>
+                <a:t>学期</a:t>
+              </a:r>
+              <a:endParaRPr lang="zh-CN" altLang="en-US" dirty="0"/>
+            </a:p>
+          </p:txBody>
+        </p:sp>
+        <p:sp>
+          <p:nvSpPr>
+            <p:cNvPr id="23" name="矩形 22"/>
+            <p:cNvSpPr/>
+            <p:nvPr/>
+          </p:nvSpPr>
+          <p:spPr>
+            <a:xfrm>
+              <a:off x="251520" y="1916832"/>
+              <a:ext cx="8712968" cy="1872208"/>
+            </a:xfrm>
+            <a:prstGeom prst="rect">
+              <a:avLst/>
+            </a:prstGeom>
+            <a:solidFill>
+              <a:schemeClr val="accent6">
+                <a:lumMod val="20000"/>
+                <a:lumOff val="80000"/>
+              </a:schemeClr>
+            </a:solidFill>
+            <a:ln>
+              <a:noFill/>
+            </a:ln>
+          </p:spPr>
+          <p:style>
+            <a:lnRef idx="1">
+              <a:schemeClr val="dk1"/>
+            </a:lnRef>
+            <a:fillRef idx="2">
+              <a:schemeClr val="dk1"/>
+            </a:fillRef>
+            <a:effectRef idx="1">
+              <a:schemeClr val="dk1"/>
+            </a:effectRef>
+            <a:fontRef idx="minor">
+              <a:schemeClr val="dk1"/>
+            </a:fontRef>
+          </p:style>
+          <p:txBody>
+            <a:bodyPr rtlCol="0" anchor="t"/>
+            <a:lstStyle/>
+            <a:p>
+              <a:r>
+                <a:rPr lang="zh-CN" altLang="en-US" dirty="0" smtClean="0"/>
+                <a:t>第</a:t>
+              </a:r>
+              <a:r>
+                <a:rPr lang="en-US" altLang="zh-CN" dirty="0" smtClean="0"/>
+                <a:t>3</a:t>
+              </a:r>
+              <a:r>
+                <a:rPr lang="zh-CN" altLang="en-US" dirty="0" smtClean="0"/>
+                <a:t>学期</a:t>
+              </a:r>
+              <a:endParaRPr lang="zh-CN" altLang="en-US" dirty="0"/>
+            </a:p>
+          </p:txBody>
+        </p:sp>
+        <p:sp>
+          <p:nvSpPr>
+            <p:cNvPr id="24" name="矩形 23"/>
+            <p:cNvSpPr/>
+            <p:nvPr/>
+          </p:nvSpPr>
+          <p:spPr>
+            <a:xfrm>
+              <a:off x="251520" y="3789040"/>
+              <a:ext cx="8712968" cy="1872208"/>
+            </a:xfrm>
+            <a:prstGeom prst="rect">
+              <a:avLst/>
+            </a:prstGeom>
+            <a:solidFill>
+              <a:schemeClr val="tx2">
+                <a:lumMod val="20000"/>
+                <a:lumOff val="80000"/>
+              </a:schemeClr>
+            </a:solidFill>
+            <a:ln>
+              <a:noFill/>
+            </a:ln>
+          </p:spPr>
+          <p:style>
+            <a:lnRef idx="1">
+              <a:schemeClr val="dk1"/>
+            </a:lnRef>
+            <a:fillRef idx="2">
+              <a:schemeClr val="dk1"/>
+            </a:fillRef>
+            <a:effectRef idx="1">
+              <a:schemeClr val="dk1"/>
+            </a:effectRef>
+            <a:fontRef idx="minor">
+              <a:schemeClr val="dk1"/>
+            </a:fontRef>
+          </p:style>
+          <p:txBody>
+            <a:bodyPr rtlCol="0" anchor="t"/>
+            <a:lstStyle/>
+            <a:p>
+              <a:r>
+                <a:rPr lang="zh-CN" altLang="en-US" dirty="0" smtClean="0"/>
+                <a:t>第</a:t>
+              </a:r>
+              <a:r>
+                <a:rPr lang="en-US" altLang="zh-CN" dirty="0" smtClean="0"/>
+                <a:t>4</a:t>
+              </a:r>
+              <a:r>
+                <a:rPr lang="zh-CN" altLang="en-US" dirty="0" smtClean="0"/>
+                <a:t>学期</a:t>
+              </a:r>
+              <a:endParaRPr lang="zh-CN" altLang="en-US" dirty="0"/>
+            </a:p>
+          </p:txBody>
+        </p:sp>
+        <p:sp>
+          <p:nvSpPr>
+            <p:cNvPr id="16" name="矩形 15"/>
+            <p:cNvSpPr/>
+            <p:nvPr/>
+          </p:nvSpPr>
+          <p:spPr>
+            <a:xfrm>
+              <a:off x="2843808" y="5085184"/>
+              <a:ext cx="3168352" cy="432048"/>
+            </a:xfrm>
+            <a:prstGeom prst="rect">
+              <a:avLst/>
+            </a:prstGeom>
+          </p:spPr>
+          <p:style>
+            <a:lnRef idx="1">
+              <a:schemeClr val="accent3"/>
+            </a:lnRef>
+            <a:fillRef idx="2">
+              <a:schemeClr val="accent3"/>
+            </a:fillRef>
+            <a:effectRef idx="1">
+              <a:schemeClr val="accent3"/>
+            </a:effectRef>
+            <a:fontRef idx="minor">
+              <a:schemeClr val="dk1"/>
+            </a:fontRef>
+          </p:style>
+          <p:txBody>
+            <a:bodyPr rtlCol="0" anchor="ctr"/>
+            <a:lstStyle/>
+            <a:p>
+              <a:pPr algn="ctr"/>
+              <a:r>
+                <a:rPr lang="zh-CN" altLang="en-US" dirty="0" smtClean="0"/>
+                <a:t>综合项目：网络服务应用构建</a:t>
+              </a:r>
+              <a:endParaRPr lang="zh-CN" altLang="en-US" dirty="0"/>
+            </a:p>
+          </p:txBody>
+        </p:sp>
+        <p:grpSp>
+          <p:nvGrpSpPr>
+            <p:cNvPr id="21" name="组合 20"/>
+            <p:cNvGrpSpPr/>
+            <p:nvPr/>
+          </p:nvGrpSpPr>
+          <p:grpSpPr>
+            <a:xfrm>
+              <a:off x="323528" y="1124744"/>
+              <a:ext cx="8568952" cy="432048"/>
+              <a:chOff x="323528" y="1124744"/>
+              <a:chExt cx="8568952" cy="432048"/>
+            </a:xfrm>
+          </p:grpSpPr>
+          <p:sp>
+            <p:nvSpPr>
+              <p:cNvPr id="6" name="矩形 5"/>
+              <p:cNvSpPr/>
+              <p:nvPr/>
+            </p:nvSpPr>
+            <p:spPr>
+              <a:xfrm>
+                <a:off x="323528" y="1124744"/>
+                <a:ext cx="2304256" cy="432048"/>
+              </a:xfrm>
+              <a:prstGeom prst="rect">
+                <a:avLst/>
+              </a:prstGeom>
+            </p:spPr>
+            <p:style>
+              <a:lnRef idx="1">
+                <a:schemeClr val="accent1"/>
+              </a:lnRef>
+              <a:fillRef idx="2">
+                <a:schemeClr val="accent1"/>
+              </a:fillRef>
+              <a:effectRef idx="1">
+                <a:schemeClr val="accent1"/>
+              </a:effectRef>
+              <a:fontRef idx="minor">
+                <a:schemeClr val="dk1"/>
+              </a:fontRef>
+            </p:style>
+            <p:txBody>
+              <a:bodyPr rtlCol="0" anchor="ctr"/>
+              <a:lstStyle/>
+              <a:p>
+                <a:pPr algn="ctr"/>
+                <a:r>
+                  <a:rPr lang="en-US" altLang="zh-CN" dirty="0" smtClean="0"/>
+                  <a:t>Linux</a:t>
+                </a:r>
+                <a:r>
+                  <a:rPr lang="zh-CN" altLang="en-US" dirty="0" smtClean="0"/>
+                  <a:t>服务器管理</a:t>
+                </a:r>
+                <a:endParaRPr lang="zh-CN" altLang="en-US" dirty="0"/>
+              </a:p>
+            </p:txBody>
+          </p:sp>
+          <p:sp>
+            <p:nvSpPr>
+              <p:cNvPr id="10" name="矩形 9"/>
+              <p:cNvSpPr/>
+              <p:nvPr/>
+            </p:nvSpPr>
+            <p:spPr>
+              <a:xfrm>
+                <a:off x="2699792" y="1124744"/>
+                <a:ext cx="2448272" cy="432048"/>
+              </a:xfrm>
+              <a:prstGeom prst="rect">
+                <a:avLst/>
+              </a:prstGeom>
+            </p:spPr>
+            <p:style>
+              <a:lnRef idx="1">
+                <a:schemeClr val="accent2"/>
+              </a:lnRef>
+              <a:fillRef idx="2">
+                <a:schemeClr val="accent2"/>
+              </a:fillRef>
+              <a:effectRef idx="1">
+                <a:schemeClr val="accent2"/>
+              </a:effectRef>
+              <a:fontRef idx="minor">
+                <a:schemeClr val="dk1"/>
+              </a:fontRef>
+            </p:style>
+            <p:txBody>
+              <a:bodyPr rtlCol="0" anchor="ctr"/>
+              <a:lstStyle/>
+              <a:p>
+                <a:pPr algn="ctr"/>
+                <a:r>
+                  <a:rPr lang="en-US" altLang="zh-CN" dirty="0" smtClean="0"/>
+                  <a:t>Windows</a:t>
+                </a:r>
+                <a:r>
+                  <a:rPr lang="zh-CN" altLang="en-US" dirty="0" smtClean="0"/>
+                  <a:t>服务器管理</a:t>
+                </a:r>
+                <a:endParaRPr lang="zh-CN" altLang="en-US" dirty="0"/>
+              </a:p>
+            </p:txBody>
+          </p:sp>
+          <p:sp>
+            <p:nvSpPr>
+              <p:cNvPr id="17" name="矩形 16"/>
+              <p:cNvSpPr/>
+              <p:nvPr/>
+            </p:nvSpPr>
+            <p:spPr>
+              <a:xfrm>
+                <a:off x="5220072" y="1124744"/>
+                <a:ext cx="1800200" cy="432048"/>
+              </a:xfrm>
+              <a:prstGeom prst="rect">
+                <a:avLst/>
+              </a:prstGeom>
+            </p:spPr>
+            <p:style>
+              <a:lnRef idx="1">
+                <a:schemeClr val="accent4"/>
+              </a:lnRef>
+              <a:fillRef idx="2">
+                <a:schemeClr val="accent4"/>
+              </a:fillRef>
+              <a:effectRef idx="1">
+                <a:schemeClr val="accent4"/>
+              </a:effectRef>
+              <a:fontRef idx="minor">
+                <a:schemeClr val="dk1"/>
+              </a:fontRef>
+            </p:style>
+            <p:txBody>
+              <a:bodyPr rtlCol="0" anchor="ctr"/>
+              <a:lstStyle/>
+              <a:p>
+                <a:pPr algn="ctr"/>
+                <a:r>
+                  <a:rPr lang="zh-CN" altLang="en-US" dirty="0" smtClean="0"/>
+                  <a:t>网络与信息安全</a:t>
+                </a:r>
+                <a:endParaRPr lang="zh-CN" altLang="en-US" dirty="0"/>
+              </a:p>
+            </p:txBody>
+          </p:sp>
+          <p:sp>
+            <p:nvSpPr>
+              <p:cNvPr id="18" name="矩形 17"/>
+              <p:cNvSpPr/>
+              <p:nvPr/>
+            </p:nvSpPr>
+            <p:spPr>
+              <a:xfrm>
+                <a:off x="7092280" y="1124744"/>
+                <a:ext cx="1800200" cy="432048"/>
+              </a:xfrm>
+              <a:prstGeom prst="rect">
+                <a:avLst/>
+              </a:prstGeom>
+            </p:spPr>
+            <p:style>
+              <a:lnRef idx="1">
+                <a:schemeClr val="accent6"/>
+              </a:lnRef>
+              <a:fillRef idx="2">
+                <a:schemeClr val="accent6"/>
+              </a:fillRef>
+              <a:effectRef idx="1">
+                <a:schemeClr val="accent6"/>
+              </a:effectRef>
+              <a:fontRef idx="minor">
+                <a:schemeClr val="dk1"/>
+              </a:fontRef>
+            </p:style>
+            <p:txBody>
+              <a:bodyPr rtlCol="0" anchor="ctr"/>
+              <a:lstStyle/>
+              <a:p>
+                <a:pPr algn="ctr"/>
+                <a:r>
+                  <a:rPr lang="zh-CN" altLang="en-US" dirty="0" smtClean="0"/>
+                  <a:t>面向对象编程</a:t>
+                </a:r>
+                <a:endParaRPr lang="zh-CN" altLang="en-US" dirty="0"/>
+              </a:p>
+            </p:txBody>
+          </p:sp>
+        </p:grpSp>
+        <p:cxnSp>
+          <p:nvCxnSpPr>
+            <p:cNvPr id="29" name="直接箭头连接符 28"/>
+            <p:cNvCxnSpPr>
+              <a:stCxn id="18" idx="2"/>
+              <a:endCxn id="8" idx="0"/>
+            </p:cNvCxnSpPr>
+            <p:nvPr/>
+          </p:nvCxnSpPr>
+          <p:spPr>
+            <a:xfrm flipH="1">
+              <a:off x="6696236" y="1556792"/>
+              <a:ext cx="1296144" cy="2664296"/>
+            </a:xfrm>
+            <a:prstGeom prst="straightConnector1">
+              <a:avLst/>
+            </a:prstGeom>
+            <a:ln>
+              <a:tailEnd type="arrow"/>
+            </a:ln>
+          </p:spPr>
+          <p:style>
+            <a:lnRef idx="1">
+              <a:schemeClr val="accent6"/>
+            </a:lnRef>
+            <a:fillRef idx="0">
+              <a:schemeClr val="accent6"/>
+            </a:fillRef>
+            <a:effectRef idx="0">
+              <a:schemeClr val="accent6"/>
+            </a:effectRef>
+            <a:fontRef idx="minor">
+              <a:schemeClr val="tx1"/>
+            </a:fontRef>
+          </p:style>
+        </p:cxnSp>
+        <p:cxnSp>
+          <p:nvCxnSpPr>
+            <p:cNvPr id="28" name="直接箭头连接符 27"/>
+            <p:cNvCxnSpPr>
+              <a:stCxn id="6" idx="2"/>
+              <a:endCxn id="14" idx="0"/>
+            </p:cNvCxnSpPr>
+            <p:nvPr/>
+          </p:nvCxnSpPr>
+          <p:spPr>
+            <a:xfrm>
+              <a:off x="1475656" y="1556792"/>
+              <a:ext cx="1920044" cy="864096"/>
+            </a:xfrm>
+            <a:prstGeom prst="straightConnector1">
+              <a:avLst/>
+            </a:prstGeom>
+            <a:ln>
+              <a:tailEnd type="arrow"/>
+            </a:ln>
+          </p:spPr>
+          <p:style>
+            <a:lnRef idx="1">
+              <a:schemeClr val="accent1"/>
+            </a:lnRef>
+            <a:fillRef idx="0">
+              <a:schemeClr val="accent1"/>
+            </a:fillRef>
+            <a:effectRef idx="0">
+              <a:schemeClr val="accent1"/>
+            </a:effectRef>
+            <a:fontRef idx="minor">
+              <a:schemeClr val="tx1"/>
+            </a:fontRef>
+          </p:style>
+        </p:cxnSp>
+        <p:cxnSp>
+          <p:nvCxnSpPr>
+            <p:cNvPr id="30" name="直接箭头连接符 29"/>
+            <p:cNvCxnSpPr>
+              <a:stCxn id="10" idx="2"/>
+              <a:endCxn id="15" idx="0"/>
+            </p:cNvCxnSpPr>
+            <p:nvPr/>
+          </p:nvCxnSpPr>
+          <p:spPr>
+            <a:xfrm>
+              <a:off x="3923928" y="1556792"/>
+              <a:ext cx="1355812" cy="864096"/>
+            </a:xfrm>
+            <a:prstGeom prst="straightConnector1">
+              <a:avLst/>
+            </a:prstGeom>
+            <a:ln>
+              <a:tailEnd type="arrow"/>
+            </a:ln>
+          </p:spPr>
+          <p:style>
+            <a:lnRef idx="1">
+              <a:schemeClr val="accent2"/>
+            </a:lnRef>
+            <a:fillRef idx="0">
+              <a:schemeClr val="accent2"/>
+            </a:fillRef>
+            <a:effectRef idx="0">
+              <a:schemeClr val="accent2"/>
+            </a:effectRef>
+            <a:fontRef idx="minor">
+              <a:schemeClr val="tx1"/>
+            </a:fontRef>
+          </p:style>
+        </p:cxnSp>
+        <p:cxnSp>
+          <p:nvCxnSpPr>
+            <p:cNvPr id="31" name="直接箭头连接符 30"/>
+            <p:cNvCxnSpPr>
+              <a:stCxn id="10" idx="2"/>
+              <a:endCxn id="14" idx="0"/>
+            </p:cNvCxnSpPr>
+            <p:nvPr/>
+          </p:nvCxnSpPr>
+          <p:spPr>
+            <a:xfrm flipH="1">
+              <a:off x="3395700" y="1556792"/>
+              <a:ext cx="528228" cy="864096"/>
+            </a:xfrm>
+            <a:prstGeom prst="straightConnector1">
+              <a:avLst/>
+            </a:prstGeom>
+            <a:ln>
+              <a:tailEnd type="arrow"/>
+            </a:ln>
+          </p:spPr>
+          <p:style>
+            <a:lnRef idx="1">
+              <a:schemeClr val="accent2"/>
+            </a:lnRef>
+            <a:fillRef idx="0">
+              <a:schemeClr val="accent2"/>
+            </a:fillRef>
+            <a:effectRef idx="0">
+              <a:schemeClr val="accent2"/>
+            </a:effectRef>
+            <a:fontRef idx="minor">
+              <a:schemeClr val="tx1"/>
+            </a:fontRef>
+          </p:style>
+        </p:cxnSp>
+        <p:cxnSp>
+          <p:nvCxnSpPr>
+            <p:cNvPr id="38" name="直接箭头连接符 37"/>
+            <p:cNvCxnSpPr>
+              <a:stCxn id="6" idx="2"/>
+              <a:endCxn id="15" idx="0"/>
+            </p:cNvCxnSpPr>
+            <p:nvPr/>
+          </p:nvCxnSpPr>
+          <p:spPr>
+            <a:xfrm>
+              <a:off x="1475656" y="1556792"/>
+              <a:ext cx="3804084" cy="864096"/>
+            </a:xfrm>
+            <a:prstGeom prst="straightConnector1">
+              <a:avLst/>
+            </a:prstGeom>
+            <a:ln>
+              <a:tailEnd type="arrow"/>
+            </a:ln>
+          </p:spPr>
+          <p:style>
+            <a:lnRef idx="1">
+              <a:schemeClr val="accent1"/>
+            </a:lnRef>
+            <a:fillRef idx="0">
+              <a:schemeClr val="accent1"/>
+            </a:fillRef>
+            <a:effectRef idx="0">
+              <a:schemeClr val="accent1"/>
+            </a:effectRef>
+            <a:fontRef idx="minor">
+              <a:schemeClr val="tx1"/>
+            </a:fontRef>
+          </p:style>
+        </p:cxnSp>
+        <p:cxnSp>
+          <p:nvCxnSpPr>
+            <p:cNvPr id="41" name="直接箭头连接符 40"/>
+            <p:cNvCxnSpPr>
+              <a:stCxn id="10" idx="2"/>
+              <a:endCxn id="11" idx="0"/>
+            </p:cNvCxnSpPr>
+            <p:nvPr/>
+          </p:nvCxnSpPr>
+          <p:spPr>
+            <a:xfrm flipH="1">
+              <a:off x="1511660" y="1556792"/>
+              <a:ext cx="2412268" cy="864096"/>
+            </a:xfrm>
+            <a:prstGeom prst="straightConnector1">
+              <a:avLst/>
+            </a:prstGeom>
+            <a:ln>
+              <a:tailEnd type="arrow"/>
+            </a:ln>
+          </p:spPr>
+          <p:style>
+            <a:lnRef idx="1">
+              <a:schemeClr val="accent2"/>
+            </a:lnRef>
+            <a:fillRef idx="0">
+              <a:schemeClr val="accent2"/>
+            </a:fillRef>
+            <a:effectRef idx="0">
+              <a:schemeClr val="accent2"/>
+            </a:effectRef>
+            <a:fontRef idx="minor">
+              <a:schemeClr val="tx1"/>
+            </a:fontRef>
+          </p:style>
+        </p:cxnSp>
+        <p:cxnSp>
+          <p:nvCxnSpPr>
+            <p:cNvPr id="44" name="直接箭头连接符 43"/>
+            <p:cNvCxnSpPr>
+              <a:stCxn id="15" idx="2"/>
+              <a:endCxn id="7" idx="0"/>
+            </p:cNvCxnSpPr>
+            <p:nvPr/>
+          </p:nvCxnSpPr>
+          <p:spPr>
+            <a:xfrm flipH="1">
+              <a:off x="4535996" y="2852936"/>
+              <a:ext cx="743744" cy="360040"/>
+            </a:xfrm>
+            <a:prstGeom prst="straightConnector1">
+              <a:avLst/>
+            </a:prstGeom>
+            <a:ln>
+              <a:tailEnd type="arrow"/>
+            </a:ln>
+          </p:spPr>
+          <p:style>
+            <a:lnRef idx="1">
+              <a:schemeClr val="accent1"/>
+            </a:lnRef>
+            <a:fillRef idx="0">
+              <a:schemeClr val="accent1"/>
+            </a:fillRef>
+            <a:effectRef idx="0">
+              <a:schemeClr val="accent1"/>
+            </a:effectRef>
+            <a:fontRef idx="minor">
+              <a:schemeClr val="tx1"/>
+            </a:fontRef>
+          </p:style>
+        </p:cxnSp>
+        <p:cxnSp>
+          <p:nvCxnSpPr>
+            <p:cNvPr id="45" name="直接箭头连接符 44"/>
+            <p:cNvCxnSpPr>
+              <a:stCxn id="14" idx="2"/>
+              <a:endCxn id="7" idx="0"/>
+            </p:cNvCxnSpPr>
+            <p:nvPr/>
+          </p:nvCxnSpPr>
+          <p:spPr>
+            <a:xfrm>
+              <a:off x="3395700" y="2852936"/>
+              <a:ext cx="1140296" cy="360040"/>
+            </a:xfrm>
+            <a:prstGeom prst="straightConnector1">
+              <a:avLst/>
+            </a:prstGeom>
+            <a:ln>
+              <a:tailEnd type="arrow"/>
+            </a:ln>
+          </p:spPr>
+          <p:style>
+            <a:lnRef idx="1">
+              <a:schemeClr val="dk1"/>
+            </a:lnRef>
+            <a:fillRef idx="0">
+              <a:schemeClr val="dk1"/>
+            </a:fillRef>
+            <a:effectRef idx="0">
+              <a:schemeClr val="dk1"/>
+            </a:effectRef>
+            <a:fontRef idx="minor">
+              <a:schemeClr val="tx1"/>
+            </a:fontRef>
+          </p:style>
+        </p:cxnSp>
+        <p:cxnSp>
+          <p:nvCxnSpPr>
+            <p:cNvPr id="46" name="直接箭头连接符 45"/>
+            <p:cNvCxnSpPr>
+              <a:stCxn id="11" idx="2"/>
+              <a:endCxn id="7" idx="0"/>
+            </p:cNvCxnSpPr>
+            <p:nvPr/>
+          </p:nvCxnSpPr>
+          <p:spPr>
+            <a:xfrm>
+              <a:off x="1511660" y="2852936"/>
+              <a:ext cx="3024336" cy="360040"/>
+            </a:xfrm>
+            <a:prstGeom prst="straightConnector1">
+              <a:avLst/>
+            </a:prstGeom>
+            <a:ln>
+              <a:tailEnd type="arrow"/>
+            </a:ln>
+          </p:spPr>
+          <p:style>
+            <a:lnRef idx="1">
+              <a:schemeClr val="accent2"/>
+            </a:lnRef>
+            <a:fillRef idx="0">
+              <a:schemeClr val="accent2"/>
+            </a:fillRef>
+            <a:effectRef idx="0">
+              <a:schemeClr val="accent2"/>
+            </a:effectRef>
+            <a:fontRef idx="minor">
+              <a:schemeClr val="tx1"/>
+            </a:fontRef>
+          </p:style>
+        </p:cxnSp>
+        <p:cxnSp>
+          <p:nvCxnSpPr>
+            <p:cNvPr id="53" name="直接箭头连接符 52"/>
+            <p:cNvCxnSpPr>
+              <a:stCxn id="12" idx="2"/>
+              <a:endCxn id="7" idx="0"/>
+            </p:cNvCxnSpPr>
+            <p:nvPr/>
+          </p:nvCxnSpPr>
+          <p:spPr>
+            <a:xfrm flipH="1">
+              <a:off x="4535996" y="2852936"/>
+              <a:ext cx="2627784" cy="360040"/>
+            </a:xfrm>
+            <a:prstGeom prst="straightConnector1">
+              <a:avLst/>
+            </a:prstGeom>
+            <a:ln>
+              <a:tailEnd type="arrow"/>
+            </a:ln>
+          </p:spPr>
+          <p:style>
+            <a:lnRef idx="1">
+              <a:schemeClr val="accent4"/>
+            </a:lnRef>
+            <a:fillRef idx="0">
+              <a:schemeClr val="accent4"/>
+            </a:fillRef>
+            <a:effectRef idx="0">
+              <a:schemeClr val="accent4"/>
+            </a:effectRef>
+            <a:fontRef idx="minor">
+              <a:schemeClr val="tx1"/>
+            </a:fontRef>
+          </p:style>
+        </p:cxnSp>
+        <p:cxnSp>
+          <p:nvCxnSpPr>
+            <p:cNvPr id="56" name="直接箭头连接符 55"/>
+            <p:cNvCxnSpPr>
+              <a:stCxn id="7" idx="2"/>
+              <a:endCxn id="16" idx="0"/>
+            </p:cNvCxnSpPr>
+            <p:nvPr/>
+          </p:nvCxnSpPr>
+          <p:spPr>
+            <a:xfrm flipH="1">
+              <a:off x="4427984" y="3645024"/>
+              <a:ext cx="108012" cy="1440160"/>
+            </a:xfrm>
+            <a:prstGeom prst="straightConnector1">
+              <a:avLst/>
+            </a:prstGeom>
+            <a:ln>
+              <a:tailEnd type="arrow"/>
+            </a:ln>
+          </p:spPr>
+          <p:style>
+            <a:lnRef idx="1">
+              <a:schemeClr val="accent3"/>
+            </a:lnRef>
+            <a:fillRef idx="0">
+              <a:schemeClr val="accent3"/>
+            </a:fillRef>
+            <a:effectRef idx="0">
+              <a:schemeClr val="accent3"/>
+            </a:effectRef>
+            <a:fontRef idx="minor">
+              <a:schemeClr val="tx1"/>
+            </a:fontRef>
+          </p:style>
+        </p:cxnSp>
+        <p:grpSp>
+          <p:nvGrpSpPr>
+            <p:cNvPr id="19" name="组合 18"/>
+            <p:cNvGrpSpPr/>
+            <p:nvPr/>
+          </p:nvGrpSpPr>
+          <p:grpSpPr>
+            <a:xfrm>
+              <a:off x="899592" y="4221088"/>
+              <a:ext cx="6696744" cy="432048"/>
+              <a:chOff x="899592" y="4077072"/>
+              <a:chExt cx="6696744" cy="432048"/>
+            </a:xfrm>
+          </p:grpSpPr>
+          <p:sp>
+            <p:nvSpPr>
+              <p:cNvPr id="8" name="矩形 7"/>
+              <p:cNvSpPr/>
+              <p:nvPr/>
+            </p:nvSpPr>
+            <p:spPr>
+              <a:xfrm>
+                <a:off x="5796136" y="4077072"/>
+                <a:ext cx="1800200" cy="432048"/>
+              </a:xfrm>
+              <a:prstGeom prst="rect">
+                <a:avLst/>
+              </a:prstGeom>
+            </p:spPr>
+            <p:style>
+              <a:lnRef idx="1">
+                <a:schemeClr val="accent6"/>
+              </a:lnRef>
+              <a:fillRef idx="2">
+                <a:schemeClr val="accent6"/>
+              </a:fillRef>
+              <a:effectRef idx="1">
+                <a:schemeClr val="accent6"/>
+              </a:effectRef>
+              <a:fontRef idx="minor">
+                <a:schemeClr val="dk1"/>
+              </a:fontRef>
+            </p:style>
+            <p:txBody>
+              <a:bodyPr rtlCol="0" anchor="ctr"/>
+              <a:lstStyle/>
+              <a:p>
+                <a:pPr algn="ctr"/>
+                <a:r>
+                  <a:rPr lang="en-US" altLang="zh-CN" dirty="0" smtClean="0"/>
+                  <a:t>Web</a:t>
+                </a:r>
+                <a:r>
+                  <a:rPr lang="zh-CN" altLang="en-US" dirty="0" smtClean="0"/>
+                  <a:t>技术</a:t>
+                </a:r>
+                <a:endParaRPr lang="zh-CN" altLang="en-US" dirty="0"/>
+              </a:p>
+            </p:txBody>
+          </p:sp>
+          <p:sp>
+            <p:nvSpPr>
+              <p:cNvPr id="9" name="矩形 8"/>
+              <p:cNvSpPr/>
+              <p:nvPr/>
+            </p:nvSpPr>
+            <p:spPr>
+              <a:xfrm>
+                <a:off x="899592" y="4077072"/>
+                <a:ext cx="1800200" cy="432048"/>
+              </a:xfrm>
+              <a:prstGeom prst="rect">
+                <a:avLst/>
+              </a:prstGeom>
+            </p:spPr>
+            <p:style>
+              <a:lnRef idx="1">
+                <a:schemeClr val="accent2"/>
+              </a:lnRef>
+              <a:fillRef idx="2">
+                <a:schemeClr val="accent2"/>
+              </a:fillRef>
+              <a:effectRef idx="1">
+                <a:schemeClr val="accent2"/>
+              </a:effectRef>
+              <a:fontRef idx="minor">
+                <a:schemeClr val="dk1"/>
+              </a:fontRef>
+            </p:style>
+            <p:txBody>
+              <a:bodyPr rtlCol="0" anchor="ctr"/>
+              <a:lstStyle/>
+              <a:p>
+                <a:pPr algn="ctr"/>
+                <a:r>
+                  <a:rPr lang="zh-CN" altLang="en-US" dirty="0" smtClean="0"/>
+                  <a:t>邮件系统管理</a:t>
+                </a:r>
+                <a:endParaRPr lang="zh-CN" altLang="en-US" dirty="0"/>
+              </a:p>
+            </p:txBody>
+          </p:sp>
+          <p:sp>
+            <p:nvSpPr>
+              <p:cNvPr id="13" name="矩形 12"/>
+              <p:cNvSpPr/>
+              <p:nvPr/>
+            </p:nvSpPr>
+            <p:spPr>
+              <a:xfrm>
+                <a:off x="2771800" y="4077072"/>
+                <a:ext cx="2952328" cy="432048"/>
+              </a:xfrm>
+              <a:prstGeom prst="rect">
+                <a:avLst/>
+              </a:prstGeom>
+            </p:spPr>
+            <p:style>
+              <a:lnRef idx="1">
+                <a:schemeClr val="accent2"/>
+              </a:lnRef>
+              <a:fillRef idx="2">
+                <a:schemeClr val="accent2"/>
+              </a:fillRef>
+              <a:effectRef idx="1">
+                <a:schemeClr val="accent2"/>
+              </a:effectRef>
+              <a:fontRef idx="minor">
+                <a:schemeClr val="dk1"/>
+              </a:fontRef>
+            </p:style>
+            <p:txBody>
+              <a:bodyPr rtlCol="0" anchor="ctr"/>
+              <a:lstStyle/>
+              <a:p>
+                <a:pPr algn="ctr"/>
+                <a:r>
+                  <a:rPr lang="en-US" altLang="zh-CN" dirty="0" err="1" smtClean="0"/>
+                  <a:t>Powershell</a:t>
+                </a:r>
+                <a:r>
+                  <a:rPr lang="zh-CN" altLang="en-US" dirty="0" smtClean="0"/>
+                  <a:t>与企业系统</a:t>
+                </a:r>
+                <a:endParaRPr lang="zh-CN" altLang="en-US" dirty="0"/>
+              </a:p>
+            </p:txBody>
+          </p:sp>
+        </p:grpSp>
+        <p:cxnSp>
+          <p:nvCxnSpPr>
+            <p:cNvPr id="61" name="直接箭头连接符 60"/>
+            <p:cNvCxnSpPr>
+              <a:stCxn id="14" idx="2"/>
+              <a:endCxn id="8" idx="0"/>
+            </p:cNvCxnSpPr>
+            <p:nvPr/>
+          </p:nvCxnSpPr>
+          <p:spPr>
+            <a:xfrm>
+              <a:off x="3395700" y="2852936"/>
+              <a:ext cx="3300536" cy="1368152"/>
+            </a:xfrm>
+            <a:prstGeom prst="straightConnector1">
+              <a:avLst/>
+            </a:prstGeom>
+            <a:ln w="12700">
+              <a:tailEnd type="arrow"/>
+            </a:ln>
+          </p:spPr>
+          <p:style>
+            <a:lnRef idx="1">
+              <a:schemeClr val="dk1"/>
+            </a:lnRef>
+            <a:fillRef idx="0">
+              <a:schemeClr val="dk1"/>
+            </a:fillRef>
+            <a:effectRef idx="0">
+              <a:schemeClr val="dk1"/>
+            </a:effectRef>
+            <a:fontRef idx="minor">
+              <a:schemeClr val="tx1"/>
+            </a:fontRef>
+          </p:style>
+        </p:cxnSp>
+        <p:cxnSp>
+          <p:nvCxnSpPr>
+            <p:cNvPr id="62" name="直接箭头连接符 61"/>
+            <p:cNvCxnSpPr>
+              <a:stCxn id="11" idx="2"/>
+              <a:endCxn id="13" idx="0"/>
+            </p:cNvCxnSpPr>
+            <p:nvPr/>
+          </p:nvCxnSpPr>
+          <p:spPr>
+            <a:xfrm>
+              <a:off x="1511660" y="2852936"/>
+              <a:ext cx="2736304" cy="1368152"/>
+            </a:xfrm>
+            <a:prstGeom prst="straightConnector1">
+              <a:avLst/>
+            </a:prstGeom>
+            <a:ln>
+              <a:tailEnd type="arrow"/>
+            </a:ln>
+          </p:spPr>
+          <p:style>
+            <a:lnRef idx="1">
+              <a:schemeClr val="accent2"/>
+            </a:lnRef>
+            <a:fillRef idx="0">
+              <a:schemeClr val="accent2"/>
+            </a:fillRef>
+            <a:effectRef idx="0">
+              <a:schemeClr val="accent2"/>
+            </a:effectRef>
+            <a:fontRef idx="minor">
+              <a:schemeClr val="tx1"/>
+            </a:fontRef>
+          </p:style>
+        </p:cxnSp>
+        <p:cxnSp>
+          <p:nvCxnSpPr>
+            <p:cNvPr id="63" name="直接箭头连接符 62"/>
+            <p:cNvCxnSpPr>
+              <a:stCxn id="11" idx="2"/>
+              <a:endCxn id="9" idx="0"/>
+            </p:cNvCxnSpPr>
+            <p:nvPr/>
+          </p:nvCxnSpPr>
+          <p:spPr>
+            <a:xfrm>
+              <a:off x="1511660" y="2852936"/>
+              <a:ext cx="288032" cy="1368152"/>
+            </a:xfrm>
+            <a:prstGeom prst="straightConnector1">
+              <a:avLst/>
+            </a:prstGeom>
+            <a:ln>
+              <a:tailEnd type="arrow"/>
+            </a:ln>
+          </p:spPr>
+          <p:style>
+            <a:lnRef idx="1">
+              <a:schemeClr val="accent2"/>
+            </a:lnRef>
+            <a:fillRef idx="0">
+              <a:schemeClr val="accent2"/>
+            </a:fillRef>
+            <a:effectRef idx="0">
+              <a:schemeClr val="accent2"/>
+            </a:effectRef>
+            <a:fontRef idx="minor">
+              <a:schemeClr val="tx1"/>
+            </a:fontRef>
+          </p:style>
+        </p:cxnSp>
+        <p:cxnSp>
+          <p:nvCxnSpPr>
+            <p:cNvPr id="72" name="直接箭头连接符 71"/>
+            <p:cNvCxnSpPr>
+              <a:stCxn id="15" idx="2"/>
+              <a:endCxn id="8" idx="0"/>
+            </p:cNvCxnSpPr>
+            <p:nvPr/>
+          </p:nvCxnSpPr>
+          <p:spPr>
+            <a:xfrm>
+              <a:off x="5279740" y="2852936"/>
+              <a:ext cx="1416496" cy="1368152"/>
+            </a:xfrm>
+            <a:prstGeom prst="straightConnector1">
+              <a:avLst/>
+            </a:prstGeom>
+            <a:ln>
+              <a:tailEnd type="arrow"/>
+            </a:ln>
+          </p:spPr>
+          <p:style>
+            <a:lnRef idx="1">
+              <a:schemeClr val="accent1"/>
+            </a:lnRef>
+            <a:fillRef idx="0">
+              <a:schemeClr val="accent1"/>
+            </a:fillRef>
+            <a:effectRef idx="0">
+              <a:schemeClr val="accent1"/>
+            </a:effectRef>
+            <a:fontRef idx="minor">
+              <a:schemeClr val="tx1"/>
+            </a:fontRef>
+          </p:style>
+        </p:cxnSp>
+        <p:cxnSp>
+          <p:nvCxnSpPr>
+            <p:cNvPr id="69" name="直接箭头连接符 68"/>
+            <p:cNvCxnSpPr>
+              <a:stCxn id="15" idx="2"/>
+              <a:endCxn id="9" idx="0"/>
+            </p:cNvCxnSpPr>
+            <p:nvPr/>
+          </p:nvCxnSpPr>
+          <p:spPr>
+            <a:xfrm flipH="1">
+              <a:off x="1799692" y="2852936"/>
+              <a:ext cx="3480048" cy="1368152"/>
+            </a:xfrm>
+            <a:prstGeom prst="straightConnector1">
+              <a:avLst/>
+            </a:prstGeom>
+            <a:ln>
+              <a:tailEnd type="arrow"/>
+            </a:ln>
+          </p:spPr>
+          <p:style>
+            <a:lnRef idx="1">
+              <a:schemeClr val="accent1"/>
+            </a:lnRef>
+            <a:fillRef idx="0">
+              <a:schemeClr val="accent1"/>
+            </a:fillRef>
+            <a:effectRef idx="0">
+              <a:schemeClr val="accent1"/>
+            </a:effectRef>
+            <a:fontRef idx="minor">
+              <a:schemeClr val="tx1"/>
+            </a:fontRef>
+          </p:style>
+        </p:cxnSp>
+        <p:sp>
+          <p:nvSpPr>
+            <p:cNvPr id="7" name="矩形 6"/>
+            <p:cNvSpPr/>
+            <p:nvPr/>
+          </p:nvSpPr>
+          <p:spPr>
+            <a:xfrm>
+              <a:off x="2915816" y="3212976"/>
+              <a:ext cx="3240360" cy="432048"/>
+            </a:xfrm>
+            <a:prstGeom prst="rect">
+              <a:avLst/>
+            </a:prstGeom>
+          </p:spPr>
+          <p:style>
+            <a:lnRef idx="1">
+              <a:schemeClr val="accent3"/>
+            </a:lnRef>
+            <a:fillRef idx="2">
+              <a:schemeClr val="accent3"/>
+            </a:fillRef>
+            <a:effectRef idx="1">
+              <a:schemeClr val="accent3"/>
+            </a:effectRef>
+            <a:fontRef idx="minor">
+              <a:schemeClr val="dk1"/>
+            </a:fontRef>
+          </p:style>
+          <p:txBody>
+            <a:bodyPr rtlCol="0" anchor="ctr"/>
+            <a:lstStyle/>
+            <a:p>
+              <a:pPr algn="ctr"/>
+              <a:r>
+                <a:rPr lang="zh-CN" altLang="en-US" dirty="0" smtClean="0"/>
+                <a:t>综合项目：网络基础设施构建</a:t>
+              </a:r>
+              <a:endParaRPr lang="zh-CN" altLang="en-US" dirty="0"/>
+            </a:p>
+          </p:txBody>
+        </p:sp>
+        <p:cxnSp>
+          <p:nvCxnSpPr>
+            <p:cNvPr id="77" name="直接箭头连接符 76"/>
+            <p:cNvCxnSpPr>
+              <a:stCxn id="8" idx="2"/>
+              <a:endCxn id="16" idx="0"/>
+            </p:cNvCxnSpPr>
+            <p:nvPr/>
+          </p:nvCxnSpPr>
+          <p:spPr>
+            <a:xfrm flipH="1">
+              <a:off x="4427984" y="4653136"/>
+              <a:ext cx="2268252" cy="432048"/>
+            </a:xfrm>
+            <a:prstGeom prst="straightConnector1">
+              <a:avLst/>
+            </a:prstGeom>
+            <a:ln>
+              <a:tailEnd type="arrow"/>
+            </a:ln>
+          </p:spPr>
+          <p:style>
+            <a:lnRef idx="1">
+              <a:schemeClr val="accent6"/>
+            </a:lnRef>
+            <a:fillRef idx="0">
+              <a:schemeClr val="accent6"/>
+            </a:fillRef>
+            <a:effectRef idx="0">
+              <a:schemeClr val="accent6"/>
+            </a:effectRef>
+            <a:fontRef idx="minor">
+              <a:schemeClr val="tx1"/>
+            </a:fontRef>
+          </p:style>
+        </p:cxnSp>
+        <p:cxnSp>
+          <p:nvCxnSpPr>
+            <p:cNvPr id="78" name="直接箭头连接符 77"/>
+            <p:cNvCxnSpPr>
+              <a:stCxn id="13" idx="2"/>
+              <a:endCxn id="16" idx="0"/>
+            </p:cNvCxnSpPr>
+            <p:nvPr/>
+          </p:nvCxnSpPr>
+          <p:spPr>
+            <a:xfrm>
+              <a:off x="4247964" y="4653136"/>
+              <a:ext cx="180020" cy="432048"/>
+            </a:xfrm>
+            <a:prstGeom prst="straightConnector1">
+              <a:avLst/>
+            </a:prstGeom>
+            <a:ln>
+              <a:tailEnd type="arrow"/>
+            </a:ln>
+          </p:spPr>
+          <p:style>
+            <a:lnRef idx="1">
+              <a:schemeClr val="accent2"/>
+            </a:lnRef>
+            <a:fillRef idx="0">
+              <a:schemeClr val="accent2"/>
+            </a:fillRef>
+            <a:effectRef idx="0">
+              <a:schemeClr val="accent2"/>
+            </a:effectRef>
+            <a:fontRef idx="minor">
+              <a:schemeClr val="tx1"/>
+            </a:fontRef>
+          </p:style>
+        </p:cxnSp>
+        <p:cxnSp>
+          <p:nvCxnSpPr>
+            <p:cNvPr id="79" name="直接箭头连接符 78"/>
+            <p:cNvCxnSpPr>
+              <a:stCxn id="9" idx="2"/>
+              <a:endCxn id="16" idx="0"/>
+            </p:cNvCxnSpPr>
+            <p:nvPr/>
+          </p:nvCxnSpPr>
+          <p:spPr>
+            <a:xfrm>
+              <a:off x="1799692" y="4653136"/>
+              <a:ext cx="2628292" cy="432048"/>
+            </a:xfrm>
+            <a:prstGeom prst="straightConnector1">
+              <a:avLst/>
+            </a:prstGeom>
+            <a:ln>
+              <a:tailEnd type="arrow"/>
+            </a:ln>
+          </p:spPr>
+          <p:style>
+            <a:lnRef idx="1">
+              <a:schemeClr val="accent1"/>
+            </a:lnRef>
+            <a:fillRef idx="0">
+              <a:schemeClr val="accent1"/>
+            </a:fillRef>
+            <a:effectRef idx="0">
+              <a:schemeClr val="accent1"/>
+            </a:effectRef>
+            <a:fontRef idx="minor">
+              <a:schemeClr val="tx1"/>
+            </a:fontRef>
+          </p:style>
+        </p:cxnSp>
+        <p:cxnSp>
+          <p:nvCxnSpPr>
+            <p:cNvPr id="86" name="直接箭头连接符 85"/>
+            <p:cNvCxnSpPr>
+              <a:stCxn id="17" idx="2"/>
+              <a:endCxn id="15" idx="0"/>
+            </p:cNvCxnSpPr>
+            <p:nvPr/>
+          </p:nvCxnSpPr>
+          <p:spPr>
+            <a:xfrm flipH="1">
+              <a:off x="5279740" y="1556792"/>
+              <a:ext cx="840432" cy="864096"/>
+            </a:xfrm>
+            <a:prstGeom prst="straightConnector1">
+              <a:avLst/>
+            </a:prstGeom>
+            <a:ln>
+              <a:tailEnd type="arrow"/>
+            </a:ln>
+          </p:spPr>
+          <p:style>
+            <a:lnRef idx="1">
+              <a:schemeClr val="accent4"/>
+            </a:lnRef>
+            <a:fillRef idx="0">
+              <a:schemeClr val="accent4"/>
+            </a:fillRef>
+            <a:effectRef idx="0">
+              <a:schemeClr val="accent4"/>
+            </a:effectRef>
+            <a:fontRef idx="minor">
+              <a:schemeClr val="tx1"/>
+            </a:fontRef>
+          </p:style>
+        </p:cxnSp>
+        <p:cxnSp>
+          <p:nvCxnSpPr>
+            <p:cNvPr id="89" name="直接箭头连接符 88"/>
+            <p:cNvCxnSpPr>
+              <a:stCxn id="17" idx="2"/>
+              <a:endCxn id="14" idx="0"/>
+            </p:cNvCxnSpPr>
+            <p:nvPr/>
+          </p:nvCxnSpPr>
+          <p:spPr>
+            <a:xfrm flipH="1">
+              <a:off x="3395700" y="1556792"/>
+              <a:ext cx="2724472" cy="864096"/>
+            </a:xfrm>
+            <a:prstGeom prst="straightConnector1">
+              <a:avLst/>
+            </a:prstGeom>
+            <a:ln>
+              <a:tailEnd type="arrow"/>
+            </a:ln>
+          </p:spPr>
+          <p:style>
+            <a:lnRef idx="1">
+              <a:schemeClr val="accent4"/>
+            </a:lnRef>
+            <a:fillRef idx="0">
+              <a:schemeClr val="accent4"/>
+            </a:fillRef>
+            <a:effectRef idx="0">
+              <a:schemeClr val="accent4"/>
+            </a:effectRef>
+            <a:fontRef idx="minor">
+              <a:schemeClr val="tx1"/>
+            </a:fontRef>
+          </p:style>
+        </p:cxnSp>
+        <p:cxnSp>
+          <p:nvCxnSpPr>
+            <p:cNvPr id="108" name="直接箭头连接符 107"/>
+            <p:cNvCxnSpPr>
+              <a:stCxn id="10" idx="2"/>
+              <a:endCxn id="9" idx="0"/>
+            </p:cNvCxnSpPr>
+            <p:nvPr/>
+          </p:nvCxnSpPr>
+          <p:spPr>
+            <a:xfrm flipH="1">
+              <a:off x="1799692" y="1556792"/>
+              <a:ext cx="2124236" cy="2664296"/>
+            </a:xfrm>
+            <a:prstGeom prst="straightConnector1">
+              <a:avLst/>
+            </a:prstGeom>
+            <a:ln>
+              <a:tailEnd type="arrow"/>
+            </a:ln>
+          </p:spPr>
+          <p:style>
+            <a:lnRef idx="1">
+              <a:schemeClr val="accent2"/>
+            </a:lnRef>
+            <a:fillRef idx="0">
+              <a:schemeClr val="accent2"/>
+            </a:fillRef>
+            <a:effectRef idx="0">
+              <a:schemeClr val="accent2"/>
+            </a:effectRef>
+            <a:fontRef idx="minor">
+              <a:schemeClr val="tx1"/>
+            </a:fontRef>
+          </p:style>
+        </p:cxnSp>
+        <p:grpSp>
+          <p:nvGrpSpPr>
+            <p:cNvPr id="20" name="组合 19"/>
+            <p:cNvGrpSpPr/>
+            <p:nvPr/>
+          </p:nvGrpSpPr>
+          <p:grpSpPr>
+            <a:xfrm>
+              <a:off x="611560" y="2420888"/>
+              <a:ext cx="7452320" cy="432048"/>
+              <a:chOff x="576064" y="2132856"/>
+              <a:chExt cx="7452320" cy="432048"/>
+            </a:xfrm>
+          </p:grpSpPr>
+          <p:sp>
+            <p:nvSpPr>
+              <p:cNvPr id="11" name="矩形 10"/>
+              <p:cNvSpPr/>
+              <p:nvPr/>
+            </p:nvSpPr>
+            <p:spPr>
+              <a:xfrm>
+                <a:off x="576064" y="2132856"/>
+                <a:ext cx="1800200" cy="432048"/>
+              </a:xfrm>
+              <a:prstGeom prst="rect">
+                <a:avLst/>
+              </a:prstGeom>
+            </p:spPr>
+            <p:style>
+              <a:lnRef idx="1">
+                <a:schemeClr val="accent2"/>
+              </a:lnRef>
+              <a:fillRef idx="2">
+                <a:schemeClr val="accent2"/>
+              </a:fillRef>
+              <a:effectRef idx="1">
+                <a:schemeClr val="accent2"/>
+              </a:effectRef>
+              <a:fontRef idx="minor">
+                <a:schemeClr val="dk1"/>
+              </a:fontRef>
+            </p:style>
+            <p:txBody>
+              <a:bodyPr rtlCol="0" anchor="ctr"/>
+              <a:lstStyle/>
+              <a:p>
+                <a:pPr algn="ctr"/>
+                <a:r>
+                  <a:rPr lang="zh-CN" altLang="en-US" dirty="0" smtClean="0"/>
+                  <a:t>活动目录</a:t>
+                </a:r>
+                <a:endParaRPr lang="zh-CN" altLang="en-US" dirty="0"/>
+              </a:p>
+            </p:txBody>
+          </p:sp>
+          <p:sp>
+            <p:nvSpPr>
+              <p:cNvPr id="12" name="矩形 11"/>
+              <p:cNvSpPr/>
+              <p:nvPr/>
+            </p:nvSpPr>
+            <p:spPr>
+              <a:xfrm>
+                <a:off x="6228184" y="2132856"/>
+                <a:ext cx="1800200" cy="432048"/>
+              </a:xfrm>
+              <a:prstGeom prst="rect">
+                <a:avLst/>
+              </a:prstGeom>
+            </p:spPr>
+            <p:style>
+              <a:lnRef idx="1">
+                <a:schemeClr val="accent4"/>
+              </a:lnRef>
+              <a:fillRef idx="2">
+                <a:schemeClr val="accent4"/>
+              </a:fillRef>
+              <a:effectRef idx="1">
+                <a:schemeClr val="accent4"/>
+              </a:effectRef>
+              <a:fontRef idx="minor">
+                <a:schemeClr val="dk1"/>
+              </a:fontRef>
+            </p:style>
+            <p:txBody>
+              <a:bodyPr rtlCol="0" anchor="ctr"/>
+              <a:lstStyle/>
+              <a:p>
+                <a:pPr algn="ctr"/>
+                <a:r>
+                  <a:rPr lang="zh-CN" altLang="en-US" dirty="0" smtClean="0"/>
+                  <a:t>互联网影音</a:t>
+                </a:r>
+                <a:endParaRPr lang="zh-CN" altLang="en-US" dirty="0"/>
+              </a:p>
+            </p:txBody>
+          </p:sp>
+          <p:sp>
+            <p:nvSpPr>
+              <p:cNvPr id="15" name="矩形 14"/>
+              <p:cNvSpPr/>
+              <p:nvPr/>
+            </p:nvSpPr>
+            <p:spPr>
+              <a:xfrm>
+                <a:off x="4344144" y="2132856"/>
+                <a:ext cx="1800200" cy="432048"/>
+              </a:xfrm>
+              <a:prstGeom prst="rect">
+                <a:avLst/>
+              </a:prstGeom>
+            </p:spPr>
+            <p:style>
+              <a:lnRef idx="1">
+                <a:schemeClr val="accent1"/>
+              </a:lnRef>
+              <a:fillRef idx="2">
+                <a:schemeClr val="accent1"/>
+              </a:fillRef>
+              <a:effectRef idx="1">
+                <a:schemeClr val="accent1"/>
+              </a:effectRef>
+              <a:fontRef idx="minor">
+                <a:schemeClr val="dk1"/>
+              </a:fontRef>
+            </p:style>
+            <p:txBody>
+              <a:bodyPr rtlCol="0" anchor="ctr"/>
+              <a:lstStyle/>
+              <a:p>
+                <a:pPr algn="ctr"/>
+                <a:r>
+                  <a:rPr lang="zh-CN" altLang="en-US" dirty="0" smtClean="0"/>
+                  <a:t>网络设计与分析</a:t>
+                </a:r>
+                <a:endParaRPr lang="zh-CN" altLang="en-US" dirty="0"/>
+              </a:p>
+            </p:txBody>
+          </p:sp>
+          <p:sp>
+            <p:nvSpPr>
+              <p:cNvPr id="14" name="矩形 13"/>
+              <p:cNvSpPr/>
+              <p:nvPr/>
+            </p:nvSpPr>
+            <p:spPr>
+              <a:xfrm>
+                <a:off x="2460104" y="2132856"/>
+                <a:ext cx="1800200" cy="432048"/>
+              </a:xfrm>
+              <a:prstGeom prst="rect">
+                <a:avLst/>
+              </a:prstGeom>
+            </p:spPr>
+            <p:style>
+              <a:lnRef idx="1">
+                <a:schemeClr val="dk1"/>
+              </a:lnRef>
+              <a:fillRef idx="2">
+                <a:schemeClr val="dk1"/>
+              </a:fillRef>
+              <a:effectRef idx="1">
+                <a:schemeClr val="dk1"/>
+              </a:effectRef>
+              <a:fontRef idx="minor">
+                <a:schemeClr val="dk1"/>
+              </a:fontRef>
+            </p:style>
+            <p:txBody>
+              <a:bodyPr rtlCol="0" anchor="ctr"/>
+              <a:lstStyle/>
+              <a:p>
+                <a:pPr algn="ctr"/>
+                <a:r>
+                  <a:rPr lang="zh-CN" altLang="en-US" dirty="0" smtClean="0"/>
+                  <a:t>虚拟化</a:t>
+                </a:r>
+                <a:endParaRPr lang="zh-CN" altLang="en-US" dirty="0"/>
+              </a:p>
+            </p:txBody>
+          </p:sp>
+        </p:grpSp>
+      </p:grpSp>
+    </p:spTree>
+  </p:cSld>
+  <p:clrMapOvr>
+    <a:masterClrMapping/>
+  </p:clrMapOvr>
 </p:sld>
 </file>
 
@@ -20395,7 +22071,7 @@
             <a:fld id="{DE227482-0D96-4702-8AA5-1A17333980C2}" type="datetime1">
               <a:rPr lang="zh-CN" altLang="en-US" smtClean="0"/>
               <a:pPr/>
-              <a:t>2016/2/21</a:t>
+              <a:t>2016/3/13</a:t>
             </a:fld>
             <a:endParaRPr lang="zh-CN" altLang="en-US"/>
           </a:p>
@@ -20790,7 +22466,7 @@
             <a:fld id="{B31C83DB-FFBE-4084-BB1F-D0D1DC7C27B0}" type="datetime1">
               <a:rPr lang="zh-CN" altLang="en-US" smtClean="0"/>
               <a:pPr/>
-              <a:t>2016/2/21</a:t>
+              <a:t>2016/3/13</a:t>
             </a:fld>
             <a:endParaRPr lang="zh-CN" altLang="en-US" dirty="0"/>
           </a:p>
@@ -21120,7 +22796,7 @@
             <a:fld id="{0F83C2D7-E658-4E25-A7A6-7083EB62A903}" type="datetime1">
               <a:rPr lang="zh-CN" altLang="en-US" smtClean="0"/>
               <a:pPr/>
-              <a:t>2016/2/21</a:t>
+              <a:t>2016/3/13</a:t>
             </a:fld>
             <a:endParaRPr lang="zh-CN" altLang="en-US"/>
           </a:p>
@@ -21317,7 +22993,7 @@
             <a:fld id="{BFCCF862-D1EC-4814-A08A-B9F2DB25F7EB}" type="datetime1">
               <a:rPr lang="zh-CN" altLang="en-US" smtClean="0"/>
               <a:pPr/>
-              <a:t>2016/2/21</a:t>
+              <a:t>2016/3/13</a:t>
             </a:fld>
             <a:endParaRPr lang="zh-CN" altLang="en-US"/>
           </a:p>
@@ -21499,7 +23175,7 @@
             <a:fld id="{5C90BBFB-3575-4A10-8500-5F80E07E5E59}" type="datetime1">
               <a:rPr lang="zh-CN" altLang="en-US" smtClean="0"/>
               <a:pPr/>
-              <a:t>2016/2/21</a:t>
+              <a:t>2016/3/13</a:t>
             </a:fld>
             <a:endParaRPr lang="zh-CN" altLang="en-US"/>
           </a:p>
@@ -21732,7 +23408,7 @@
             <a:fld id="{A7001B82-35B6-4010-9DFF-35EF3D891961}" type="datetime1">
               <a:rPr lang="zh-CN" altLang="en-US" smtClean="0"/>
               <a:pPr/>
-              <a:t>2016/2/21</a:t>
+              <a:t>2016/3/13</a:t>
             </a:fld>
             <a:endParaRPr lang="zh-CN" altLang="en-US"/>
           </a:p>
@@ -22036,7 +23712,7 @@
             <a:fld id="{563684A5-147A-4161-A7E5-EF613A1103A4}" type="datetime1">
               <a:rPr lang="zh-CN" altLang="en-US" smtClean="0"/>
               <a:pPr/>
-              <a:t>2016/2/21</a:t>
+              <a:t>2016/3/13</a:t>
             </a:fld>
             <a:endParaRPr lang="zh-CN" altLang="en-US"/>
           </a:p>

</xml_diff>